<commit_message>
Updated data access presentations
</commit_message>
<xml_diff>
--- a/Presentation/lesson-09-sql.pptx
+++ b/Presentation/lesson-09-sql.pptx
@@ -218,7 +218,7 @@
           <a:p>
             <a:fld id="{B24A7054-7FFB-49F4-A126-5DF6E687FF53}" type="datetimeFigureOut">
               <a:rPr lang="ru-RU" smtClean="0"/>
-              <a:t>17.09.2013</a:t>
+              <a:t>22.10.2013</a:t>
             </a:fld>
             <a:endParaRPr lang="ru-RU"/>
           </a:p>
@@ -1500,7 +1500,7 @@
           <a:p>
             <a:fld id="{8E6E6A2A-E9D3-4A0D-B04A-ABDD367A1E08}" type="datetimeFigureOut">
               <a:rPr lang="ru-RU" smtClean="0"/>
-              <a:t>17.09.2013</a:t>
+              <a:t>22.10.2013</a:t>
             </a:fld>
             <a:endParaRPr lang="ru-RU"/>
           </a:p>
@@ -2945,7 +2945,7 @@
           <a:p>
             <a:fld id="{AC3D3127-B7C4-45E3-9797-C527EC9FDD78}" type="datetimeFigureOut">
               <a:rPr lang="ru-RU" smtClean="0"/>
-              <a:t>17.09.2013</a:t>
+              <a:t>22.10.2013</a:t>
             </a:fld>
             <a:endParaRPr lang="ru-RU"/>
           </a:p>
@@ -6928,8 +6928,12 @@
           <a:p>
             <a:pPr algn="ctr"/>
             <a:r>
-              <a:rPr lang="be-BY" sz="2400" b="1"/>
-              <a:t>Многотаблычные запросы.</a:t>
+              <a:rPr lang="be-BY" sz="2400" b="1" dirty="0" smtClean="0"/>
+              <a:t>Многотабличные </a:t>
+            </a:r>
+            <a:r>
+              <a:rPr lang="be-BY" sz="2400" b="1" dirty="0"/>
+              <a:t>запросы.</a:t>
             </a:r>
           </a:p>
         </p:txBody>
@@ -7851,16 +7855,56 @@
             <p:ph idx="1"/>
           </p:nvPr>
         </p:nvSpPr>
-        <p:spPr/>
+        <p:spPr>
+          <a:xfrm>
+            <a:off x="457200" y="1600200"/>
+            <a:ext cx="8229600" cy="3773015"/>
+          </a:xfrm>
+        </p:spPr>
         <p:txBody>
           <a:bodyPr/>
           <a:lstStyle/>
           <a:p>
+            <a:pPr marL="0" indent="0">
+              <a:buNone/>
+            </a:pPr>
+            <a:r>
+              <a:rPr lang="ru-RU" dirty="0" smtClean="0"/>
+              <a:t>Хранимая процедура это функция на языке </a:t>
+            </a:r>
             <a:r>
               <a:rPr lang="en-US" dirty="0" smtClean="0"/>
-              <a:t>CREATE PROC</a:t>
-            </a:r>
-            <a:endParaRPr lang="en-US" dirty="0"/>
+              <a:t>SQL. </a:t>
+            </a:r>
+            <a:r>
+              <a:rPr lang="ru-RU" dirty="0" smtClean="0"/>
+              <a:t>У процедуры могут быть параметры. Для создания процедуры используется команда </a:t>
+            </a:r>
+            <a:r>
+              <a:rPr lang="en-US" dirty="0" smtClean="0"/>
+              <a:t>CREATE PROC, </a:t>
+            </a:r>
+            <a:r>
+              <a:rPr lang="ru-RU" dirty="0" smtClean="0"/>
+              <a:t>для изменения </a:t>
+            </a:r>
+            <a:r>
+              <a:rPr lang="en-US" dirty="0" smtClean="0"/>
+              <a:t>ALTER PROC </a:t>
+            </a:r>
+            <a:r>
+              <a:rPr lang="ru-RU" dirty="0" smtClean="0"/>
+              <a:t>и </a:t>
+            </a:r>
+            <a:r>
+              <a:rPr lang="en-US" dirty="0" smtClean="0"/>
+              <a:t>DROP PROC </a:t>
+            </a:r>
+            <a:r>
+              <a:rPr lang="ru-RU" dirty="0" smtClean="0"/>
+              <a:t>для удаления.</a:t>
+            </a:r>
+            <a:endParaRPr lang="en-US" dirty="0" smtClean="0"/>
           </a:p>
         </p:txBody>
       </p:sp>

</xml_diff>

<commit_message>
Removed link to sqlcmd.ru
</commit_message>
<xml_diff>
--- a/Presentation/lesson-09-sql.pptx
+++ b/Presentation/lesson-09-sql.pptx
@@ -220,7 +220,7 @@
           <a:p>
             <a:fld id="{B24A7054-7FFB-49F4-A126-5DF6E687FF53}" type="datetimeFigureOut">
               <a:rPr lang="ru-RU" smtClean="0"/>
-              <a:t>24.04.2014</a:t>
+              <a:t>10.09.2014</a:t>
             </a:fld>
             <a:endParaRPr lang="ru-RU"/>
           </a:p>
@@ -1502,7 +1502,7 @@
           <a:p>
             <a:fld id="{8E6E6A2A-E9D3-4A0D-B04A-ABDD367A1E08}" type="datetimeFigureOut">
               <a:rPr lang="ru-RU" smtClean="0"/>
-              <a:t>24.04.2014</a:t>
+              <a:t>10.09.2014</a:t>
             </a:fld>
             <a:endParaRPr lang="ru-RU"/>
           </a:p>
@@ -2947,7 +2947,7 @@
           <a:p>
             <a:fld id="{AC3D3127-B7C4-45E3-9797-C527EC9FDD78}" type="datetimeFigureOut">
               <a:rPr lang="ru-RU" smtClean="0"/>
-              <a:t>24.04.2014</a:t>
+              <a:t>10.09.2014</a:t>
             </a:fld>
             <a:endParaRPr lang="ru-RU"/>
           </a:p>
@@ -8679,7 +8679,7 @@
 </file>
 
 <file path=ppt/slides/slide3.xml><?xml version="1.0" encoding="utf-8"?>
-<p:sld xmlns:a="http://schemas.openxmlformats.org/drawingml/2006/main" xmlns:r="http://schemas.openxmlformats.org/officeDocument/2006/relationships" xmlns:p="http://schemas.openxmlformats.org/presentationml/2006/main">
+<p:sld xmlns:a="http://schemas.openxmlformats.org/drawingml/2006/main" xmlns:r="http://schemas.openxmlformats.org/officeDocument/2006/relationships" xmlns:p="http://schemas.openxmlformats.org/presentationml/2006/main" show="0">
   <p:cSld>
     <p:spTree>
       <p:nvGrpSpPr>
@@ -8756,7 +8756,7 @@
           <a:lstStyle/>
           <a:p>
             <a:r>
-              <a:rPr lang="en-US" dirty="0" smtClean="0">
+              <a:rPr lang="en-US" strike="sngStrike" dirty="0" smtClean="0">
                 <a:solidFill>
                   <a:schemeClr val="bg1"/>
                 </a:solidFill>
@@ -8765,7 +8765,7 @@
               <a:t>www.sqlcmd.ru</a:t>
             </a:r>
             <a:r>
-              <a:rPr lang="en-US" dirty="0" smtClean="0">
+              <a:rPr lang="en-US" strike="sngStrike" dirty="0" smtClean="0">
                 <a:solidFill>
                   <a:schemeClr val="bg1"/>
                 </a:solidFill>
@@ -8773,7 +8773,7 @@
               <a:t> – </a:t>
             </a:r>
             <a:r>
-              <a:rPr lang="ru-RU" dirty="0" smtClean="0">
+              <a:rPr lang="ru-RU" strike="sngStrike" dirty="0" smtClean="0">
                 <a:solidFill>
                   <a:schemeClr val="bg1"/>
                 </a:solidFill>
@@ -8781,22 +8781,14 @@
               <a:t>блог на русском языке о работе и администрировании </a:t>
             </a:r>
             <a:r>
-              <a:rPr lang="en-US" dirty="0" smtClean="0">
+              <a:rPr lang="en-US" strike="sngStrike" dirty="0" smtClean="0">
                 <a:solidFill>
                   <a:schemeClr val="bg1"/>
                 </a:solidFill>
               </a:rPr>
-              <a:t>SQL </a:t>
-            </a:r>
-            <a:r>
-              <a:rPr lang="en-US" smtClean="0">
-                <a:solidFill>
-                  <a:schemeClr val="bg1"/>
-                </a:solidFill>
-              </a:rPr>
-              <a:t>Server.</a:t>
-            </a:r>
-            <a:endParaRPr lang="ru-RU" dirty="0" smtClean="0">
+              <a:t>SQL Server.</a:t>
+            </a:r>
+            <a:endParaRPr lang="ru-RU" strike="sngStrike" dirty="0" smtClean="0">
               <a:solidFill>
                 <a:schemeClr val="bg1"/>
               </a:solidFill>
@@ -8863,6 +8855,14 @@
   <p:clrMapOvr>
     <a:masterClrMapping/>
   </p:clrMapOvr>
+  <mc:AlternateContent xmlns:mc="http://schemas.openxmlformats.org/markup-compatibility/2006">
+    <mc:Choice xmlns:p14="http://schemas.microsoft.com/office/powerpoint/2010/main" Requires="p14">
+      <p:transition spd="slow" p14:dur="2000"/>
+    </mc:Choice>
+    <mc:Fallback>
+      <p:transition spd="slow"/>
+    </mc:Fallback>
+  </mc:AlternateContent>
   <p:timing>
     <p:tnLst>
       <p:par>

</xml_diff>

<commit_message>
Added link to sql-ex.ru
</commit_message>
<xml_diff>
--- a/Presentation/lesson-09-sql.pptx
+++ b/Presentation/lesson-09-sql.pptx
@@ -221,7 +221,7 @@
           <a:p>
             <a:fld id="{B24A7054-7FFB-49F4-A126-5DF6E687FF53}" type="datetimeFigureOut">
               <a:rPr lang="ru-RU" smtClean="0"/>
-              <a:t>13.09.2014</a:t>
+              <a:t>21.09.2014</a:t>
             </a:fld>
             <a:endParaRPr lang="ru-RU"/>
           </a:p>
@@ -1503,7 +1503,7 @@
           <a:p>
             <a:fld id="{8E6E6A2A-E9D3-4A0D-B04A-ABDD367A1E08}" type="datetimeFigureOut">
               <a:rPr lang="ru-RU" smtClean="0"/>
-              <a:t>13.09.2014</a:t>
+              <a:t>21.09.2014</a:t>
             </a:fld>
             <a:endParaRPr lang="ru-RU"/>
           </a:p>
@@ -2948,7 +2948,7 @@
           <a:p>
             <a:fld id="{AC3D3127-B7C4-45E3-9797-C527EC9FDD78}" type="datetimeFigureOut">
               <a:rPr lang="ru-RU" smtClean="0"/>
-              <a:t>13.09.2014</a:t>
+              <a:t>21.09.2014</a:t>
             </a:fld>
             <a:endParaRPr lang="ru-RU"/>
           </a:p>
@@ -8680,7 +8680,7 @@
 </file>
 
 <file path=ppt/slides/slide3.xml><?xml version="1.0" encoding="utf-8"?>
-<p:sld xmlns:a="http://schemas.openxmlformats.org/drawingml/2006/main" xmlns:r="http://schemas.openxmlformats.org/officeDocument/2006/relationships" xmlns:p="http://schemas.openxmlformats.org/presentationml/2006/main" show="0">
+<p:sld xmlns:a="http://schemas.openxmlformats.org/drawingml/2006/main" xmlns:r="http://schemas.openxmlformats.org/officeDocument/2006/relationships" xmlns:p="http://schemas.openxmlformats.org/presentationml/2006/main">
   <p:cSld>
     <p:spTree>
       <p:nvGrpSpPr>
@@ -8757,39 +8757,57 @@
           <a:lstStyle/>
           <a:p>
             <a:r>
-              <a:rPr lang="en-US" strike="sngStrike" dirty="0" smtClean="0">
+              <a:rPr lang="ru-RU" dirty="0" smtClean="0">
                 <a:solidFill>
                   <a:schemeClr val="bg1"/>
                 </a:solidFill>
+              </a:rPr>
+              <a:t>Упражнения по </a:t>
+            </a:r>
+            <a:r>
+              <a:rPr lang="en-US" dirty="0">
+                <a:solidFill>
+                  <a:schemeClr val="bg1"/>
+                </a:solidFill>
+              </a:rPr>
+              <a:t>SQL</a:t>
+            </a:r>
+            <a:br>
+              <a:rPr lang="en-US" dirty="0">
+                <a:solidFill>
+                  <a:schemeClr val="bg1"/>
+                </a:solidFill>
+              </a:rPr>
+            </a:br>
+            <a:r>
+              <a:rPr lang="en-US" dirty="0">
+                <a:solidFill>
+                  <a:schemeClr val="bg1"/>
+                </a:solidFill>
                 <a:hlinkClick r:id="rId2"/>
               </a:rPr>
-              <a:t>www.sqlcmd.ru</a:t>
-            </a:r>
-            <a:r>
-              <a:rPr lang="en-US" strike="sngStrike" dirty="0" smtClean="0">
+              <a:t>http://sql-ex.ru/?</a:t>
+            </a:r>
+            <a:r>
+              <a:rPr lang="en-US" dirty="0" smtClean="0">
                 <a:solidFill>
                   <a:schemeClr val="bg1"/>
                 </a:solidFill>
-              </a:rPr>
-              <a:t> – </a:t>
-            </a:r>
-            <a:r>
-              <a:rPr lang="ru-RU" strike="sngStrike" dirty="0" smtClean="0">
-                <a:solidFill>
-                  <a:schemeClr val="bg1"/>
-                </a:solidFill>
-              </a:rPr>
-              <a:t>блог на русском языке о работе и администрировании </a:t>
-            </a:r>
-            <a:r>
-              <a:rPr lang="en-US" strike="sngStrike" dirty="0" smtClean="0">
-                <a:solidFill>
-                  <a:schemeClr val="bg1"/>
-                </a:solidFill>
-              </a:rPr>
-              <a:t>SQL Server.</a:t>
-            </a:r>
-            <a:endParaRPr lang="ru-RU" strike="sngStrike" dirty="0" smtClean="0">
+                <a:hlinkClick r:id="rId2"/>
+              </a:rPr>
+              <a:t>Lang=0</a:t>
+            </a:r>
+            <a:endParaRPr lang="en-US" dirty="0" smtClean="0">
+              <a:solidFill>
+                <a:schemeClr val="bg1"/>
+              </a:solidFill>
+            </a:endParaRPr>
+          </a:p>
+          <a:p>
+            <a:pPr marL="0" indent="0">
+              <a:buNone/>
+            </a:pPr>
+            <a:endParaRPr lang="ru-RU" dirty="0" smtClean="0">
               <a:solidFill>
                 <a:schemeClr val="bg1"/>
               </a:solidFill>
@@ -8856,11 +8874,11 @@
   <p:clrMapOvr>
     <a:masterClrMapping/>
   </p:clrMapOvr>
-  <mc:AlternateContent xmlns:mc="http://schemas.openxmlformats.org/markup-compatibility/2006" xmlns:p14="http://schemas.microsoft.com/office/powerpoint/2010/main">
-    <mc:Choice Requires="p14">
+  <mc:AlternateContent xmlns:mc="http://schemas.openxmlformats.org/markup-compatibility/2006">
+    <mc:Choice xmlns:p14="http://schemas.microsoft.com/office/powerpoint/2010/main" Requires="p14">
       <p:transition spd="slow" p14:dur="2000"/>
     </mc:Choice>
-    <mc:Fallback xmlns="">
+    <mc:Fallback>
       <p:transition spd="slow"/>
     </mc:Fallback>
   </mc:AlternateContent>
@@ -9538,11 +9556,7 @@
             </a:r>
             <a:r>
               <a:rPr lang="en-US" dirty="0" smtClean="0"/>
-              <a:t>(graph</a:t>
-            </a:r>
-            <a:r>
-              <a:rPr lang="en-US" dirty="0" smtClean="0"/>
-              <a:t>)</a:t>
+              <a:t>(graph)</a:t>
             </a:r>
           </a:p>
           <a:p>

</xml_diff>

<commit_message>
Added database names and LIKE operator
</commit_message>
<xml_diff>
--- a/Presentation/lesson-09-sql.pptx
+++ b/Presentation/lesson-09-sql.pptx
@@ -5,7 +5,7 @@
     <p:sldMasterId id="2147483648" r:id="rId1"/>
   </p:sldMasterIdLst>
   <p:notesMasterIdLst>
-    <p:notesMasterId r:id="rId33"/>
+    <p:notesMasterId r:id="rId34"/>
   </p:notesMasterIdLst>
   <p:sldIdLst>
     <p:sldId id="256" r:id="rId2"/>
@@ -29,16 +29,17 @@
     <p:sldId id="262" r:id="rId20"/>
     <p:sldId id="263" r:id="rId21"/>
     <p:sldId id="264" r:id="rId22"/>
-    <p:sldId id="265" r:id="rId23"/>
-    <p:sldId id="266" r:id="rId24"/>
-    <p:sldId id="286" r:id="rId25"/>
-    <p:sldId id="267" r:id="rId26"/>
-    <p:sldId id="271" r:id="rId27"/>
-    <p:sldId id="282" r:id="rId28"/>
-    <p:sldId id="288" r:id="rId29"/>
-    <p:sldId id="280" r:id="rId30"/>
-    <p:sldId id="272" r:id="rId31"/>
-    <p:sldId id="273" r:id="rId32"/>
+    <p:sldId id="291" r:id="rId23"/>
+    <p:sldId id="265" r:id="rId24"/>
+    <p:sldId id="266" r:id="rId25"/>
+    <p:sldId id="286" r:id="rId26"/>
+    <p:sldId id="267" r:id="rId27"/>
+    <p:sldId id="271" r:id="rId28"/>
+    <p:sldId id="282" r:id="rId29"/>
+    <p:sldId id="288" r:id="rId30"/>
+    <p:sldId id="280" r:id="rId31"/>
+    <p:sldId id="272" r:id="rId32"/>
+    <p:sldId id="273" r:id="rId33"/>
   </p:sldIdLst>
   <p:sldSz cx="9144000" cy="6858000" type="screen4x3"/>
   <p:notesSz cx="6858000" cy="9144000"/>
@@ -222,7 +223,7 @@
           <a:p>
             <a:fld id="{B24A7054-7FFB-49F4-A126-5DF6E687FF53}" type="datetimeFigureOut">
               <a:rPr lang="ru-RU" smtClean="0"/>
-              <a:t>29.03.2015</a:t>
+              <a:t>23.04.2015</a:t>
             </a:fld>
             <a:endParaRPr lang="ru-RU"/>
           </a:p>
@@ -1504,7 +1505,7 @@
           <a:p>
             <a:fld id="{8E6E6A2A-E9D3-4A0D-B04A-ABDD367A1E08}" type="datetimeFigureOut">
               <a:rPr lang="ru-RU" smtClean="0"/>
-              <a:t>29.03.2015</a:t>
+              <a:t>23.04.2015</a:t>
             </a:fld>
             <a:endParaRPr lang="ru-RU"/>
           </a:p>
@@ -2949,7 +2950,7 @@
           <a:p>
             <a:fld id="{AC3D3127-B7C4-45E3-9797-C527EC9FDD78}" type="datetimeFigureOut">
               <a:rPr lang="ru-RU" smtClean="0"/>
-              <a:t>29.03.2015</a:t>
+              <a:t>23.04.2015</a:t>
             </a:fld>
             <a:endParaRPr lang="ru-RU"/>
           </a:p>
@@ -4404,11 +4405,7 @@
             </a:r>
             <a:r>
               <a:rPr lang="ru-RU" dirty="0" smtClean="0"/>
-              <a:t> </a:t>
-            </a:r>
-            <a:r>
-              <a:rPr lang="ru-RU" dirty="0" smtClean="0"/>
-              <a:t>не должны использоваться для хранения ваших данных:</a:t>
+              <a:t> не должны использоваться для хранения ваших данных:</a:t>
             </a:r>
           </a:p>
           <a:p>
@@ -6904,71 +6901,71 @@
           <a:p>
             <a:pPr lvl="2"/>
             <a:r>
-              <a:rPr lang="be-BY" sz="1600"/>
+              <a:rPr lang="be-BY" sz="1600" dirty="0"/>
               <a:t>Здесь использованы следующие обозначения:</a:t>
             </a:r>
           </a:p>
           <a:p>
             <a:pPr lvl="2"/>
             <a:r>
-              <a:rPr lang="ru-RU" sz="1600"/>
+              <a:rPr lang="ru-RU" sz="1600" dirty="0"/>
               <a:t>• column – имя столбца (или константа, или выражение);</a:t>
             </a:r>
           </a:p>
           <a:p>
             <a:pPr lvl="2"/>
             <a:r>
-              <a:rPr lang="ru-RU" sz="1600"/>
+              <a:rPr lang="ru-RU" sz="1600" dirty="0"/>
               <a:t>• DISTINCT - результат не будет содержать строк-дубликатов;</a:t>
             </a:r>
           </a:p>
           <a:p>
             <a:pPr lvl="2"/>
             <a:r>
-              <a:rPr lang="ru-RU" sz="1600"/>
+              <a:rPr lang="ru-RU" sz="1600" dirty="0"/>
               <a:t>• ALL - результат может содержать дублирующие строки (по умолчанию);</a:t>
             </a:r>
           </a:p>
           <a:p>
             <a:pPr lvl="2"/>
             <a:r>
-              <a:rPr lang="be-BY" sz="1600"/>
+              <a:rPr lang="be-BY" sz="1600" dirty="0"/>
               <a:t>• * - все столбцы;</a:t>
             </a:r>
           </a:p>
           <a:p>
             <a:pPr lvl="2"/>
             <a:r>
-              <a:rPr lang="en-US" sz="1600"/>
+              <a:rPr lang="en-US" sz="1600" dirty="0"/>
               <a:t>• table - </a:t>
             </a:r>
             <a:r>
-              <a:rPr lang="be-BY" sz="1600"/>
+              <a:rPr lang="be-BY" sz="1600" dirty="0"/>
               <a:t>имя таблицы;</a:t>
             </a:r>
           </a:p>
           <a:p>
             <a:pPr lvl="2"/>
             <a:r>
-              <a:rPr lang="ru-RU" sz="1600"/>
+              <a:rPr lang="ru-RU" sz="1600" dirty="0"/>
               <a:t>• alias - сокращение для имени таблицы;</a:t>
             </a:r>
           </a:p>
           <a:p>
             <a:pPr lvl="2"/>
             <a:r>
-              <a:rPr lang="ru-RU" sz="1600"/>
+              <a:rPr lang="ru-RU" sz="1600" dirty="0"/>
               <a:t>• condition - условие фильтрации строк данных;</a:t>
             </a:r>
           </a:p>
           <a:p>
             <a:pPr lvl="2"/>
             <a:r>
-              <a:rPr lang="en-US" sz="1600"/>
+              <a:rPr lang="en-US" sz="1600" dirty="0"/>
               <a:t>• list - </a:t>
             </a:r>
             <a:r>
-              <a:rPr lang="be-BY" sz="1600"/>
+              <a:rPr lang="be-BY" sz="1600" dirty="0"/>
               <a:t>список столбцов;</a:t>
             </a:r>
           </a:p>
@@ -7349,228 +7346,1137 @@
       </p:grpSpPr>
       <p:sp>
         <p:nvSpPr>
-          <p:cNvPr id="10242" name="Прямоугольник 2"/>
+          <p:cNvPr id="2" name="Title 1"/>
           <p:cNvSpPr>
-            <a:spLocks noChangeArrowheads="1"/>
+            <a:spLocks noGrp="1"/>
           </p:cNvSpPr>
-          <p:nvPr/>
+          <p:nvPr>
+            <p:ph type="title"/>
+          </p:nvPr>
         </p:nvSpPr>
-        <p:spPr bwMode="auto">
+        <p:spPr>
           <a:xfrm>
-            <a:off x="152400" y="0"/>
-            <a:ext cx="8839200" cy="461963"/>
+            <a:off x="457200" y="274638"/>
+            <a:ext cx="8229600" cy="1143000"/>
           </a:xfrm>
-          <a:prstGeom prst="rect">
-            <a:avLst/>
-          </a:prstGeom>
-          <a:noFill/>
-          <a:ln>
-            <a:noFill/>
-          </a:ln>
-          <a:extLst>
-            <a:ext uri="{909E8E84-426E-40DD-AFC4-6F175D3DCCD1}">
-              <a14:hiddenFill xmlns:a14="http://schemas.microsoft.com/office/drawing/2010/main">
-                <a:solidFill>
-                  <a:srgbClr val="FFFFFF"/>
-                </a:solidFill>
-              </a14:hiddenFill>
-            </a:ext>
-            <a:ext uri="{91240B29-F687-4F45-9708-019B960494DF}">
-              <a14:hiddenLine xmlns:a14="http://schemas.microsoft.com/office/drawing/2010/main" w="9525">
-                <a:solidFill>
-                  <a:srgbClr val="000000"/>
-                </a:solidFill>
-                <a:miter lim="800000"/>
-                <a:headEnd/>
-                <a:tailEnd/>
-              </a14:hiddenLine>
-            </a:ext>
-          </a:extLst>
         </p:spPr>
         <p:txBody>
           <a:bodyPr>
-            <a:spAutoFit/>
+            <a:normAutofit/>
           </a:bodyPr>
           <a:lstStyle/>
           <a:p>
-            <a:pPr algn="ctr"/>
-            <a:r>
-              <a:rPr lang="ru-RU" sz="2400" b="1"/>
-              <a:t>GROUP BY</a:t>
-            </a:r>
-            <a:r>
-              <a:rPr lang="en-US" sz="2400" b="1"/>
-              <a:t>.</a:t>
-            </a:r>
-            <a:endParaRPr lang="be-BY" sz="2400" b="1"/>
+            <a:r>
+              <a:rPr lang="ru-RU" dirty="0" smtClean="0"/>
+              <a:t>Оператор </a:t>
+            </a:r>
+            <a:r>
+              <a:rPr lang="en-US" dirty="0" smtClean="0"/>
+              <a:t>LIKE</a:t>
+            </a:r>
+            <a:endParaRPr lang="ru-RU" dirty="0"/>
           </a:p>
         </p:txBody>
       </p:sp>
-      <p:sp>
-        <p:nvSpPr>
-          <p:cNvPr id="10243" name="Прямоугольник 4"/>
-          <p:cNvSpPr>
-            <a:spLocks noChangeArrowheads="1"/>
-          </p:cNvSpPr>
-          <p:nvPr/>
-        </p:nvSpPr>
-        <p:spPr bwMode="auto">
-          <a:xfrm>
-            <a:off x="152400" y="457200"/>
-            <a:ext cx="8839200" cy="4524375"/>
-          </a:xfrm>
-          <a:prstGeom prst="rect">
-            <a:avLst/>
-          </a:prstGeom>
-          <a:noFill/>
-          <a:ln>
-            <a:noFill/>
-          </a:ln>
-          <a:extLst>
-            <a:ext uri="{909E8E84-426E-40DD-AFC4-6F175D3DCCD1}">
-              <a14:hiddenFill xmlns:a14="http://schemas.microsoft.com/office/drawing/2010/main">
-                <a:solidFill>
-                  <a:srgbClr val="FFFFFF"/>
-                </a:solidFill>
-              </a14:hiddenFill>
-            </a:ext>
-            <a:ext uri="{91240B29-F687-4F45-9708-019B960494DF}">
-              <a14:hiddenLine xmlns:a14="http://schemas.microsoft.com/office/drawing/2010/main" w="9525">
-                <a:solidFill>
-                  <a:srgbClr val="000000"/>
-                </a:solidFill>
-                <a:miter lim="800000"/>
-                <a:headEnd/>
-                <a:tailEnd/>
-              </a14:hiddenLine>
-            </a:ext>
-          </a:extLst>
-        </p:spPr>
-        <p:txBody>
-          <a:bodyPr>
-            <a:spAutoFit/>
-          </a:bodyPr>
-          <a:lstStyle/>
-          <a:p>
-            <a:r>
-              <a:rPr lang="ru-RU" sz="1200"/>
-              <a:t>	Запрос, включающий в себя предложение </a:t>
-            </a:r>
-            <a:r>
-              <a:rPr lang="ru-RU" sz="1200" b="1"/>
-              <a:t>GROUP BY</a:t>
-            </a:r>
-            <a:r>
-              <a:rPr lang="ru-RU" sz="1200"/>
-              <a:t>, называется запросом с группировкой, поскольку он объединяет строки исходных таблиц в группы и для каждой группы строк генерирует одну строку в таблице результатов запроса. Столбцы, указанные в предложении GROUP BY, называются столбцами группировки (возможно указание нескольких столбцов – группировка по комбинации значений), поскольку именно они определяют, по какому признаку строки делятся на группы.</a:t>
-            </a:r>
-          </a:p>
-          <a:p>
-            <a:r>
-              <a:rPr lang="ru-RU" sz="1200"/>
-              <a:t>Ограничения на синтаксис группирующих запросов и особенности выполнения: </a:t>
-            </a:r>
-          </a:p>
-          <a:p>
-            <a:r>
-              <a:rPr lang="ru-RU" sz="1200" b="1"/>
-              <a:t>1)</a:t>
-            </a:r>
-            <a:r>
-              <a:rPr lang="ru-RU" sz="1200"/>
-              <a:t> Столбцы с группировкой должны представлять собой реальные столбцы таблиц, перечисленных в предложении FROM. Нельзя группировать строки на основании значения вычисляемого выражения. </a:t>
-            </a:r>
-          </a:p>
-          <a:p>
-            <a:r>
-              <a:rPr lang="ru-RU" sz="1200" b="1"/>
-              <a:t>2)</a:t>
-            </a:r>
-            <a:r>
-              <a:rPr lang="ru-RU" sz="1200"/>
-              <a:t> Все имена столбцов, приведенные в описании SELECT должны обязательно присутствовать и в секции GROUP BY. Это означает, что возвращаемым столбцом может быть: </a:t>
-            </a:r>
-            <a:endParaRPr lang="be-BY" sz="1200"/>
-          </a:p>
-          <a:p>
-            <a:pPr lvl="1"/>
-            <a:r>
-              <a:rPr lang="be-BY" sz="1200"/>
-              <a:t>• константа; </a:t>
-            </a:r>
-          </a:p>
-          <a:p>
-            <a:pPr lvl="1"/>
-            <a:r>
-              <a:rPr lang="ru-RU" sz="1200"/>
-              <a:t>• статистическая функция, возвращающая одно значение для всех строк, входящих в группу; </a:t>
-            </a:r>
-          </a:p>
-          <a:p>
-            <a:pPr lvl="1"/>
-            <a:r>
-              <a:rPr lang="ru-RU" sz="1200"/>
-              <a:t>• столбец группировки, который по определению имеет одно и то же значение во всех строках группы; </a:t>
-            </a:r>
-          </a:p>
-          <a:p>
-            <a:pPr lvl="1"/>
-            <a:r>
-              <a:rPr lang="ru-RU" sz="1200"/>
-              <a:t>• выражение, включающее в себя перечисленные выше элементы.</a:t>
-            </a:r>
-          </a:p>
-          <a:p>
-            <a:r>
-              <a:rPr lang="ru-RU" sz="1200" b="1"/>
-              <a:t>3)</a:t>
-            </a:r>
-            <a:r>
-              <a:rPr lang="ru-RU" sz="1200"/>
-              <a:t> Если совместно с GROUP BY используется WHERE, то WHERE обрабатывается первым, а группированию подвергаются только те строки, которые удовлетворяют условию фильтра. По ISO, NULL-значения входят в одну группу.</a:t>
-            </a:r>
-          </a:p>
-          <a:p>
-            <a:endParaRPr lang="ru-RU" sz="1200"/>
-          </a:p>
-          <a:p>
-            <a:endParaRPr lang="ru-RU" sz="1200"/>
-          </a:p>
-          <a:p>
-            <a:r>
-              <a:rPr lang="ru-RU" sz="1200"/>
-              <a:t>	</a:t>
-            </a:r>
-            <a:r>
-              <a:rPr lang="ru-RU" sz="1200" b="1"/>
-              <a:t>Подзапросы</a:t>
-            </a:r>
-            <a:r>
-              <a:rPr lang="ru-RU" sz="1200"/>
-              <a:t> – запросы с помощью оператора SELECT, помещенные в секции WHERE и (или) HAVING внешнего оператора SELECT. Подзапрос создает временную таблицу, содержимое которой извлекается и обрабатывается внешним оператором (обычно предикатом внешнего запроса). Текст подзапроса должен быть заключен в круглые скобки и располагается всегда в правой части операции внешнего запроса. В подзапросах не должна </a:t>
-            </a:r>
-            <a:r>
-              <a:rPr lang="be-BY" sz="1200"/>
-              <a:t>использоваться секция </a:t>
-            </a:r>
-            <a:r>
-              <a:rPr lang="en-US" sz="1200"/>
-              <a:t>ORDER BY. </a:t>
-            </a:r>
-            <a:r>
-              <a:rPr lang="ru-RU" sz="1200"/>
-              <a:t> </a:t>
-            </a:r>
-          </a:p>
-          <a:p>
-            <a:endParaRPr lang="ru-RU" sz="1200"/>
-          </a:p>
-        </p:txBody>
-      </p:sp>
+      <p:graphicFrame>
+        <p:nvGraphicFramePr>
+          <p:cNvPr id="4" name="Table 3"/>
+          <p:cNvGraphicFramePr>
+            <a:graphicFrameLocks noGrp="1"/>
+          </p:cNvGraphicFramePr>
+          <p:nvPr>
+            <p:extLst>
+              <p:ext uri="{D42A27DB-BD31-4B8C-83A1-F6EECF244321}">
+                <p14:modId xmlns:p14="http://schemas.microsoft.com/office/powerpoint/2010/main" val="1610938236"/>
+              </p:ext>
+            </p:extLst>
+          </p:nvPr>
+        </p:nvGraphicFramePr>
+        <p:xfrm>
+          <a:off x="457200" y="1700808"/>
+          <a:ext cx="8075241" cy="4444536"/>
+        </p:xfrm>
+        <a:graphic>
+          <a:graphicData uri="http://schemas.openxmlformats.org/drawingml/2006/table">
+            <a:tbl>
+              <a:tblPr/>
+              <a:tblGrid>
+                <a:gridCol w="2242592"/>
+                <a:gridCol w="2736304"/>
+                <a:gridCol w="3096345"/>
+              </a:tblGrid>
+              <a:tr h="203414">
+                <a:tc>
+                  <a:txBody>
+                    <a:bodyPr/>
+                    <a:lstStyle/>
+                    <a:p>
+                      <a:r>
+                        <a:rPr lang="ru-RU" sz="1600" dirty="0" smtClean="0">
+                          <a:solidFill>
+                            <a:srgbClr val="0070C0"/>
+                          </a:solidFill>
+                        </a:rPr>
+                        <a:t>Шаблон</a:t>
+                      </a:r>
+                      <a:endParaRPr lang="en-US" sz="1600" dirty="0">
+                        <a:solidFill>
+                          <a:srgbClr val="0070C0"/>
+                        </a:solidFill>
+                      </a:endParaRPr>
+                    </a:p>
+                  </a:txBody>
+                  <a:tcPr marL="50854" marR="50854" marT="25427" marB="25427" anchor="ctr">
+                    <a:lnL w="12700" cap="flat" cmpd="sng" algn="ctr">
+                      <a:solidFill>
+                        <a:schemeClr val="bg1"/>
+                      </a:solidFill>
+                      <a:prstDash val="solid"/>
+                      <a:round/>
+                      <a:headEnd type="none" w="med" len="med"/>
+                      <a:tailEnd type="none" w="med" len="med"/>
+                    </a:lnL>
+                    <a:lnR w="12700" cap="flat" cmpd="sng" algn="ctr">
+                      <a:solidFill>
+                        <a:srgbClr val="0070C0"/>
+                      </a:solidFill>
+                      <a:prstDash val="solid"/>
+                      <a:round/>
+                      <a:headEnd type="none" w="med" len="med"/>
+                      <a:tailEnd type="none" w="med" len="med"/>
+                    </a:lnR>
+                    <a:lnT w="12700" cap="flat" cmpd="sng" algn="ctr">
+                      <a:solidFill>
+                        <a:schemeClr val="bg1"/>
+                      </a:solidFill>
+                      <a:prstDash val="solid"/>
+                      <a:round/>
+                      <a:headEnd type="none" w="med" len="med"/>
+                      <a:tailEnd type="none" w="med" len="med"/>
+                    </a:lnT>
+                    <a:lnB w="12700" cap="flat" cmpd="sng" algn="ctr">
+                      <a:solidFill>
+                        <a:schemeClr val="bg1"/>
+                      </a:solidFill>
+                      <a:prstDash val="solid"/>
+                      <a:round/>
+                      <a:headEnd type="none" w="med" len="med"/>
+                      <a:tailEnd type="none" w="med" len="med"/>
+                    </a:lnB>
+                    <a:solidFill>
+                      <a:schemeClr val="bg1"/>
+                    </a:solidFill>
+                  </a:tcPr>
+                </a:tc>
+                <a:tc>
+                  <a:txBody>
+                    <a:bodyPr/>
+                    <a:lstStyle/>
+                    <a:p>
+                      <a:r>
+                        <a:rPr lang="ru-RU" sz="1600" dirty="0" smtClean="0">
+                          <a:solidFill>
+                            <a:srgbClr val="0070C0"/>
+                          </a:solidFill>
+                        </a:rPr>
+                        <a:t>Описание</a:t>
+                      </a:r>
+                      <a:endParaRPr lang="en-US" sz="1600" dirty="0">
+                        <a:solidFill>
+                          <a:srgbClr val="0070C0"/>
+                        </a:solidFill>
+                      </a:endParaRPr>
+                    </a:p>
+                  </a:txBody>
+                  <a:tcPr marL="50854" marR="50854" marT="25427" marB="25427" anchor="ctr">
+                    <a:lnL w="12700" cap="flat" cmpd="sng" algn="ctr">
+                      <a:solidFill>
+                        <a:srgbClr val="0070C0"/>
+                      </a:solidFill>
+                      <a:prstDash val="solid"/>
+                      <a:round/>
+                      <a:headEnd type="none" w="med" len="med"/>
+                      <a:tailEnd type="none" w="med" len="med"/>
+                    </a:lnL>
+                    <a:lnR w="12700" cap="flat" cmpd="sng" algn="ctr">
+                      <a:solidFill>
+                        <a:srgbClr val="0070C0"/>
+                      </a:solidFill>
+                      <a:prstDash val="solid"/>
+                      <a:round/>
+                      <a:headEnd type="none" w="med" len="med"/>
+                      <a:tailEnd type="none" w="med" len="med"/>
+                    </a:lnR>
+                    <a:lnT w="12700" cap="flat" cmpd="sng" algn="ctr">
+                      <a:solidFill>
+                        <a:schemeClr val="bg1"/>
+                      </a:solidFill>
+                      <a:prstDash val="solid"/>
+                      <a:round/>
+                      <a:headEnd type="none" w="med" len="med"/>
+                      <a:tailEnd type="none" w="med" len="med"/>
+                    </a:lnT>
+                    <a:lnB w="12700" cap="flat" cmpd="sng" algn="ctr">
+                      <a:solidFill>
+                        <a:schemeClr val="bg1"/>
+                      </a:solidFill>
+                      <a:prstDash val="solid"/>
+                      <a:round/>
+                      <a:headEnd type="none" w="med" len="med"/>
+                      <a:tailEnd type="none" w="med" len="med"/>
+                    </a:lnB>
+                    <a:solidFill>
+                      <a:schemeClr val="bg1"/>
+                    </a:solidFill>
+                  </a:tcPr>
+                </a:tc>
+                <a:tc>
+                  <a:txBody>
+                    <a:bodyPr/>
+                    <a:lstStyle/>
+                    <a:p>
+                      <a:r>
+                        <a:rPr lang="ru-RU" sz="1600" dirty="0" smtClean="0">
+                          <a:solidFill>
+                            <a:srgbClr val="0070C0"/>
+                          </a:solidFill>
+                        </a:rPr>
+                        <a:t>Пример</a:t>
+                      </a:r>
+                      <a:endParaRPr lang="en-US" sz="1600" dirty="0">
+                        <a:solidFill>
+                          <a:srgbClr val="0070C0"/>
+                        </a:solidFill>
+                      </a:endParaRPr>
+                    </a:p>
+                  </a:txBody>
+                  <a:tcPr marL="50854" marR="50854" marT="25427" marB="25427" anchor="ctr">
+                    <a:lnL w="12700" cap="flat" cmpd="sng" algn="ctr">
+                      <a:solidFill>
+                        <a:srgbClr val="0070C0"/>
+                      </a:solidFill>
+                      <a:prstDash val="solid"/>
+                      <a:round/>
+                      <a:headEnd type="none" w="med" len="med"/>
+                      <a:tailEnd type="none" w="med" len="med"/>
+                    </a:lnL>
+                    <a:lnR w="12700" cap="flat" cmpd="sng" algn="ctr">
+                      <a:solidFill>
+                        <a:schemeClr val="bg1"/>
+                      </a:solidFill>
+                      <a:prstDash val="solid"/>
+                      <a:round/>
+                      <a:headEnd type="none" w="med" len="med"/>
+                      <a:tailEnd type="none" w="med" len="med"/>
+                    </a:lnR>
+                    <a:lnT w="12700" cap="flat" cmpd="sng" algn="ctr">
+                      <a:solidFill>
+                        <a:schemeClr val="bg1"/>
+                      </a:solidFill>
+                      <a:prstDash val="solid"/>
+                      <a:round/>
+                      <a:headEnd type="none" w="med" len="med"/>
+                      <a:tailEnd type="none" w="med" len="med"/>
+                    </a:lnT>
+                    <a:lnB w="12700" cap="flat" cmpd="sng" algn="ctr">
+                      <a:solidFill>
+                        <a:schemeClr val="bg1"/>
+                      </a:solidFill>
+                      <a:prstDash val="solid"/>
+                      <a:round/>
+                      <a:headEnd type="none" w="med" len="med"/>
+                      <a:tailEnd type="none" w="med" len="med"/>
+                    </a:lnB>
+                    <a:solidFill>
+                      <a:schemeClr val="bg1"/>
+                    </a:solidFill>
+                  </a:tcPr>
+                </a:tc>
+              </a:tr>
+              <a:tr h="813656">
+                <a:tc>
+                  <a:txBody>
+                    <a:bodyPr/>
+                    <a:lstStyle/>
+                    <a:p>
+                      <a:r>
+                        <a:rPr lang="ru-RU" sz="1400" dirty="0"/>
+                        <a:t>%</a:t>
+                      </a:r>
+                    </a:p>
+                  </a:txBody>
+                  <a:tcPr marL="50854" marR="50854" marT="25427" marB="25427" anchor="ctr">
+                    <a:lnL w="12700" cap="flat" cmpd="sng" algn="ctr">
+                      <a:solidFill>
+                        <a:schemeClr val="bg1"/>
+                      </a:solidFill>
+                      <a:prstDash val="solid"/>
+                      <a:round/>
+                      <a:headEnd type="none" w="med" len="med"/>
+                      <a:tailEnd type="none" w="med" len="med"/>
+                    </a:lnL>
+                    <a:lnR w="12700" cap="flat" cmpd="sng" algn="ctr">
+                      <a:solidFill>
+                        <a:schemeClr val="bg1"/>
+                      </a:solidFill>
+                      <a:prstDash val="solid"/>
+                      <a:round/>
+                      <a:headEnd type="none" w="med" len="med"/>
+                      <a:tailEnd type="none" w="med" len="med"/>
+                    </a:lnR>
+                    <a:lnT w="12700" cap="flat" cmpd="sng" algn="ctr">
+                      <a:solidFill>
+                        <a:schemeClr val="bg1"/>
+                      </a:solidFill>
+                      <a:prstDash val="solid"/>
+                      <a:round/>
+                      <a:headEnd type="none" w="med" len="med"/>
+                      <a:tailEnd type="none" w="med" len="med"/>
+                    </a:lnT>
+                    <a:lnB w="12700" cap="flat" cmpd="sng" algn="ctr">
+                      <a:solidFill>
+                        <a:schemeClr val="bg1"/>
+                      </a:solidFill>
+                      <a:prstDash val="solid"/>
+                      <a:round/>
+                      <a:headEnd type="none" w="med" len="med"/>
+                      <a:tailEnd type="none" w="med" len="med"/>
+                    </a:lnB>
+                  </a:tcPr>
+                </a:tc>
+                <a:tc>
+                  <a:txBody>
+                    <a:bodyPr/>
+                    <a:lstStyle/>
+                    <a:p>
+                      <a:r>
+                        <a:rPr lang="ru-RU" sz="1400" dirty="0" smtClean="0"/>
+                        <a:t>Строка</a:t>
+                      </a:r>
+                      <a:r>
+                        <a:rPr lang="ru-RU" sz="1400" baseline="0" dirty="0" smtClean="0"/>
+                        <a:t> любой длины.</a:t>
+                      </a:r>
+                      <a:endParaRPr lang="en-US" sz="1400" dirty="0"/>
+                    </a:p>
+                  </a:txBody>
+                  <a:tcPr marL="50854" marR="50854" marT="25427" marB="25427" anchor="ctr">
+                    <a:lnL w="12700" cap="flat" cmpd="sng" algn="ctr">
+                      <a:solidFill>
+                        <a:schemeClr val="bg1"/>
+                      </a:solidFill>
+                      <a:prstDash val="solid"/>
+                      <a:round/>
+                      <a:headEnd type="none" w="med" len="med"/>
+                      <a:tailEnd type="none" w="med" len="med"/>
+                    </a:lnL>
+                    <a:lnR w="12700" cap="flat" cmpd="sng" algn="ctr">
+                      <a:solidFill>
+                        <a:schemeClr val="bg1"/>
+                      </a:solidFill>
+                      <a:prstDash val="solid"/>
+                      <a:round/>
+                      <a:headEnd type="none" w="med" len="med"/>
+                      <a:tailEnd type="none" w="med" len="med"/>
+                    </a:lnR>
+                    <a:lnT w="12700" cap="flat" cmpd="sng" algn="ctr">
+                      <a:solidFill>
+                        <a:schemeClr val="bg1"/>
+                      </a:solidFill>
+                      <a:prstDash val="solid"/>
+                      <a:round/>
+                      <a:headEnd type="none" w="med" len="med"/>
+                      <a:tailEnd type="none" w="med" len="med"/>
+                    </a:lnT>
+                    <a:lnB w="12700" cap="flat" cmpd="sng" algn="ctr">
+                      <a:solidFill>
+                        <a:schemeClr val="bg1"/>
+                      </a:solidFill>
+                      <a:prstDash val="solid"/>
+                      <a:round/>
+                      <a:headEnd type="none" w="med" len="med"/>
+                      <a:tailEnd type="none" w="med" len="med"/>
+                    </a:lnB>
+                  </a:tcPr>
+                </a:tc>
+                <a:tc>
+                  <a:txBody>
+                    <a:bodyPr/>
+                    <a:lstStyle/>
+                    <a:p>
+                      <a:r>
+                        <a:rPr lang="en-US" sz="1400" dirty="0"/>
+                        <a:t>WHERE title LIKE '%computer%' </a:t>
+                      </a:r>
+                      <a:r>
+                        <a:rPr lang="ru-RU" sz="1400" dirty="0" smtClean="0"/>
+                        <a:t>истина</a:t>
+                      </a:r>
+                      <a:r>
+                        <a:rPr lang="ru-RU" sz="1400" baseline="0" dirty="0" smtClean="0"/>
+                        <a:t> для всех строк содержащих слово </a:t>
+                      </a:r>
+                      <a:r>
+                        <a:rPr lang="en-US" sz="1400" baseline="0" dirty="0" smtClean="0"/>
+                        <a:t>computer </a:t>
+                      </a:r>
+                      <a:r>
+                        <a:rPr lang="ru-RU" sz="1400" baseline="0" dirty="0" smtClean="0"/>
+                        <a:t>в любом месте.</a:t>
+                      </a:r>
+                      <a:endParaRPr lang="en-US" sz="1400" dirty="0"/>
+                    </a:p>
+                  </a:txBody>
+                  <a:tcPr marL="50854" marR="50854" marT="25427" marB="25427" anchor="ctr">
+                    <a:lnL w="12700" cap="flat" cmpd="sng" algn="ctr">
+                      <a:solidFill>
+                        <a:schemeClr val="bg1"/>
+                      </a:solidFill>
+                      <a:prstDash val="solid"/>
+                      <a:round/>
+                      <a:headEnd type="none" w="med" len="med"/>
+                      <a:tailEnd type="none" w="med" len="med"/>
+                    </a:lnL>
+                    <a:lnR w="12700" cap="flat" cmpd="sng" algn="ctr">
+                      <a:solidFill>
+                        <a:schemeClr val="bg1"/>
+                      </a:solidFill>
+                      <a:prstDash val="solid"/>
+                      <a:round/>
+                      <a:headEnd type="none" w="med" len="med"/>
+                      <a:tailEnd type="none" w="med" len="med"/>
+                    </a:lnR>
+                    <a:lnT w="12700" cap="flat" cmpd="sng" algn="ctr">
+                      <a:solidFill>
+                        <a:schemeClr val="bg1"/>
+                      </a:solidFill>
+                      <a:prstDash val="solid"/>
+                      <a:round/>
+                      <a:headEnd type="none" w="med" len="med"/>
+                      <a:tailEnd type="none" w="med" len="med"/>
+                    </a:lnT>
+                    <a:lnB w="12700" cap="flat" cmpd="sng" algn="ctr">
+                      <a:solidFill>
+                        <a:schemeClr val="bg1"/>
+                      </a:solidFill>
+                      <a:prstDash val="solid"/>
+                      <a:round/>
+                      <a:headEnd type="none" w="med" len="med"/>
+                      <a:tailEnd type="none" w="med" len="med"/>
+                    </a:lnB>
+                  </a:tcPr>
+                </a:tc>
+              </a:tr>
+              <a:tr h="813656">
+                <a:tc>
+                  <a:txBody>
+                    <a:bodyPr/>
+                    <a:lstStyle/>
+                    <a:p>
+                      <a:r>
+                        <a:rPr lang="en-US" sz="1400" dirty="0"/>
+                        <a:t>_ </a:t>
+                      </a:r>
+                      <a:r>
+                        <a:rPr lang="en-US" sz="1400" dirty="0" smtClean="0"/>
+                        <a:t>(</a:t>
+                      </a:r>
+                      <a:r>
+                        <a:rPr lang="ru-RU" sz="1400" dirty="0" smtClean="0"/>
+                        <a:t>нижнее подчеркивание</a:t>
+                      </a:r>
+                      <a:r>
+                        <a:rPr lang="en-US" sz="1400" dirty="0" smtClean="0"/>
+                        <a:t>)</a:t>
+                      </a:r>
+                      <a:endParaRPr lang="en-US" sz="1400" dirty="0"/>
+                    </a:p>
+                  </a:txBody>
+                  <a:tcPr marL="50854" marR="50854" marT="25427" marB="25427" anchor="ctr">
+                    <a:lnL w="12700" cap="flat" cmpd="sng" algn="ctr">
+                      <a:solidFill>
+                        <a:schemeClr val="bg1"/>
+                      </a:solidFill>
+                      <a:prstDash val="solid"/>
+                      <a:round/>
+                      <a:headEnd type="none" w="med" len="med"/>
+                      <a:tailEnd type="none" w="med" len="med"/>
+                    </a:lnL>
+                    <a:lnR w="12700" cap="flat" cmpd="sng" algn="ctr">
+                      <a:solidFill>
+                        <a:schemeClr val="bg1"/>
+                      </a:solidFill>
+                      <a:prstDash val="solid"/>
+                      <a:round/>
+                      <a:headEnd type="none" w="med" len="med"/>
+                      <a:tailEnd type="none" w="med" len="med"/>
+                    </a:lnR>
+                    <a:lnT w="12700" cap="flat" cmpd="sng" algn="ctr">
+                      <a:solidFill>
+                        <a:schemeClr val="bg1"/>
+                      </a:solidFill>
+                      <a:prstDash val="solid"/>
+                      <a:round/>
+                      <a:headEnd type="none" w="med" len="med"/>
+                      <a:tailEnd type="none" w="med" len="med"/>
+                    </a:lnT>
+                    <a:lnB w="12700" cap="flat" cmpd="sng" algn="ctr">
+                      <a:solidFill>
+                        <a:schemeClr val="bg1"/>
+                      </a:solidFill>
+                      <a:prstDash val="solid"/>
+                      <a:round/>
+                      <a:headEnd type="none" w="med" len="med"/>
+                      <a:tailEnd type="none" w="med" len="med"/>
+                    </a:lnB>
+                  </a:tcPr>
+                </a:tc>
+                <a:tc>
+                  <a:txBody>
+                    <a:bodyPr/>
+                    <a:lstStyle/>
+                    <a:p>
+                      <a:r>
+                        <a:rPr lang="ru-RU" sz="1400" dirty="0" smtClean="0"/>
+                        <a:t>Один любой символ</a:t>
+                      </a:r>
+                      <a:r>
+                        <a:rPr lang="en-US" sz="1400" dirty="0" smtClean="0"/>
+                        <a:t>.</a:t>
+                      </a:r>
+                      <a:endParaRPr lang="en-US" sz="1400" dirty="0"/>
+                    </a:p>
+                  </a:txBody>
+                  <a:tcPr marL="50854" marR="50854" marT="25427" marB="25427" anchor="ctr">
+                    <a:lnL w="12700" cap="flat" cmpd="sng" algn="ctr">
+                      <a:solidFill>
+                        <a:schemeClr val="bg1"/>
+                      </a:solidFill>
+                      <a:prstDash val="solid"/>
+                      <a:round/>
+                      <a:headEnd type="none" w="med" len="med"/>
+                      <a:tailEnd type="none" w="med" len="med"/>
+                    </a:lnL>
+                    <a:lnR w="12700" cap="flat" cmpd="sng" algn="ctr">
+                      <a:solidFill>
+                        <a:schemeClr val="bg1"/>
+                      </a:solidFill>
+                      <a:prstDash val="solid"/>
+                      <a:round/>
+                      <a:headEnd type="none" w="med" len="med"/>
+                      <a:tailEnd type="none" w="med" len="med"/>
+                    </a:lnR>
+                    <a:lnT w="12700" cap="flat" cmpd="sng" algn="ctr">
+                      <a:solidFill>
+                        <a:schemeClr val="bg1"/>
+                      </a:solidFill>
+                      <a:prstDash val="solid"/>
+                      <a:round/>
+                      <a:headEnd type="none" w="med" len="med"/>
+                      <a:tailEnd type="none" w="med" len="med"/>
+                    </a:lnT>
+                    <a:lnB w="12700" cap="flat" cmpd="sng" algn="ctr">
+                      <a:solidFill>
+                        <a:schemeClr val="bg1"/>
+                      </a:solidFill>
+                      <a:prstDash val="solid"/>
+                      <a:round/>
+                      <a:headEnd type="none" w="med" len="med"/>
+                      <a:tailEnd type="none" w="med" len="med"/>
+                    </a:lnB>
+                  </a:tcPr>
+                </a:tc>
+                <a:tc>
+                  <a:txBody>
+                    <a:bodyPr/>
+                    <a:lstStyle/>
+                    <a:p>
+                      <a:r>
+                        <a:rPr lang="en-US" sz="1400" dirty="0"/>
+                        <a:t>WHERE </a:t>
+                      </a:r>
+                      <a:r>
+                        <a:rPr lang="en-US" sz="1400" dirty="0" err="1"/>
+                        <a:t>au_fname</a:t>
+                      </a:r>
+                      <a:r>
+                        <a:rPr lang="en-US" sz="1400" dirty="0"/>
+                        <a:t> LIKE '_</a:t>
+                      </a:r>
+                      <a:r>
+                        <a:rPr lang="en-US" sz="1400" dirty="0" err="1"/>
+                        <a:t>ean</a:t>
+                      </a:r>
+                      <a:r>
+                        <a:rPr lang="en-US" sz="1400" dirty="0"/>
+                        <a:t>' </a:t>
+                      </a:r>
+                      <a:r>
+                        <a:rPr lang="ru-RU" sz="1400" dirty="0" smtClean="0"/>
+                        <a:t>истина для всех строк длиной в 4 символа и заканчивающихся на </a:t>
+                      </a:r>
+                      <a:r>
+                        <a:rPr lang="en-US" sz="1400" dirty="0" err="1" smtClean="0"/>
+                        <a:t>ean</a:t>
+                      </a:r>
+                      <a:r>
+                        <a:rPr lang="en-US" sz="1400" dirty="0" smtClean="0"/>
+                        <a:t> </a:t>
+                      </a:r>
+                      <a:r>
+                        <a:rPr lang="en-US" sz="1400" dirty="0"/>
+                        <a:t>(Dean, Sean, </a:t>
+                      </a:r>
+                      <a:r>
+                        <a:rPr lang="ru-RU" sz="1400" dirty="0" smtClean="0"/>
+                        <a:t>и т.д.</a:t>
+                      </a:r>
+                      <a:r>
+                        <a:rPr lang="en-US" sz="1400" dirty="0" smtClean="0"/>
+                        <a:t>).</a:t>
+                      </a:r>
+                      <a:endParaRPr lang="en-US" sz="1400" dirty="0"/>
+                    </a:p>
+                  </a:txBody>
+                  <a:tcPr marL="50854" marR="50854" marT="25427" marB="25427" anchor="ctr">
+                    <a:lnL w="12700" cap="flat" cmpd="sng" algn="ctr">
+                      <a:solidFill>
+                        <a:schemeClr val="bg1"/>
+                      </a:solidFill>
+                      <a:prstDash val="solid"/>
+                      <a:round/>
+                      <a:headEnd type="none" w="med" len="med"/>
+                      <a:tailEnd type="none" w="med" len="med"/>
+                    </a:lnL>
+                    <a:lnR w="12700" cap="flat" cmpd="sng" algn="ctr">
+                      <a:solidFill>
+                        <a:schemeClr val="bg1"/>
+                      </a:solidFill>
+                      <a:prstDash val="solid"/>
+                      <a:round/>
+                      <a:headEnd type="none" w="med" len="med"/>
+                      <a:tailEnd type="none" w="med" len="med"/>
+                    </a:lnR>
+                    <a:lnT w="12700" cap="flat" cmpd="sng" algn="ctr">
+                      <a:solidFill>
+                        <a:schemeClr val="bg1"/>
+                      </a:solidFill>
+                      <a:prstDash val="solid"/>
+                      <a:round/>
+                      <a:headEnd type="none" w="med" len="med"/>
+                      <a:tailEnd type="none" w="med" len="med"/>
+                    </a:lnT>
+                    <a:lnB w="12700" cap="flat" cmpd="sng" algn="ctr">
+                      <a:solidFill>
+                        <a:schemeClr val="bg1"/>
+                      </a:solidFill>
+                      <a:prstDash val="solid"/>
+                      <a:round/>
+                      <a:headEnd type="none" w="med" len="med"/>
+                      <a:tailEnd type="none" w="med" len="med"/>
+                    </a:lnB>
+                  </a:tcPr>
+                </a:tc>
+              </a:tr>
+              <a:tr h="1618236">
+                <a:tc>
+                  <a:txBody>
+                    <a:bodyPr/>
+                    <a:lstStyle/>
+                    <a:p>
+                      <a:r>
+                        <a:rPr lang="ru-RU" sz="1400"/>
+                        <a:t>[ ]</a:t>
+                      </a:r>
+                    </a:p>
+                  </a:txBody>
+                  <a:tcPr marL="50854" marR="50854" marT="25427" marB="25427" anchor="ctr">
+                    <a:lnL w="12700" cap="flat" cmpd="sng" algn="ctr">
+                      <a:solidFill>
+                        <a:schemeClr val="bg1"/>
+                      </a:solidFill>
+                      <a:prstDash val="solid"/>
+                      <a:round/>
+                      <a:headEnd type="none" w="med" len="med"/>
+                      <a:tailEnd type="none" w="med" len="med"/>
+                    </a:lnL>
+                    <a:lnR w="12700" cap="flat" cmpd="sng" algn="ctr">
+                      <a:solidFill>
+                        <a:schemeClr val="bg1"/>
+                      </a:solidFill>
+                      <a:prstDash val="solid"/>
+                      <a:round/>
+                      <a:headEnd type="none" w="med" len="med"/>
+                      <a:tailEnd type="none" w="med" len="med"/>
+                    </a:lnR>
+                    <a:lnT w="12700" cap="flat" cmpd="sng" algn="ctr">
+                      <a:solidFill>
+                        <a:schemeClr val="bg1"/>
+                      </a:solidFill>
+                      <a:prstDash val="solid"/>
+                      <a:round/>
+                      <a:headEnd type="none" w="med" len="med"/>
+                      <a:tailEnd type="none" w="med" len="med"/>
+                    </a:lnT>
+                    <a:lnB w="12700" cap="flat" cmpd="sng" algn="ctr">
+                      <a:solidFill>
+                        <a:schemeClr val="bg1"/>
+                      </a:solidFill>
+                      <a:prstDash val="solid"/>
+                      <a:round/>
+                      <a:headEnd type="none" w="med" len="med"/>
+                      <a:tailEnd type="none" w="med" len="med"/>
+                    </a:lnB>
+                  </a:tcPr>
+                </a:tc>
+                <a:tc>
+                  <a:txBody>
+                    <a:bodyPr/>
+                    <a:lstStyle/>
+                    <a:p>
+                      <a:r>
+                        <a:rPr lang="ru-RU" sz="1400" dirty="0" smtClean="0"/>
+                        <a:t>Любой символ из указанного диапазона </a:t>
+                      </a:r>
+                      <a:r>
+                        <a:rPr lang="en-US" sz="1400" dirty="0" smtClean="0"/>
+                        <a:t>([a-f])</a:t>
+                      </a:r>
+                      <a:r>
+                        <a:rPr lang="ru-RU" sz="1400" dirty="0" smtClean="0"/>
+                        <a:t> </a:t>
+                      </a:r>
+                      <a:r>
+                        <a:rPr lang="ru-RU" sz="1400" dirty="0" smtClean="0"/>
+                        <a:t>или множества</a:t>
+                      </a:r>
+                      <a:r>
+                        <a:rPr lang="ru-RU" sz="1400" baseline="0" dirty="0" smtClean="0"/>
+                        <a:t> </a:t>
+                      </a:r>
+                      <a:r>
+                        <a:rPr lang="en-US" sz="1400" dirty="0" smtClean="0"/>
+                        <a:t>([</a:t>
+                      </a:r>
+                      <a:r>
+                        <a:rPr lang="en-US" sz="1400" dirty="0" err="1"/>
+                        <a:t>abcdef</a:t>
+                      </a:r>
+                      <a:r>
+                        <a:rPr lang="en-US" sz="1400" dirty="0" smtClean="0"/>
+                        <a:t>]).</a:t>
+                      </a:r>
+                      <a:r>
+                        <a:rPr lang="ru-RU" sz="1400" dirty="0" smtClean="0"/>
+                        <a:t> При</a:t>
+                      </a:r>
+                      <a:r>
+                        <a:rPr lang="ru-RU" sz="1400" baseline="0" dirty="0" smtClean="0"/>
+                        <a:t> поиске с помощью </a:t>
+                      </a:r>
+                      <a:r>
+                        <a:rPr lang="ru-RU" sz="1400" dirty="0" smtClean="0"/>
+                        <a:t>диапазонов включаемые символы зависят</a:t>
+                      </a:r>
+                      <a:r>
+                        <a:rPr lang="ru-RU" sz="1400" baseline="0" dirty="0" smtClean="0"/>
+                        <a:t> от настроек </a:t>
+                      </a:r>
+                      <a:r>
+                        <a:rPr lang="en-US" sz="1400" baseline="0" dirty="0" smtClean="0"/>
+                        <a:t>collation.</a:t>
+                      </a:r>
+                      <a:endParaRPr lang="en-US" sz="1400" dirty="0"/>
+                    </a:p>
+                  </a:txBody>
+                  <a:tcPr marL="50854" marR="50854" marT="25427" marB="25427" anchor="ctr">
+                    <a:lnL w="12700" cap="flat" cmpd="sng" algn="ctr">
+                      <a:solidFill>
+                        <a:schemeClr val="bg1"/>
+                      </a:solidFill>
+                      <a:prstDash val="solid"/>
+                      <a:round/>
+                      <a:headEnd type="none" w="med" len="med"/>
+                      <a:tailEnd type="none" w="med" len="med"/>
+                    </a:lnL>
+                    <a:lnR w="12700" cap="flat" cmpd="sng" algn="ctr">
+                      <a:solidFill>
+                        <a:schemeClr val="bg1"/>
+                      </a:solidFill>
+                      <a:prstDash val="solid"/>
+                      <a:round/>
+                      <a:headEnd type="none" w="med" len="med"/>
+                      <a:tailEnd type="none" w="med" len="med"/>
+                    </a:lnR>
+                    <a:lnT w="12700" cap="flat" cmpd="sng" algn="ctr">
+                      <a:solidFill>
+                        <a:schemeClr val="bg1"/>
+                      </a:solidFill>
+                      <a:prstDash val="solid"/>
+                      <a:round/>
+                      <a:headEnd type="none" w="med" len="med"/>
+                      <a:tailEnd type="none" w="med" len="med"/>
+                    </a:lnT>
+                    <a:lnB w="12700" cap="flat" cmpd="sng" algn="ctr">
+                      <a:solidFill>
+                        <a:schemeClr val="bg1"/>
+                      </a:solidFill>
+                      <a:prstDash val="solid"/>
+                      <a:round/>
+                      <a:headEnd type="none" w="med" len="med"/>
+                      <a:tailEnd type="none" w="med" len="med"/>
+                    </a:lnB>
+                  </a:tcPr>
+                </a:tc>
+                <a:tc>
+                  <a:txBody>
+                    <a:bodyPr/>
+                    <a:lstStyle/>
+                    <a:p>
+                      <a:r>
+                        <a:rPr lang="en-US" sz="1400" dirty="0"/>
+                        <a:t>WHERE </a:t>
+                      </a:r>
+                      <a:r>
+                        <a:rPr lang="en-US" sz="1400" dirty="0" err="1"/>
+                        <a:t>au_lname</a:t>
+                      </a:r>
+                      <a:r>
+                        <a:rPr lang="en-US" sz="1400" dirty="0"/>
+                        <a:t> LIKE '[C-P]</a:t>
+                      </a:r>
+                      <a:r>
+                        <a:rPr lang="en-US" sz="1400" dirty="0" err="1"/>
+                        <a:t>arsen</a:t>
+                      </a:r>
+                      <a:r>
+                        <a:rPr lang="en-US" sz="1400" dirty="0"/>
+                        <a:t>' </a:t>
+                      </a:r>
+                      <a:r>
+                        <a:rPr lang="ru-RU" sz="1400" dirty="0" smtClean="0"/>
+                        <a:t>истина</a:t>
+                      </a:r>
+                      <a:r>
+                        <a:rPr lang="en-US" sz="1400" dirty="0" smtClean="0"/>
+                        <a:t> </a:t>
+                      </a:r>
+                      <a:r>
+                        <a:rPr lang="ru-RU" sz="1400" dirty="0" smtClean="0"/>
+                        <a:t>для</a:t>
+                      </a:r>
+                      <a:r>
+                        <a:rPr lang="ru-RU" sz="1400" baseline="0" dirty="0" smtClean="0"/>
+                        <a:t> строк</a:t>
+                      </a:r>
+                      <a:r>
+                        <a:rPr lang="en-US" sz="1400" dirty="0" smtClean="0"/>
+                        <a:t> </a:t>
+                      </a:r>
+                      <a:r>
+                        <a:rPr lang="ru-RU" sz="1400" dirty="0" smtClean="0"/>
+                        <a:t>начинающих</a:t>
+                      </a:r>
+                      <a:r>
+                        <a:rPr lang="en-US" sz="1400" dirty="0" smtClean="0"/>
+                        <a:t>c</a:t>
+                      </a:r>
+                      <a:r>
+                        <a:rPr lang="ru-RU" sz="1400" dirty="0" smtClean="0"/>
+                        <a:t>я</a:t>
+                      </a:r>
+                      <a:r>
+                        <a:rPr lang="ru-RU" sz="1400" baseline="0" dirty="0" smtClean="0"/>
+                        <a:t> с символа в диапазоне от </a:t>
+                      </a:r>
+                      <a:r>
+                        <a:rPr lang="en-US" sz="1400" dirty="0" smtClean="0"/>
+                        <a:t>C </a:t>
+                      </a:r>
+                      <a:r>
+                        <a:rPr lang="ru-RU" sz="1400" dirty="0" smtClean="0"/>
+                        <a:t>до </a:t>
+                      </a:r>
+                      <a:r>
+                        <a:rPr lang="en-US" sz="1400" dirty="0" smtClean="0"/>
+                        <a:t>P </a:t>
+                      </a:r>
+                      <a:r>
+                        <a:rPr lang="ru-RU" sz="1400" dirty="0" smtClean="0"/>
+                        <a:t>и заканчивающихся на </a:t>
+                      </a:r>
+                      <a:r>
+                        <a:rPr lang="en-US" sz="1400" dirty="0" err="1" smtClean="0"/>
+                        <a:t>arsen</a:t>
+                      </a:r>
+                      <a:r>
+                        <a:rPr lang="ru-RU" sz="1400" dirty="0" smtClean="0"/>
+                        <a:t> (</a:t>
+                      </a:r>
+                      <a:r>
+                        <a:rPr lang="en-US" sz="1400" dirty="0" smtClean="0"/>
+                        <a:t>Carsen</a:t>
+                      </a:r>
+                      <a:r>
+                        <a:rPr lang="en-US" sz="1400" dirty="0"/>
+                        <a:t>, Larsen, </a:t>
+                      </a:r>
+                      <a:r>
+                        <a:rPr lang="en-US" sz="1400" dirty="0" err="1"/>
+                        <a:t>Karsen</a:t>
+                      </a:r>
+                      <a:r>
+                        <a:rPr lang="en-US" sz="1400" dirty="0"/>
+                        <a:t>, </a:t>
+                      </a:r>
+                      <a:r>
+                        <a:rPr lang="ru-RU" sz="1400" dirty="0" smtClean="0"/>
+                        <a:t>и т.д.)</a:t>
+                      </a:r>
+                      <a:endParaRPr lang="en-US" sz="1400" dirty="0"/>
+                    </a:p>
+                  </a:txBody>
+                  <a:tcPr marL="50854" marR="50854" marT="25427" marB="25427" anchor="ctr">
+                    <a:lnL w="12700" cap="flat" cmpd="sng" algn="ctr">
+                      <a:solidFill>
+                        <a:schemeClr val="bg1"/>
+                      </a:solidFill>
+                      <a:prstDash val="solid"/>
+                      <a:round/>
+                      <a:headEnd type="none" w="med" len="med"/>
+                      <a:tailEnd type="none" w="med" len="med"/>
+                    </a:lnL>
+                    <a:lnR w="12700" cap="flat" cmpd="sng" algn="ctr">
+                      <a:solidFill>
+                        <a:schemeClr val="bg1"/>
+                      </a:solidFill>
+                      <a:prstDash val="solid"/>
+                      <a:round/>
+                      <a:headEnd type="none" w="med" len="med"/>
+                      <a:tailEnd type="none" w="med" len="med"/>
+                    </a:lnR>
+                    <a:lnT w="12700" cap="flat" cmpd="sng" algn="ctr">
+                      <a:solidFill>
+                        <a:schemeClr val="bg1"/>
+                      </a:solidFill>
+                      <a:prstDash val="solid"/>
+                      <a:round/>
+                      <a:headEnd type="none" w="med" len="med"/>
+                      <a:tailEnd type="none" w="med" len="med"/>
+                    </a:lnT>
+                    <a:lnB w="12700" cap="flat" cmpd="sng" algn="ctr">
+                      <a:solidFill>
+                        <a:schemeClr val="bg1"/>
+                      </a:solidFill>
+                      <a:prstDash val="solid"/>
+                      <a:round/>
+                      <a:headEnd type="none" w="med" len="med"/>
+                      <a:tailEnd type="none" w="med" len="med"/>
+                    </a:lnB>
+                  </a:tcPr>
+                </a:tc>
+              </a:tr>
+              <a:tr h="813656">
+                <a:tc>
+                  <a:txBody>
+                    <a:bodyPr/>
+                    <a:lstStyle/>
+                    <a:p>
+                      <a:r>
+                        <a:rPr lang="ru-RU" sz="1400"/>
+                        <a:t>[^]</a:t>
+                      </a:r>
+                    </a:p>
+                  </a:txBody>
+                  <a:tcPr marL="50854" marR="50854" marT="25427" marB="25427" anchor="ctr">
+                    <a:lnL w="12700" cap="flat" cmpd="sng" algn="ctr">
+                      <a:solidFill>
+                        <a:schemeClr val="bg1"/>
+                      </a:solidFill>
+                      <a:prstDash val="solid"/>
+                      <a:round/>
+                      <a:headEnd type="none" w="med" len="med"/>
+                      <a:tailEnd type="none" w="med" len="med"/>
+                    </a:lnL>
+                    <a:lnR w="12700" cap="flat" cmpd="sng" algn="ctr">
+                      <a:solidFill>
+                        <a:schemeClr val="bg1"/>
+                      </a:solidFill>
+                      <a:prstDash val="solid"/>
+                      <a:round/>
+                      <a:headEnd type="none" w="med" len="med"/>
+                      <a:tailEnd type="none" w="med" len="med"/>
+                    </a:lnR>
+                    <a:lnT w="12700" cap="flat" cmpd="sng" algn="ctr">
+                      <a:solidFill>
+                        <a:schemeClr val="bg1"/>
+                      </a:solidFill>
+                      <a:prstDash val="solid"/>
+                      <a:round/>
+                      <a:headEnd type="none" w="med" len="med"/>
+                      <a:tailEnd type="none" w="med" len="med"/>
+                    </a:lnT>
+                    <a:lnB w="12700" cap="flat" cmpd="sng" algn="ctr">
+                      <a:solidFill>
+                        <a:schemeClr val="bg1"/>
+                      </a:solidFill>
+                      <a:prstDash val="solid"/>
+                      <a:round/>
+                      <a:headEnd type="none" w="med" len="med"/>
+                      <a:tailEnd type="none" w="med" len="med"/>
+                    </a:lnB>
+                  </a:tcPr>
+                </a:tc>
+                <a:tc>
+                  <a:txBody>
+                    <a:bodyPr/>
+                    <a:lstStyle/>
+                    <a:p>
+                      <a:r>
+                        <a:rPr lang="ru-RU" sz="1400" dirty="0" smtClean="0"/>
+                        <a:t>Любой символ отсутствующий</a:t>
+                      </a:r>
+                      <a:r>
+                        <a:rPr lang="ru-RU" sz="1400" baseline="0" dirty="0" smtClean="0"/>
+                        <a:t> в</a:t>
+                      </a:r>
+                      <a:r>
+                        <a:rPr lang="ru-RU" sz="1400" dirty="0" smtClean="0"/>
+                        <a:t> указанном диапазоне </a:t>
+                      </a:r>
+                      <a:r>
+                        <a:rPr lang="en-US" sz="1400" dirty="0" smtClean="0"/>
+                        <a:t>([^a-f])</a:t>
+                      </a:r>
+                      <a:r>
+                        <a:rPr lang="ru-RU" sz="1400" dirty="0" smtClean="0"/>
+                        <a:t> или множестве</a:t>
+                      </a:r>
+                      <a:r>
+                        <a:rPr lang="ru-RU" sz="1400" baseline="0" dirty="0" smtClean="0"/>
+                        <a:t> </a:t>
+                      </a:r>
+                      <a:r>
+                        <a:rPr lang="en-US" sz="1400" dirty="0" smtClean="0"/>
+                        <a:t>([^</a:t>
+                      </a:r>
+                      <a:r>
+                        <a:rPr lang="en-US" sz="1400" dirty="0" err="1" smtClean="0"/>
+                        <a:t>abcdef</a:t>
+                      </a:r>
+                      <a:r>
+                        <a:rPr lang="en-US" sz="1400" dirty="0" smtClean="0"/>
+                        <a:t>]).</a:t>
+                      </a:r>
+                      <a:endParaRPr lang="en-US" sz="1400" dirty="0"/>
+                    </a:p>
+                  </a:txBody>
+                  <a:tcPr marL="50854" marR="50854" marT="25427" marB="25427" anchor="ctr">
+                    <a:lnL w="12700" cap="flat" cmpd="sng" algn="ctr">
+                      <a:solidFill>
+                        <a:schemeClr val="bg1"/>
+                      </a:solidFill>
+                      <a:prstDash val="solid"/>
+                      <a:round/>
+                      <a:headEnd type="none" w="med" len="med"/>
+                      <a:tailEnd type="none" w="med" len="med"/>
+                    </a:lnL>
+                    <a:lnR w="12700" cap="flat" cmpd="sng" algn="ctr">
+                      <a:solidFill>
+                        <a:schemeClr val="bg1"/>
+                      </a:solidFill>
+                      <a:prstDash val="solid"/>
+                      <a:round/>
+                      <a:headEnd type="none" w="med" len="med"/>
+                      <a:tailEnd type="none" w="med" len="med"/>
+                    </a:lnR>
+                    <a:lnT w="12700" cap="flat" cmpd="sng" algn="ctr">
+                      <a:solidFill>
+                        <a:schemeClr val="bg1"/>
+                      </a:solidFill>
+                      <a:prstDash val="solid"/>
+                      <a:round/>
+                      <a:headEnd type="none" w="med" len="med"/>
+                      <a:tailEnd type="none" w="med" len="med"/>
+                    </a:lnT>
+                    <a:lnB w="12700" cap="flat" cmpd="sng" algn="ctr">
+                      <a:solidFill>
+                        <a:schemeClr val="bg1"/>
+                      </a:solidFill>
+                      <a:prstDash val="solid"/>
+                      <a:round/>
+                      <a:headEnd type="none" w="med" len="med"/>
+                      <a:tailEnd type="none" w="med" len="med"/>
+                    </a:lnB>
+                  </a:tcPr>
+                </a:tc>
+                <a:tc>
+                  <a:txBody>
+                    <a:bodyPr/>
+                    <a:lstStyle/>
+                    <a:p>
+                      <a:r>
+                        <a:rPr lang="en-US" sz="1400" dirty="0"/>
+                        <a:t>WHERE </a:t>
+                      </a:r>
+                      <a:r>
+                        <a:rPr lang="en-US" sz="1400" dirty="0" err="1"/>
+                        <a:t>au_lname</a:t>
+                      </a:r>
+                      <a:r>
+                        <a:rPr lang="en-US" sz="1400" dirty="0"/>
+                        <a:t> LIKE 'de[^l]%' all author last names starting with de and where the following letter is not l.</a:t>
+                      </a:r>
+                    </a:p>
+                  </a:txBody>
+                  <a:tcPr marL="50854" marR="50854" marT="25427" marB="25427" anchor="ctr">
+                    <a:lnL w="12700" cap="flat" cmpd="sng" algn="ctr">
+                      <a:solidFill>
+                        <a:schemeClr val="bg1"/>
+                      </a:solidFill>
+                      <a:prstDash val="solid"/>
+                      <a:round/>
+                      <a:headEnd type="none" w="med" len="med"/>
+                      <a:tailEnd type="none" w="med" len="med"/>
+                    </a:lnL>
+                    <a:lnR w="12700" cap="flat" cmpd="sng" algn="ctr">
+                      <a:solidFill>
+                        <a:schemeClr val="bg1"/>
+                      </a:solidFill>
+                      <a:prstDash val="solid"/>
+                      <a:round/>
+                      <a:headEnd type="none" w="med" len="med"/>
+                      <a:tailEnd type="none" w="med" len="med"/>
+                    </a:lnR>
+                    <a:lnT w="12700" cap="flat" cmpd="sng" algn="ctr">
+                      <a:solidFill>
+                        <a:schemeClr val="bg1"/>
+                      </a:solidFill>
+                      <a:prstDash val="solid"/>
+                      <a:round/>
+                      <a:headEnd type="none" w="med" len="med"/>
+                      <a:tailEnd type="none" w="med" len="med"/>
+                    </a:lnT>
+                    <a:lnB w="12700" cap="flat" cmpd="sng" algn="ctr">
+                      <a:solidFill>
+                        <a:schemeClr val="bg1"/>
+                      </a:solidFill>
+                      <a:prstDash val="solid"/>
+                      <a:round/>
+                      <a:headEnd type="none" w="med" len="med"/>
+                      <a:tailEnd type="none" w="med" len="med"/>
+                    </a:lnB>
+                  </a:tcPr>
+                </a:tc>
+              </a:tr>
+            </a:tbl>
+          </a:graphicData>
+        </a:graphic>
+      </p:graphicFrame>
     </p:spTree>
     <p:extLst>
       <p:ext uri="{BB962C8B-B14F-4D97-AF65-F5344CB8AC3E}">
-        <p14:creationId xmlns:p14="http://schemas.microsoft.com/office/powerpoint/2010/main" val="600660360"/>
+        <p14:creationId xmlns:p14="http://schemas.microsoft.com/office/powerpoint/2010/main" val="534627708"/>
       </p:ext>
     </p:extLst>
   </p:cSld>
@@ -7606,7 +8512,7 @@
       </p:grpSpPr>
       <p:sp>
         <p:nvSpPr>
-          <p:cNvPr id="11266" name="Прямоугольник 2"/>
+          <p:cNvPr id="10242" name="Прямоугольник 2"/>
           <p:cNvSpPr>
             <a:spLocks noChangeArrowheads="1"/>
           </p:cNvSpPr>
@@ -7652,19 +8558,20 @@
           <a:p>
             <a:pPr algn="ctr"/>
             <a:r>
-              <a:rPr lang="be-BY" sz="2400" b="1" dirty="0" smtClean="0"/>
-              <a:t>Многотабличные </a:t>
-            </a:r>
-            <a:r>
-              <a:rPr lang="be-BY" sz="2400" b="1" dirty="0"/>
-              <a:t>запросы.</a:t>
-            </a:r>
+              <a:rPr lang="ru-RU" sz="2400" b="1"/>
+              <a:t>GROUP BY</a:t>
+            </a:r>
+            <a:r>
+              <a:rPr lang="en-US" sz="2400" b="1"/>
+              <a:t>.</a:t>
+            </a:r>
+            <a:endParaRPr lang="be-BY" sz="2400" b="1"/>
           </a:p>
         </p:txBody>
       </p:sp>
       <p:sp>
         <p:nvSpPr>
-          <p:cNvPr id="11267" name="Прямоугольник 4"/>
+          <p:cNvPr id="10243" name="Прямоугольник 4"/>
           <p:cNvSpPr>
             <a:spLocks noChangeArrowheads="1"/>
           </p:cNvSpPr>
@@ -7673,7 +8580,7 @@
         <p:spPr bwMode="auto">
           <a:xfrm>
             <a:off x="152400" y="457200"/>
-            <a:ext cx="8839200" cy="5262979"/>
+            <a:ext cx="8839200" cy="4524375"/>
           </a:xfrm>
           <a:prstGeom prst="rect">
             <a:avLst/>
@@ -7709,280 +8616,124 @@
           <a:lstStyle/>
           <a:p>
             <a:r>
-              <a:rPr lang="ru-RU" sz="1200" b="1" dirty="0"/>
-              <a:t>1) Декартово произведение двух таблиц: </a:t>
-            </a:r>
+              <a:rPr lang="ru-RU" sz="1200"/>
+              <a:t>	Запрос, включающий в себя предложение </a:t>
+            </a:r>
+            <a:r>
+              <a:rPr lang="ru-RU" sz="1200" b="1"/>
+              <a:t>GROUP BY</a:t>
+            </a:r>
+            <a:r>
+              <a:rPr lang="ru-RU" sz="1200"/>
+              <a:t>, называется запросом с группировкой, поскольку он объединяет строки исходных таблиц в группы и для каждой группы строк генерирует одну строку в таблице результатов запроса. Столбцы, указанные в предложении GROUP BY, называются столбцами группировки (возможно указание нескольких столбцов – группировка по комбинации значений), поскольку именно они определяют, по какому признаку строки делятся на группы.</a:t>
+            </a:r>
+          </a:p>
+          <a:p>
+            <a:r>
+              <a:rPr lang="ru-RU" sz="1200"/>
+              <a:t>Ограничения на синтаксис группирующих запросов и особенности выполнения: </a:t>
+            </a:r>
+          </a:p>
+          <a:p>
+            <a:r>
+              <a:rPr lang="ru-RU" sz="1200" b="1"/>
+              <a:t>1)</a:t>
+            </a:r>
+            <a:r>
+              <a:rPr lang="ru-RU" sz="1200"/>
+              <a:t> Столбцы с группировкой должны представлять собой реальные столбцы таблиц, перечисленных в предложении FROM. Нельзя группировать строки на основании значения вычисляемого выражения. </a:t>
+            </a:r>
+          </a:p>
+          <a:p>
+            <a:r>
+              <a:rPr lang="ru-RU" sz="1200" b="1"/>
+              <a:t>2)</a:t>
+            </a:r>
+            <a:r>
+              <a:rPr lang="ru-RU" sz="1200"/>
+              <a:t> Все имена столбцов, приведенные в описании SELECT должны обязательно присутствовать и в секции GROUP BY. Это означает, что возвращаемым столбцом может быть: </a:t>
+            </a:r>
+            <a:endParaRPr lang="be-BY" sz="1200"/>
           </a:p>
           <a:p>
             <a:pPr lvl="1"/>
             <a:r>
-              <a:rPr lang="en-US" sz="1200" dirty="0">
-                <a:latin typeface="Courier New" pitchFamily="49" charset="0"/>
-                <a:cs typeface="Courier New" pitchFamily="49" charset="0"/>
-              </a:rPr>
-              <a:t>SELECT t1.*, t2.* </a:t>
+              <a:rPr lang="be-BY" sz="1200"/>
+              <a:t>• константа; </a:t>
             </a:r>
           </a:p>
           <a:p>
             <a:pPr lvl="1"/>
             <a:r>
-              <a:rPr lang="en-US" sz="1200" dirty="0">
-                <a:latin typeface="Courier New" pitchFamily="49" charset="0"/>
-                <a:cs typeface="Courier New" pitchFamily="49" charset="0"/>
-              </a:rPr>
-              <a:t>FROM t1, t2; </a:t>
-            </a:r>
-          </a:p>
-          <a:p>
-            <a:r>
-              <a:rPr lang="ru-RU" sz="1200" b="1" dirty="0"/>
-              <a:t>2) Тета-соединение таблиц </a:t>
-            </a:r>
-            <a:r>
-              <a:rPr lang="ru-RU" sz="1200" dirty="0"/>
-              <a:t>(используются знаки сравнения, на практике используется редко, так как трудно найти смысл соединения): </a:t>
+              <a:rPr lang="ru-RU" sz="1200"/>
+              <a:t>• статистическая функция, возвращающая одно значение для всех строк, входящих в группу; </a:t>
             </a:r>
           </a:p>
           <a:p>
             <a:pPr lvl="1"/>
             <a:r>
-              <a:rPr lang="en-US" sz="1200" dirty="0">
-                <a:latin typeface="Courier New" pitchFamily="49" charset="0"/>
-                <a:cs typeface="Courier New" pitchFamily="49" charset="0"/>
-              </a:rPr>
-              <a:t>SELECT * </a:t>
+              <a:rPr lang="ru-RU" sz="1200"/>
+              <a:t>• столбец группировки, который по определению имеет одно и то же значение во всех строках группы; </a:t>
             </a:r>
           </a:p>
           <a:p>
             <a:pPr lvl="1"/>
             <a:r>
-              <a:rPr lang="en-US" sz="1200" dirty="0">
-                <a:latin typeface="Courier New" pitchFamily="49" charset="0"/>
-                <a:cs typeface="Courier New" pitchFamily="49" charset="0"/>
-              </a:rPr>
-              <a:t>FROM t1, t2 </a:t>
-            </a:r>
-          </a:p>
-          <a:p>
-            <a:pPr lvl="1"/>
-            <a:r>
-              <a:rPr lang="en-US" sz="1200" dirty="0">
-                <a:latin typeface="Courier New" pitchFamily="49" charset="0"/>
-                <a:cs typeface="Courier New" pitchFamily="49" charset="0"/>
-              </a:rPr>
-              <a:t>WHERE (t1.number &gt; t2.number); </a:t>
-            </a:r>
-          </a:p>
-          <a:p>
-            <a:r>
-              <a:rPr lang="ru-RU" sz="1200" b="1" dirty="0"/>
-              <a:t>3) Экви-соединение таблиц </a:t>
-            </a:r>
-            <a:r>
-              <a:rPr lang="ru-RU" sz="1200" dirty="0"/>
-              <a:t>(выполняется по равенству значений общего атрибута, например значений первичного и внешнего ключа): </a:t>
-            </a:r>
-          </a:p>
-          <a:p>
-            <a:pPr lvl="1"/>
-            <a:r>
-              <a:rPr lang="en-US" sz="1200" dirty="0">
-                <a:latin typeface="Courier New" pitchFamily="49" charset="0"/>
-                <a:cs typeface="Courier New" pitchFamily="49" charset="0"/>
-              </a:rPr>
-              <a:t>SELECT t1.*, t2.* </a:t>
-            </a:r>
-          </a:p>
-          <a:p>
-            <a:pPr lvl="1"/>
-            <a:r>
-              <a:rPr lang="en-US" sz="1200" dirty="0">
-                <a:latin typeface="Courier New" pitchFamily="49" charset="0"/>
-                <a:cs typeface="Courier New" pitchFamily="49" charset="0"/>
-              </a:rPr>
-              <a:t>FROM t1, t2 </a:t>
-            </a:r>
-          </a:p>
-          <a:p>
-            <a:pPr lvl="1"/>
-            <a:r>
-              <a:rPr lang="en-US" sz="1200" dirty="0">
-                <a:latin typeface="Courier New" pitchFamily="49" charset="0"/>
-                <a:cs typeface="Courier New" pitchFamily="49" charset="0"/>
-              </a:rPr>
-              <a:t>WHERE (t1.number = t2.number); </a:t>
-            </a:r>
-          </a:p>
-          <a:p>
-            <a:r>
-              <a:rPr lang="ru-RU" sz="1200" dirty="0"/>
-              <a:t>или эквивалентный вариант соединения (inner или natural join): </a:t>
-            </a:r>
-          </a:p>
-          <a:p>
-            <a:pPr lvl="1"/>
-            <a:r>
-              <a:rPr lang="en-US" sz="1200" dirty="0">
-                <a:latin typeface="Courier New" pitchFamily="49" charset="0"/>
-                <a:cs typeface="Courier New" pitchFamily="49" charset="0"/>
-              </a:rPr>
-              <a:t>SELECT t1.*, t2.* </a:t>
-            </a:r>
-          </a:p>
-          <a:p>
-            <a:pPr lvl="1"/>
-            <a:r>
-              <a:rPr lang="en-US" sz="1200" dirty="0">
-                <a:latin typeface="Courier New" pitchFamily="49" charset="0"/>
-                <a:cs typeface="Courier New" pitchFamily="49" charset="0"/>
-              </a:rPr>
-              <a:t>FROM t1 INNER JOIN t2 ON (t1.number = t2.number); </a:t>
-            </a:r>
-          </a:p>
-          <a:p>
-            <a:r>
-              <a:rPr lang="ru-RU" sz="1200" b="1" dirty="0"/>
-              <a:t>4) Внешние соединения таблиц </a:t>
-            </a:r>
-            <a:r>
-              <a:rPr lang="ru-RU" sz="1200" dirty="0"/>
-              <a:t>(левое, правое и полное, соответственно): </a:t>
-            </a:r>
-          </a:p>
-          <a:p>
-            <a:pPr lvl="1"/>
-            <a:r>
-              <a:rPr lang="en-US" sz="1200" dirty="0">
-                <a:latin typeface="Courier New" pitchFamily="49" charset="0"/>
-                <a:cs typeface="Courier New" pitchFamily="49" charset="0"/>
-              </a:rPr>
-              <a:t>SELECT t1.*, t2.* </a:t>
-            </a:r>
-          </a:p>
-          <a:p>
-            <a:pPr lvl="1"/>
-            <a:r>
-              <a:rPr lang="en-US" sz="1200" dirty="0">
-                <a:latin typeface="Courier New" pitchFamily="49" charset="0"/>
-                <a:cs typeface="Courier New" pitchFamily="49" charset="0"/>
-              </a:rPr>
-              <a:t>FROM t1 LEFT JOIN t2 ON t1.number = t2.number; </a:t>
-            </a:r>
-          </a:p>
-          <a:p>
-            <a:pPr lvl="1"/>
-            <a:endParaRPr lang="en-US" sz="1200" dirty="0">
-              <a:latin typeface="Courier New" pitchFamily="49" charset="0"/>
-              <a:cs typeface="Courier New" pitchFamily="49" charset="0"/>
-            </a:endParaRPr>
-          </a:p>
-          <a:p>
-            <a:pPr lvl="1"/>
-            <a:r>
-              <a:rPr lang="en-US" sz="1200" dirty="0">
-                <a:latin typeface="Courier New" pitchFamily="49" charset="0"/>
-                <a:cs typeface="Courier New" pitchFamily="49" charset="0"/>
-              </a:rPr>
-              <a:t>SELECT t1.*, t2.* </a:t>
-            </a:r>
-          </a:p>
-          <a:p>
-            <a:pPr lvl="1"/>
-            <a:r>
-              <a:rPr lang="en-US" sz="1200" dirty="0">
-                <a:latin typeface="Courier New" pitchFamily="49" charset="0"/>
-                <a:cs typeface="Courier New" pitchFamily="49" charset="0"/>
-              </a:rPr>
-              <a:t>FROM t1 RIGHT JOIN t2 ON t1.number = t2.number</a:t>
-            </a:r>
-            <a:r>
-              <a:rPr lang="en-US" sz="1200" dirty="0" smtClean="0">
-                <a:latin typeface="Courier New" pitchFamily="49" charset="0"/>
-                <a:cs typeface="Courier New" pitchFamily="49" charset="0"/>
-              </a:rPr>
-              <a:t>;</a:t>
-            </a:r>
-            <a:endParaRPr lang="ru-RU" sz="1200" dirty="0">
-              <a:latin typeface="Courier New" pitchFamily="49" charset="0"/>
-              <a:cs typeface="Courier New" pitchFamily="49" charset="0"/>
-            </a:endParaRPr>
-          </a:p>
-          <a:p>
-            <a:pPr lvl="1"/>
-            <a:endParaRPr lang="ru-RU" sz="1200" dirty="0">
-              <a:latin typeface="Courier New" pitchFamily="49" charset="0"/>
-              <a:cs typeface="Courier New" pitchFamily="49" charset="0"/>
-            </a:endParaRPr>
-          </a:p>
-          <a:p>
-            <a:r>
-              <a:rPr lang="en-US" sz="1200" dirty="0" smtClean="0">
-                <a:cs typeface="Courier New" pitchFamily="49" charset="0"/>
-              </a:rPr>
-              <a:t>JOIN</a:t>
-            </a:r>
-            <a:r>
-              <a:rPr lang="en-US" sz="1200" dirty="0">
-                <a:cs typeface="Courier New" pitchFamily="49" charset="0"/>
-              </a:rPr>
-              <a:t>: Return rows when there is at least one match in both tables</a:t>
-            </a:r>
-          </a:p>
-          <a:p>
-            <a:r>
-              <a:rPr lang="en-US" sz="1200" dirty="0" smtClean="0">
-                <a:cs typeface="Courier New" pitchFamily="49" charset="0"/>
-              </a:rPr>
-              <a:t>LEFT </a:t>
-            </a:r>
-            <a:r>
-              <a:rPr lang="en-US" sz="1200" dirty="0">
-                <a:cs typeface="Courier New" pitchFamily="49" charset="0"/>
-              </a:rPr>
-              <a:t>JOIN: Return all rows from the left table, even if there are no matches in the right table</a:t>
-            </a:r>
-          </a:p>
-          <a:p>
-            <a:r>
-              <a:rPr lang="en-US" sz="1200" dirty="0" smtClean="0">
-                <a:cs typeface="Courier New" pitchFamily="49" charset="0"/>
-              </a:rPr>
-              <a:t>RIGHT </a:t>
-            </a:r>
-            <a:r>
-              <a:rPr lang="en-US" sz="1200" dirty="0">
-                <a:cs typeface="Courier New" pitchFamily="49" charset="0"/>
-              </a:rPr>
-              <a:t>JOIN: Return all rows from the right table, even if there are no matches in the left table</a:t>
-            </a:r>
-          </a:p>
-          <a:p>
-            <a:r>
-              <a:rPr lang="en-US" sz="1200" dirty="0" smtClean="0">
-                <a:cs typeface="Courier New" pitchFamily="49" charset="0"/>
-              </a:rPr>
-              <a:t>FULL </a:t>
-            </a:r>
-            <a:r>
-              <a:rPr lang="en-US" sz="1200" dirty="0">
-                <a:cs typeface="Courier New" pitchFamily="49" charset="0"/>
-              </a:rPr>
-              <a:t>JOIN: Return rows when there is a match in one of the tables</a:t>
-            </a:r>
-          </a:p>
-          <a:p>
-            <a:pPr lvl="1"/>
-            <a:endParaRPr lang="ru-RU" sz="1200" dirty="0" smtClean="0">
-              <a:latin typeface="Courier New" pitchFamily="49" charset="0"/>
-              <a:cs typeface="Courier New" pitchFamily="49" charset="0"/>
-            </a:endParaRPr>
+              <a:rPr lang="ru-RU" sz="1200"/>
+              <a:t>• выражение, включающее в себя перечисленные выше элементы.</a:t>
+            </a:r>
+          </a:p>
+          <a:p>
+            <a:r>
+              <a:rPr lang="ru-RU" sz="1200" b="1"/>
+              <a:t>3)</a:t>
+            </a:r>
+            <a:r>
+              <a:rPr lang="ru-RU" sz="1200"/>
+              <a:t> Если совместно с GROUP BY используется WHERE, то WHERE обрабатывается первым, а группированию подвергаются только те строки, которые удовлетворяют условию фильтра. По ISO, NULL-значения входят в одну группу.</a:t>
+            </a:r>
+          </a:p>
+          <a:p>
+            <a:endParaRPr lang="ru-RU" sz="1200"/>
+          </a:p>
+          <a:p>
+            <a:endParaRPr lang="ru-RU" sz="1200"/>
+          </a:p>
+          <a:p>
+            <a:r>
+              <a:rPr lang="ru-RU" sz="1200"/>
+              <a:t>	</a:t>
+            </a:r>
+            <a:r>
+              <a:rPr lang="ru-RU" sz="1200" b="1"/>
+              <a:t>Подзапросы</a:t>
+            </a:r>
+            <a:r>
+              <a:rPr lang="ru-RU" sz="1200"/>
+              <a:t> – запросы с помощью оператора SELECT, помещенные в секции WHERE и (или) HAVING внешнего оператора SELECT. Подзапрос создает временную таблицу, содержимое которой извлекается и обрабатывается внешним оператором (обычно предикатом внешнего запроса). Текст подзапроса должен быть заключен в круглые скобки и располагается всегда в правой части операции внешнего запроса. В подзапросах не должна </a:t>
+            </a:r>
+            <a:r>
+              <a:rPr lang="be-BY" sz="1200"/>
+              <a:t>использоваться секция </a:t>
+            </a:r>
+            <a:r>
+              <a:rPr lang="en-US" sz="1200"/>
+              <a:t>ORDER BY. </a:t>
+            </a:r>
+            <a:r>
+              <a:rPr lang="ru-RU" sz="1200"/>
+              <a:t> </a:t>
+            </a:r>
+          </a:p>
+          <a:p>
+            <a:endParaRPr lang="ru-RU" sz="1200"/>
           </a:p>
         </p:txBody>
       </p:sp>
     </p:spTree>
     <p:extLst>
       <p:ext uri="{BB962C8B-B14F-4D97-AF65-F5344CB8AC3E}">
-        <p14:creationId xmlns:p14="http://schemas.microsoft.com/office/powerpoint/2010/main" val="2446323228"/>
+        <p14:creationId xmlns:p14="http://schemas.microsoft.com/office/powerpoint/2010/main" val="600660360"/>
       </p:ext>
     </p:extLst>
   </p:cSld>
@@ -8074,6 +8825,418 @@
           </a:p>
         </p:txBody>
       </p:sp>
+      <p:sp>
+        <p:nvSpPr>
+          <p:cNvPr id="11267" name="Прямоугольник 4"/>
+          <p:cNvSpPr>
+            <a:spLocks noChangeArrowheads="1"/>
+          </p:cNvSpPr>
+          <p:nvPr/>
+        </p:nvSpPr>
+        <p:spPr bwMode="auto">
+          <a:xfrm>
+            <a:off x="152400" y="457200"/>
+            <a:ext cx="8839200" cy="5262979"/>
+          </a:xfrm>
+          <a:prstGeom prst="rect">
+            <a:avLst/>
+          </a:prstGeom>
+          <a:noFill/>
+          <a:ln>
+            <a:noFill/>
+          </a:ln>
+          <a:extLst>
+            <a:ext uri="{909E8E84-426E-40DD-AFC4-6F175D3DCCD1}">
+              <a14:hiddenFill xmlns:a14="http://schemas.microsoft.com/office/drawing/2010/main">
+                <a:solidFill>
+                  <a:srgbClr val="FFFFFF"/>
+                </a:solidFill>
+              </a14:hiddenFill>
+            </a:ext>
+            <a:ext uri="{91240B29-F687-4F45-9708-019B960494DF}">
+              <a14:hiddenLine xmlns:a14="http://schemas.microsoft.com/office/drawing/2010/main" w="9525">
+                <a:solidFill>
+                  <a:srgbClr val="000000"/>
+                </a:solidFill>
+                <a:miter lim="800000"/>
+                <a:headEnd/>
+                <a:tailEnd/>
+              </a14:hiddenLine>
+            </a:ext>
+          </a:extLst>
+        </p:spPr>
+        <p:txBody>
+          <a:bodyPr>
+            <a:spAutoFit/>
+          </a:bodyPr>
+          <a:lstStyle/>
+          <a:p>
+            <a:r>
+              <a:rPr lang="ru-RU" sz="1200" b="1" dirty="0"/>
+              <a:t>1) Декартово произведение двух таблиц: </a:t>
+            </a:r>
+          </a:p>
+          <a:p>
+            <a:pPr lvl="1"/>
+            <a:r>
+              <a:rPr lang="en-US" sz="1200" dirty="0">
+                <a:latin typeface="Courier New" pitchFamily="49" charset="0"/>
+                <a:cs typeface="Courier New" pitchFamily="49" charset="0"/>
+              </a:rPr>
+              <a:t>SELECT t1.*, t2.* </a:t>
+            </a:r>
+          </a:p>
+          <a:p>
+            <a:pPr lvl="1"/>
+            <a:r>
+              <a:rPr lang="en-US" sz="1200" dirty="0">
+                <a:latin typeface="Courier New" pitchFamily="49" charset="0"/>
+                <a:cs typeface="Courier New" pitchFamily="49" charset="0"/>
+              </a:rPr>
+              <a:t>FROM t1, t2; </a:t>
+            </a:r>
+          </a:p>
+          <a:p>
+            <a:r>
+              <a:rPr lang="ru-RU" sz="1200" b="1" dirty="0"/>
+              <a:t>2) Тета-соединение таблиц </a:t>
+            </a:r>
+            <a:r>
+              <a:rPr lang="ru-RU" sz="1200" dirty="0"/>
+              <a:t>(используются знаки сравнения, на практике используется редко, так как трудно найти смысл соединения): </a:t>
+            </a:r>
+          </a:p>
+          <a:p>
+            <a:pPr lvl="1"/>
+            <a:r>
+              <a:rPr lang="en-US" sz="1200" dirty="0">
+                <a:latin typeface="Courier New" pitchFamily="49" charset="0"/>
+                <a:cs typeface="Courier New" pitchFamily="49" charset="0"/>
+              </a:rPr>
+              <a:t>SELECT * </a:t>
+            </a:r>
+          </a:p>
+          <a:p>
+            <a:pPr lvl="1"/>
+            <a:r>
+              <a:rPr lang="en-US" sz="1200" dirty="0">
+                <a:latin typeface="Courier New" pitchFamily="49" charset="0"/>
+                <a:cs typeface="Courier New" pitchFamily="49" charset="0"/>
+              </a:rPr>
+              <a:t>FROM t1, t2 </a:t>
+            </a:r>
+          </a:p>
+          <a:p>
+            <a:pPr lvl="1"/>
+            <a:r>
+              <a:rPr lang="en-US" sz="1200" dirty="0">
+                <a:latin typeface="Courier New" pitchFamily="49" charset="0"/>
+                <a:cs typeface="Courier New" pitchFamily="49" charset="0"/>
+              </a:rPr>
+              <a:t>WHERE (t1.number &gt; t2.number); </a:t>
+            </a:r>
+          </a:p>
+          <a:p>
+            <a:r>
+              <a:rPr lang="ru-RU" sz="1200" b="1" dirty="0"/>
+              <a:t>3) Экви-соединение таблиц </a:t>
+            </a:r>
+            <a:r>
+              <a:rPr lang="ru-RU" sz="1200" dirty="0"/>
+              <a:t>(выполняется по равенству значений общего атрибута, например значений первичного и внешнего ключа): </a:t>
+            </a:r>
+          </a:p>
+          <a:p>
+            <a:pPr lvl="1"/>
+            <a:r>
+              <a:rPr lang="en-US" sz="1200" dirty="0">
+                <a:latin typeface="Courier New" pitchFamily="49" charset="0"/>
+                <a:cs typeface="Courier New" pitchFamily="49" charset="0"/>
+              </a:rPr>
+              <a:t>SELECT t1.*, t2.* </a:t>
+            </a:r>
+          </a:p>
+          <a:p>
+            <a:pPr lvl="1"/>
+            <a:r>
+              <a:rPr lang="en-US" sz="1200" dirty="0">
+                <a:latin typeface="Courier New" pitchFamily="49" charset="0"/>
+                <a:cs typeface="Courier New" pitchFamily="49" charset="0"/>
+              </a:rPr>
+              <a:t>FROM t1, t2 </a:t>
+            </a:r>
+          </a:p>
+          <a:p>
+            <a:pPr lvl="1"/>
+            <a:r>
+              <a:rPr lang="en-US" sz="1200" dirty="0">
+                <a:latin typeface="Courier New" pitchFamily="49" charset="0"/>
+                <a:cs typeface="Courier New" pitchFamily="49" charset="0"/>
+              </a:rPr>
+              <a:t>WHERE (t1.number = t2.number); </a:t>
+            </a:r>
+          </a:p>
+          <a:p>
+            <a:r>
+              <a:rPr lang="ru-RU" sz="1200" dirty="0"/>
+              <a:t>или эквивалентный вариант соединения (inner или natural join): </a:t>
+            </a:r>
+          </a:p>
+          <a:p>
+            <a:pPr lvl="1"/>
+            <a:r>
+              <a:rPr lang="en-US" sz="1200" dirty="0">
+                <a:latin typeface="Courier New" pitchFamily="49" charset="0"/>
+                <a:cs typeface="Courier New" pitchFamily="49" charset="0"/>
+              </a:rPr>
+              <a:t>SELECT t1.*, t2.* </a:t>
+            </a:r>
+          </a:p>
+          <a:p>
+            <a:pPr lvl="1"/>
+            <a:r>
+              <a:rPr lang="en-US" sz="1200" dirty="0">
+                <a:latin typeface="Courier New" pitchFamily="49" charset="0"/>
+                <a:cs typeface="Courier New" pitchFamily="49" charset="0"/>
+              </a:rPr>
+              <a:t>FROM t1 INNER JOIN t2 ON (t1.number = t2.number); </a:t>
+            </a:r>
+          </a:p>
+          <a:p>
+            <a:r>
+              <a:rPr lang="ru-RU" sz="1200" b="1" dirty="0"/>
+              <a:t>4) Внешние соединения таблиц </a:t>
+            </a:r>
+            <a:r>
+              <a:rPr lang="ru-RU" sz="1200" dirty="0"/>
+              <a:t>(левое, правое и полное, соответственно): </a:t>
+            </a:r>
+          </a:p>
+          <a:p>
+            <a:pPr lvl="1"/>
+            <a:r>
+              <a:rPr lang="en-US" sz="1200" dirty="0">
+                <a:latin typeface="Courier New" pitchFamily="49" charset="0"/>
+                <a:cs typeface="Courier New" pitchFamily="49" charset="0"/>
+              </a:rPr>
+              <a:t>SELECT t1.*, t2.* </a:t>
+            </a:r>
+          </a:p>
+          <a:p>
+            <a:pPr lvl="1"/>
+            <a:r>
+              <a:rPr lang="en-US" sz="1200" dirty="0">
+                <a:latin typeface="Courier New" pitchFamily="49" charset="0"/>
+                <a:cs typeface="Courier New" pitchFamily="49" charset="0"/>
+              </a:rPr>
+              <a:t>FROM t1 LEFT JOIN t2 ON t1.number = t2.number; </a:t>
+            </a:r>
+          </a:p>
+          <a:p>
+            <a:pPr lvl="1"/>
+            <a:endParaRPr lang="en-US" sz="1200" dirty="0">
+              <a:latin typeface="Courier New" pitchFamily="49" charset="0"/>
+              <a:cs typeface="Courier New" pitchFamily="49" charset="0"/>
+            </a:endParaRPr>
+          </a:p>
+          <a:p>
+            <a:pPr lvl="1"/>
+            <a:r>
+              <a:rPr lang="en-US" sz="1200" dirty="0">
+                <a:latin typeface="Courier New" pitchFamily="49" charset="0"/>
+                <a:cs typeface="Courier New" pitchFamily="49" charset="0"/>
+              </a:rPr>
+              <a:t>SELECT t1.*, t2.* </a:t>
+            </a:r>
+          </a:p>
+          <a:p>
+            <a:pPr lvl="1"/>
+            <a:r>
+              <a:rPr lang="en-US" sz="1200" dirty="0">
+                <a:latin typeface="Courier New" pitchFamily="49" charset="0"/>
+                <a:cs typeface="Courier New" pitchFamily="49" charset="0"/>
+              </a:rPr>
+              <a:t>FROM t1 RIGHT JOIN t2 ON t1.number = t2.number</a:t>
+            </a:r>
+            <a:r>
+              <a:rPr lang="en-US" sz="1200" dirty="0" smtClean="0">
+                <a:latin typeface="Courier New" pitchFamily="49" charset="0"/>
+                <a:cs typeface="Courier New" pitchFamily="49" charset="0"/>
+              </a:rPr>
+              <a:t>;</a:t>
+            </a:r>
+            <a:endParaRPr lang="ru-RU" sz="1200" dirty="0">
+              <a:latin typeface="Courier New" pitchFamily="49" charset="0"/>
+              <a:cs typeface="Courier New" pitchFamily="49" charset="0"/>
+            </a:endParaRPr>
+          </a:p>
+          <a:p>
+            <a:pPr lvl="1"/>
+            <a:endParaRPr lang="ru-RU" sz="1200" dirty="0">
+              <a:latin typeface="Courier New" pitchFamily="49" charset="0"/>
+              <a:cs typeface="Courier New" pitchFamily="49" charset="0"/>
+            </a:endParaRPr>
+          </a:p>
+          <a:p>
+            <a:r>
+              <a:rPr lang="en-US" sz="1200" dirty="0" smtClean="0">
+                <a:cs typeface="Courier New" pitchFamily="49" charset="0"/>
+              </a:rPr>
+              <a:t>JOIN</a:t>
+            </a:r>
+            <a:r>
+              <a:rPr lang="en-US" sz="1200" dirty="0">
+                <a:cs typeface="Courier New" pitchFamily="49" charset="0"/>
+              </a:rPr>
+              <a:t>: Return rows when there is at least one match in both tables</a:t>
+            </a:r>
+          </a:p>
+          <a:p>
+            <a:r>
+              <a:rPr lang="en-US" sz="1200" dirty="0" smtClean="0">
+                <a:cs typeface="Courier New" pitchFamily="49" charset="0"/>
+              </a:rPr>
+              <a:t>LEFT </a:t>
+            </a:r>
+            <a:r>
+              <a:rPr lang="en-US" sz="1200" dirty="0">
+                <a:cs typeface="Courier New" pitchFamily="49" charset="0"/>
+              </a:rPr>
+              <a:t>JOIN: Return all rows from the left table, even if there are no matches in the right table</a:t>
+            </a:r>
+          </a:p>
+          <a:p>
+            <a:r>
+              <a:rPr lang="en-US" sz="1200" dirty="0" smtClean="0">
+                <a:cs typeface="Courier New" pitchFamily="49" charset="0"/>
+              </a:rPr>
+              <a:t>RIGHT </a:t>
+            </a:r>
+            <a:r>
+              <a:rPr lang="en-US" sz="1200" dirty="0">
+                <a:cs typeface="Courier New" pitchFamily="49" charset="0"/>
+              </a:rPr>
+              <a:t>JOIN: Return all rows from the right table, even if there are no matches in the left table</a:t>
+            </a:r>
+          </a:p>
+          <a:p>
+            <a:r>
+              <a:rPr lang="en-US" sz="1200" dirty="0" smtClean="0">
+                <a:cs typeface="Courier New" pitchFamily="49" charset="0"/>
+              </a:rPr>
+              <a:t>FULL </a:t>
+            </a:r>
+            <a:r>
+              <a:rPr lang="en-US" sz="1200" dirty="0">
+                <a:cs typeface="Courier New" pitchFamily="49" charset="0"/>
+              </a:rPr>
+              <a:t>JOIN: Return rows when there is a match in one of the tables</a:t>
+            </a:r>
+          </a:p>
+          <a:p>
+            <a:pPr lvl="1"/>
+            <a:endParaRPr lang="ru-RU" sz="1200" dirty="0" smtClean="0">
+              <a:latin typeface="Courier New" pitchFamily="49" charset="0"/>
+              <a:cs typeface="Courier New" pitchFamily="49" charset="0"/>
+            </a:endParaRPr>
+          </a:p>
+        </p:txBody>
+      </p:sp>
+    </p:spTree>
+    <p:extLst>
+      <p:ext uri="{BB962C8B-B14F-4D97-AF65-F5344CB8AC3E}">
+        <p14:creationId xmlns:p14="http://schemas.microsoft.com/office/powerpoint/2010/main" val="2446323228"/>
+      </p:ext>
+    </p:extLst>
+  </p:cSld>
+  <p:clrMapOvr>
+    <a:masterClrMapping/>
+  </p:clrMapOvr>
+  <p:timing>
+    <p:tnLst>
+      <p:par>
+        <p:cTn id="1" dur="indefinite" restart="never" nodeType="tmRoot"/>
+      </p:par>
+    </p:tnLst>
+  </p:timing>
+</p:sld>
+</file>
+
+<file path=ppt/slides/slide25.xml><?xml version="1.0" encoding="utf-8"?>
+<p:sld xmlns:a="http://schemas.openxmlformats.org/drawingml/2006/main" xmlns:r="http://schemas.openxmlformats.org/officeDocument/2006/relationships" xmlns:p="http://schemas.openxmlformats.org/presentationml/2006/main">
+  <p:cSld>
+    <p:spTree>
+      <p:nvGrpSpPr>
+        <p:cNvPr id="1" name=""/>
+        <p:cNvGrpSpPr/>
+        <p:nvPr/>
+      </p:nvGrpSpPr>
+      <p:grpSpPr>
+        <a:xfrm>
+          <a:off x="0" y="0"/>
+          <a:ext cx="0" cy="0"/>
+          <a:chOff x="0" y="0"/>
+          <a:chExt cx="0" cy="0"/>
+        </a:xfrm>
+      </p:grpSpPr>
+      <p:sp>
+        <p:nvSpPr>
+          <p:cNvPr id="11266" name="Прямоугольник 2"/>
+          <p:cNvSpPr>
+            <a:spLocks noChangeArrowheads="1"/>
+          </p:cNvSpPr>
+          <p:nvPr/>
+        </p:nvSpPr>
+        <p:spPr bwMode="auto">
+          <a:xfrm>
+            <a:off x="152400" y="0"/>
+            <a:ext cx="8839200" cy="461963"/>
+          </a:xfrm>
+          <a:prstGeom prst="rect">
+            <a:avLst/>
+          </a:prstGeom>
+          <a:noFill/>
+          <a:ln>
+            <a:noFill/>
+          </a:ln>
+          <a:extLst>
+            <a:ext uri="{909E8E84-426E-40DD-AFC4-6F175D3DCCD1}">
+              <a14:hiddenFill xmlns:a14="http://schemas.microsoft.com/office/drawing/2010/main">
+                <a:solidFill>
+                  <a:srgbClr val="FFFFFF"/>
+                </a:solidFill>
+              </a14:hiddenFill>
+            </a:ext>
+            <a:ext uri="{91240B29-F687-4F45-9708-019B960494DF}">
+              <a14:hiddenLine xmlns:a14="http://schemas.microsoft.com/office/drawing/2010/main" w="9525">
+                <a:solidFill>
+                  <a:srgbClr val="000000"/>
+                </a:solidFill>
+                <a:miter lim="800000"/>
+                <a:headEnd/>
+                <a:tailEnd/>
+              </a14:hiddenLine>
+            </a:ext>
+          </a:extLst>
+        </p:spPr>
+        <p:txBody>
+          <a:bodyPr>
+            <a:spAutoFit/>
+          </a:bodyPr>
+          <a:lstStyle/>
+          <a:p>
+            <a:pPr algn="ctr"/>
+            <a:r>
+              <a:rPr lang="be-BY" sz="2400" b="1" dirty="0" smtClean="0"/>
+              <a:t>Многотабличные </a:t>
+            </a:r>
+            <a:r>
+              <a:rPr lang="be-BY" sz="2400" b="1" dirty="0"/>
+              <a:t>запросы.</a:t>
+            </a:r>
+          </a:p>
+        </p:txBody>
+      </p:sp>
       <p:pic>
         <p:nvPicPr>
           <p:cNvPr id="1028" name="Picture 4" descr="http://www.codeproject.com/KB/database/Visual_SQL_Joins/Visual_SQL_JOINS_orig.jpg"/>
@@ -8135,7 +9298,7 @@
 </p:sld>
 </file>
 
-<file path=ppt/slides/slide25.xml><?xml version="1.0" encoding="utf-8"?>
+<file path=ppt/slides/slide26.xml><?xml version="1.0" encoding="utf-8"?>
 <p:sld xmlns:a="http://schemas.openxmlformats.org/drawingml/2006/main" xmlns:r="http://schemas.openxmlformats.org/officeDocument/2006/relationships" xmlns:p="http://schemas.openxmlformats.org/presentationml/2006/main">
   <p:cSld>
     <p:spTree>
@@ -8542,892 +9705,6 @@
     <p:extLst>
       <p:ext uri="{BB962C8B-B14F-4D97-AF65-F5344CB8AC3E}">
         <p14:creationId xmlns:p14="http://schemas.microsoft.com/office/powerpoint/2010/main" val="2017122947"/>
-      </p:ext>
-    </p:extLst>
-  </p:cSld>
-  <p:clrMapOvr>
-    <a:masterClrMapping/>
-  </p:clrMapOvr>
-  <p:timing>
-    <p:tnLst>
-      <p:par>
-        <p:cTn id="1" dur="indefinite" restart="never" nodeType="tmRoot"/>
-      </p:par>
-    </p:tnLst>
-  </p:timing>
-</p:sld>
-</file>
-
-<file path=ppt/slides/slide26.xml><?xml version="1.0" encoding="utf-8"?>
-<p:sld xmlns:a="http://schemas.openxmlformats.org/drawingml/2006/main" xmlns:r="http://schemas.openxmlformats.org/officeDocument/2006/relationships" xmlns:p="http://schemas.openxmlformats.org/presentationml/2006/main">
-  <p:cSld>
-    <p:spTree>
-      <p:nvGrpSpPr>
-        <p:cNvPr id="1" name=""/>
-        <p:cNvGrpSpPr/>
-        <p:nvPr/>
-      </p:nvGrpSpPr>
-      <p:grpSpPr>
-        <a:xfrm>
-          <a:off x="0" y="0"/>
-          <a:ext cx="0" cy="0"/>
-          <a:chOff x="0" y="0"/>
-          <a:chExt cx="0" cy="0"/>
-        </a:xfrm>
-      </p:grpSpPr>
-      <p:sp>
-        <p:nvSpPr>
-          <p:cNvPr id="2" name="Title 1"/>
-          <p:cNvSpPr>
-            <a:spLocks noGrp="1"/>
-          </p:cNvSpPr>
-          <p:nvPr>
-            <p:ph type="title"/>
-          </p:nvPr>
-        </p:nvSpPr>
-        <p:spPr/>
-        <p:txBody>
-          <a:bodyPr>
-            <a:noAutofit/>
-          </a:bodyPr>
-          <a:lstStyle/>
-          <a:p>
-            <a:r>
-              <a:rPr lang="ru-RU" sz="3600" dirty="0" smtClean="0"/>
-              <a:t>«Сокращенный» </a:t>
-            </a:r>
-            <a:r>
-              <a:rPr lang="en-US" sz="3600" dirty="0" smtClean="0"/>
-              <a:t>INSERT</a:t>
-            </a:r>
-            <a:r>
-              <a:rPr lang="ru-RU" sz="3600" dirty="0" smtClean="0"/>
-              <a:t>в </a:t>
-            </a:r>
-            <a:r>
-              <a:rPr lang="en-US" sz="3600" dirty="0" smtClean="0"/>
-              <a:t>MS SQL 2008 </a:t>
-            </a:r>
-            <a:r>
-              <a:rPr lang="ru-RU" sz="3600" dirty="0" smtClean="0"/>
-              <a:t>и выше</a:t>
-            </a:r>
-            <a:endParaRPr lang="en-US" sz="3600" dirty="0"/>
-          </a:p>
-        </p:txBody>
-      </p:sp>
-      <p:sp>
-        <p:nvSpPr>
-          <p:cNvPr id="3" name="Content Placeholder 2"/>
-          <p:cNvSpPr>
-            <a:spLocks noGrp="1"/>
-          </p:cNvSpPr>
-          <p:nvPr>
-            <p:ph idx="1"/>
-          </p:nvPr>
-        </p:nvSpPr>
-        <p:spPr>
-          <a:xfrm>
-            <a:off x="457200" y="1600200"/>
-            <a:ext cx="8147248" cy="2332855"/>
-          </a:xfrm>
-        </p:spPr>
-        <p:txBody>
-          <a:bodyPr>
-            <a:normAutofit/>
-          </a:bodyPr>
-          <a:lstStyle/>
-          <a:p>
-            <a:pPr marL="0" indent="0">
-              <a:buNone/>
-            </a:pPr>
-            <a:r>
-              <a:rPr lang="ru-RU" dirty="0" smtClean="0"/>
-              <a:t>В </a:t>
-            </a:r>
-            <a:r>
-              <a:rPr lang="en-US" dirty="0" smtClean="0"/>
-              <a:t>SQL Server 2008 </a:t>
-            </a:r>
-            <a:r>
-              <a:rPr lang="ru-RU" dirty="0"/>
-              <a:t>и выше </a:t>
-            </a:r>
-            <a:r>
-              <a:rPr lang="ru-RU" dirty="0" smtClean="0"/>
-              <a:t>команда </a:t>
-            </a:r>
-            <a:r>
-              <a:rPr lang="en-US" dirty="0" smtClean="0"/>
-              <a:t>INSERT </a:t>
-            </a:r>
-            <a:r>
-              <a:rPr lang="ru-RU" dirty="0" smtClean="0"/>
-              <a:t>дает возможность вставить несколько строк за один вызов</a:t>
-            </a:r>
-            <a:r>
-              <a:rPr lang="en-US" dirty="0" smtClean="0"/>
-              <a:t>. </a:t>
-            </a:r>
-            <a:r>
-              <a:rPr lang="ru-RU" dirty="0" smtClean="0"/>
-              <a:t>Добавление производится в рамках общей транзакции.</a:t>
-            </a:r>
-            <a:endParaRPr lang="en-US" dirty="0"/>
-          </a:p>
-        </p:txBody>
-      </p:sp>
-      <p:sp>
-        <p:nvSpPr>
-          <p:cNvPr id="5" name="Rectangle 4"/>
-          <p:cNvSpPr/>
-          <p:nvPr/>
-        </p:nvSpPr>
-        <p:spPr>
-          <a:xfrm>
-            <a:off x="457200" y="3989963"/>
-            <a:ext cx="8147248" cy="2031325"/>
-          </a:xfrm>
-          <a:prstGeom prst="rect">
-            <a:avLst/>
-          </a:prstGeom>
-          <a:solidFill>
-            <a:schemeClr val="bg1"/>
-          </a:solidFill>
-        </p:spPr>
-        <p:txBody>
-          <a:bodyPr wrap="square">
-            <a:spAutoFit/>
-          </a:bodyPr>
-          <a:lstStyle/>
-          <a:p>
-            <a:r>
-              <a:rPr lang="en-US" dirty="0">
-                <a:solidFill>
-                  <a:srgbClr val="0000FF"/>
-                </a:solidFill>
-                <a:latin typeface="Consolas"/>
-              </a:rPr>
-              <a:t>INSERT</a:t>
-            </a:r>
-            <a:r>
-              <a:rPr lang="en-US" dirty="0">
-                <a:solidFill>
-                  <a:prstClr val="black"/>
-                </a:solidFill>
-                <a:latin typeface="Consolas"/>
-              </a:rPr>
-              <a:t> </a:t>
-            </a:r>
-            <a:r>
-              <a:rPr lang="en-US" dirty="0">
-                <a:solidFill>
-                  <a:srgbClr val="0000FF"/>
-                </a:solidFill>
-                <a:latin typeface="Consolas"/>
-              </a:rPr>
-              <a:t>INTO</a:t>
-            </a:r>
-            <a:r>
-              <a:rPr lang="en-US" dirty="0">
-                <a:solidFill>
-                  <a:prstClr val="black"/>
-                </a:solidFill>
-                <a:latin typeface="Consolas"/>
-              </a:rPr>
-              <a:t> </a:t>
-            </a:r>
-            <a:r>
-              <a:rPr lang="en-US" dirty="0" err="1">
-                <a:solidFill>
-                  <a:prstClr val="black"/>
-                </a:solidFill>
-                <a:latin typeface="Consolas"/>
-              </a:rPr>
-              <a:t>CountryCapital</a:t>
-            </a:r>
-            <a:r>
-              <a:rPr lang="en-US" dirty="0">
-                <a:solidFill>
-                  <a:srgbClr val="0000FF"/>
-                </a:solidFill>
-                <a:latin typeface="Consolas"/>
-              </a:rPr>
-              <a:t> </a:t>
-            </a:r>
-            <a:r>
-              <a:rPr lang="en-US" dirty="0">
-                <a:solidFill>
-                  <a:srgbClr val="808080"/>
-                </a:solidFill>
-                <a:latin typeface="Consolas"/>
-              </a:rPr>
-              <a:t>(</a:t>
-            </a:r>
-            <a:r>
-              <a:rPr lang="en-US" dirty="0" err="1">
-                <a:solidFill>
-                  <a:prstClr val="black"/>
-                </a:solidFill>
-                <a:latin typeface="Consolas"/>
-              </a:rPr>
-              <a:t>PartOfWorld</a:t>
-            </a:r>
-            <a:r>
-              <a:rPr lang="en-US" dirty="0">
-                <a:solidFill>
-                  <a:srgbClr val="808080"/>
-                </a:solidFill>
-                <a:latin typeface="Consolas"/>
-              </a:rPr>
-              <a:t>,</a:t>
-            </a:r>
-            <a:r>
-              <a:rPr lang="en-US" dirty="0">
-                <a:solidFill>
-                  <a:prstClr val="black"/>
-                </a:solidFill>
-                <a:latin typeface="Consolas"/>
-              </a:rPr>
-              <a:t> Country</a:t>
-            </a:r>
-            <a:r>
-              <a:rPr lang="en-US" dirty="0">
-                <a:solidFill>
-                  <a:srgbClr val="808080"/>
-                </a:solidFill>
-                <a:latin typeface="Consolas"/>
-              </a:rPr>
-              <a:t>,</a:t>
-            </a:r>
-            <a:r>
-              <a:rPr lang="en-US" dirty="0">
-                <a:solidFill>
-                  <a:prstClr val="black"/>
-                </a:solidFill>
-                <a:latin typeface="Consolas"/>
-              </a:rPr>
-              <a:t> </a:t>
-            </a:r>
-            <a:r>
-              <a:rPr lang="en-US" dirty="0" err="1">
-                <a:solidFill>
-                  <a:prstClr val="black"/>
-                </a:solidFill>
-                <a:latin typeface="Consolas"/>
-              </a:rPr>
-              <a:t>CapitalCity</a:t>
-            </a:r>
-            <a:r>
-              <a:rPr lang="en-US" dirty="0">
-                <a:solidFill>
-                  <a:srgbClr val="808080"/>
-                </a:solidFill>
-                <a:latin typeface="Consolas"/>
-              </a:rPr>
-              <a:t>)</a:t>
-            </a:r>
-            <a:endParaRPr lang="en-US" dirty="0">
-              <a:solidFill>
-                <a:prstClr val="black"/>
-              </a:solidFill>
-              <a:latin typeface="Consolas"/>
-            </a:endParaRPr>
-          </a:p>
-          <a:p>
-            <a:r>
-              <a:rPr lang="en-US" dirty="0">
-                <a:solidFill>
-                  <a:prstClr val="black"/>
-                </a:solidFill>
-                <a:latin typeface="Consolas"/>
-              </a:rPr>
-              <a:t>    </a:t>
-            </a:r>
-            <a:r>
-              <a:rPr lang="en-US" dirty="0">
-                <a:solidFill>
-                  <a:srgbClr val="0000FF"/>
-                </a:solidFill>
-                <a:latin typeface="Consolas"/>
-              </a:rPr>
-              <a:t>VALUES </a:t>
-            </a:r>
-            <a:r>
-              <a:rPr lang="en-US" dirty="0">
-                <a:solidFill>
-                  <a:srgbClr val="808080"/>
-                </a:solidFill>
-                <a:latin typeface="Consolas"/>
-              </a:rPr>
-              <a:t>(</a:t>
-            </a:r>
-            <a:r>
-              <a:rPr lang="en-US" dirty="0">
-                <a:solidFill>
-                  <a:srgbClr val="FF0000"/>
-                </a:solidFill>
-                <a:latin typeface="Consolas"/>
-              </a:rPr>
-              <a:t>'</a:t>
-            </a:r>
-            <a:r>
-              <a:rPr lang="ru-RU" dirty="0">
-                <a:solidFill>
-                  <a:srgbClr val="FF0000"/>
-                </a:solidFill>
-                <a:latin typeface="Consolas"/>
-              </a:rPr>
-              <a:t>Европа'</a:t>
-            </a:r>
-            <a:r>
-              <a:rPr lang="ru-RU" dirty="0">
-                <a:solidFill>
-                  <a:srgbClr val="808080"/>
-                </a:solidFill>
-                <a:latin typeface="Consolas"/>
-              </a:rPr>
-              <a:t>,</a:t>
-            </a:r>
-            <a:r>
-              <a:rPr lang="ru-RU" dirty="0">
-                <a:solidFill>
-                  <a:prstClr val="black"/>
-                </a:solidFill>
-                <a:latin typeface="Consolas"/>
-              </a:rPr>
-              <a:t> </a:t>
-            </a:r>
-            <a:r>
-              <a:rPr lang="ru-RU" dirty="0">
-                <a:solidFill>
-                  <a:srgbClr val="FF0000"/>
-                </a:solidFill>
-                <a:latin typeface="Consolas"/>
-              </a:rPr>
-              <a:t>'Австрия'</a:t>
-            </a:r>
-            <a:r>
-              <a:rPr lang="ru-RU" dirty="0">
-                <a:solidFill>
-                  <a:srgbClr val="808080"/>
-                </a:solidFill>
-                <a:latin typeface="Consolas"/>
-              </a:rPr>
-              <a:t>,</a:t>
-            </a:r>
-            <a:r>
-              <a:rPr lang="ru-RU" dirty="0">
-                <a:solidFill>
-                  <a:prstClr val="black"/>
-                </a:solidFill>
-                <a:latin typeface="Consolas"/>
-              </a:rPr>
-              <a:t> </a:t>
-            </a:r>
-            <a:r>
-              <a:rPr lang="ru-RU" dirty="0">
-                <a:solidFill>
-                  <a:srgbClr val="FF0000"/>
-                </a:solidFill>
-                <a:latin typeface="Consolas"/>
-              </a:rPr>
-              <a:t>'Вена'</a:t>
-            </a:r>
-            <a:r>
-              <a:rPr lang="ru-RU" dirty="0">
-                <a:solidFill>
-                  <a:srgbClr val="808080"/>
-                </a:solidFill>
-                <a:latin typeface="Consolas"/>
-              </a:rPr>
-              <a:t>)</a:t>
-            </a:r>
-            <a:endParaRPr lang="ru-RU" dirty="0">
-              <a:solidFill>
-                <a:prstClr val="black"/>
-              </a:solidFill>
-              <a:latin typeface="Consolas"/>
-            </a:endParaRPr>
-          </a:p>
-          <a:p>
-            <a:r>
-              <a:rPr lang="ru-RU" dirty="0">
-                <a:solidFill>
-                  <a:prstClr val="black"/>
-                </a:solidFill>
-                <a:latin typeface="Consolas"/>
-              </a:rPr>
-              <a:t>         </a:t>
-            </a:r>
-            <a:r>
-              <a:rPr lang="ru-RU" dirty="0">
-                <a:solidFill>
-                  <a:srgbClr val="808080"/>
-                </a:solidFill>
-                <a:latin typeface="Consolas"/>
-              </a:rPr>
-              <a:t>,</a:t>
-            </a:r>
-            <a:r>
-              <a:rPr lang="ru-RU" dirty="0">
-                <a:solidFill>
-                  <a:srgbClr val="0000FF"/>
-                </a:solidFill>
-                <a:latin typeface="Consolas"/>
-              </a:rPr>
-              <a:t> </a:t>
-            </a:r>
-            <a:r>
-              <a:rPr lang="ru-RU" dirty="0">
-                <a:solidFill>
-                  <a:srgbClr val="808080"/>
-                </a:solidFill>
-                <a:latin typeface="Consolas"/>
-              </a:rPr>
-              <a:t>(</a:t>
-            </a:r>
-            <a:r>
-              <a:rPr lang="ru-RU" dirty="0">
-                <a:solidFill>
-                  <a:srgbClr val="FF0000"/>
-                </a:solidFill>
-                <a:latin typeface="Consolas"/>
-              </a:rPr>
-              <a:t>'Европа'</a:t>
-            </a:r>
-            <a:r>
-              <a:rPr lang="ru-RU" dirty="0">
-                <a:solidFill>
-                  <a:srgbClr val="808080"/>
-                </a:solidFill>
-                <a:latin typeface="Consolas"/>
-              </a:rPr>
-              <a:t>,</a:t>
-            </a:r>
-            <a:r>
-              <a:rPr lang="ru-RU" dirty="0">
-                <a:solidFill>
-                  <a:prstClr val="black"/>
-                </a:solidFill>
-                <a:latin typeface="Consolas"/>
-              </a:rPr>
-              <a:t> </a:t>
-            </a:r>
-            <a:r>
-              <a:rPr lang="ru-RU" dirty="0">
-                <a:solidFill>
-                  <a:srgbClr val="FF0000"/>
-                </a:solidFill>
-                <a:latin typeface="Consolas"/>
-              </a:rPr>
-              <a:t>'Албания'</a:t>
-            </a:r>
-            <a:r>
-              <a:rPr lang="ru-RU" dirty="0">
-                <a:solidFill>
-                  <a:srgbClr val="808080"/>
-                </a:solidFill>
-                <a:latin typeface="Consolas"/>
-              </a:rPr>
-              <a:t>,</a:t>
-            </a:r>
-            <a:r>
-              <a:rPr lang="ru-RU" dirty="0">
-                <a:solidFill>
-                  <a:prstClr val="black"/>
-                </a:solidFill>
-                <a:latin typeface="Consolas"/>
-              </a:rPr>
-              <a:t> </a:t>
-            </a:r>
-            <a:r>
-              <a:rPr lang="ru-RU" dirty="0">
-                <a:solidFill>
-                  <a:srgbClr val="FF0000"/>
-                </a:solidFill>
-                <a:latin typeface="Consolas"/>
-              </a:rPr>
-              <a:t>'Тирана'</a:t>
-            </a:r>
-            <a:r>
-              <a:rPr lang="ru-RU" dirty="0">
-                <a:solidFill>
-                  <a:srgbClr val="808080"/>
-                </a:solidFill>
-                <a:latin typeface="Consolas"/>
-              </a:rPr>
-              <a:t>)</a:t>
-            </a:r>
-            <a:endParaRPr lang="ru-RU" dirty="0">
-              <a:solidFill>
-                <a:prstClr val="black"/>
-              </a:solidFill>
-              <a:latin typeface="Consolas"/>
-            </a:endParaRPr>
-          </a:p>
-          <a:p>
-            <a:r>
-              <a:rPr lang="ru-RU" dirty="0">
-                <a:solidFill>
-                  <a:prstClr val="black"/>
-                </a:solidFill>
-                <a:latin typeface="Consolas"/>
-              </a:rPr>
-              <a:t>         </a:t>
-            </a:r>
-            <a:r>
-              <a:rPr lang="ru-RU" dirty="0">
-                <a:solidFill>
-                  <a:srgbClr val="808080"/>
-                </a:solidFill>
-                <a:latin typeface="Consolas"/>
-              </a:rPr>
-              <a:t>,</a:t>
-            </a:r>
-            <a:r>
-              <a:rPr lang="ru-RU" dirty="0">
-                <a:solidFill>
-                  <a:srgbClr val="0000FF"/>
-                </a:solidFill>
-                <a:latin typeface="Consolas"/>
-              </a:rPr>
-              <a:t> </a:t>
-            </a:r>
-            <a:r>
-              <a:rPr lang="ru-RU" dirty="0">
-                <a:solidFill>
-                  <a:srgbClr val="808080"/>
-                </a:solidFill>
-                <a:latin typeface="Consolas"/>
-              </a:rPr>
-              <a:t>(</a:t>
-            </a:r>
-            <a:r>
-              <a:rPr lang="ru-RU" dirty="0">
-                <a:solidFill>
-                  <a:srgbClr val="FF0000"/>
-                </a:solidFill>
-                <a:latin typeface="Consolas"/>
-              </a:rPr>
-              <a:t>'Европа'</a:t>
-            </a:r>
-            <a:r>
-              <a:rPr lang="ru-RU" dirty="0">
-                <a:solidFill>
-                  <a:srgbClr val="808080"/>
-                </a:solidFill>
-                <a:latin typeface="Consolas"/>
-              </a:rPr>
-              <a:t>,</a:t>
-            </a:r>
-            <a:r>
-              <a:rPr lang="ru-RU" dirty="0">
-                <a:solidFill>
-                  <a:prstClr val="black"/>
-                </a:solidFill>
-                <a:latin typeface="Consolas"/>
-              </a:rPr>
-              <a:t> </a:t>
-            </a:r>
-            <a:r>
-              <a:rPr lang="ru-RU" dirty="0">
-                <a:solidFill>
-                  <a:srgbClr val="FF0000"/>
-                </a:solidFill>
-                <a:latin typeface="Consolas"/>
-              </a:rPr>
-              <a:t>'Андорра'</a:t>
-            </a:r>
-            <a:r>
-              <a:rPr lang="ru-RU" dirty="0">
-                <a:solidFill>
-                  <a:srgbClr val="808080"/>
-                </a:solidFill>
-                <a:latin typeface="Consolas"/>
-              </a:rPr>
-              <a:t>,</a:t>
-            </a:r>
-            <a:r>
-              <a:rPr lang="ru-RU" dirty="0">
-                <a:solidFill>
-                  <a:prstClr val="black"/>
-                </a:solidFill>
-                <a:latin typeface="Consolas"/>
-              </a:rPr>
-              <a:t> </a:t>
-            </a:r>
-            <a:r>
-              <a:rPr lang="ru-RU" dirty="0">
-                <a:solidFill>
-                  <a:srgbClr val="FF0000"/>
-                </a:solidFill>
-                <a:latin typeface="Consolas"/>
-              </a:rPr>
-              <a:t>'Андорра-ла-Велья'</a:t>
-            </a:r>
-            <a:r>
-              <a:rPr lang="ru-RU" dirty="0">
-                <a:solidFill>
-                  <a:srgbClr val="808080"/>
-                </a:solidFill>
-                <a:latin typeface="Consolas"/>
-              </a:rPr>
-              <a:t>)</a:t>
-            </a:r>
-            <a:endParaRPr lang="ru-RU" dirty="0">
-              <a:solidFill>
-                <a:prstClr val="black"/>
-              </a:solidFill>
-              <a:latin typeface="Consolas"/>
-            </a:endParaRPr>
-          </a:p>
-          <a:p>
-            <a:r>
-              <a:rPr lang="ru-RU" dirty="0">
-                <a:solidFill>
-                  <a:prstClr val="black"/>
-                </a:solidFill>
-                <a:latin typeface="Consolas"/>
-              </a:rPr>
-              <a:t>         </a:t>
-            </a:r>
-            <a:r>
-              <a:rPr lang="ru-RU" dirty="0">
-                <a:solidFill>
-                  <a:srgbClr val="808080"/>
-                </a:solidFill>
-                <a:latin typeface="Consolas"/>
-              </a:rPr>
-              <a:t>,</a:t>
-            </a:r>
-            <a:r>
-              <a:rPr lang="ru-RU" dirty="0">
-                <a:solidFill>
-                  <a:srgbClr val="0000FF"/>
-                </a:solidFill>
-                <a:latin typeface="Consolas"/>
-              </a:rPr>
-              <a:t> </a:t>
-            </a:r>
-            <a:r>
-              <a:rPr lang="ru-RU" dirty="0">
-                <a:solidFill>
-                  <a:srgbClr val="808080"/>
-                </a:solidFill>
-                <a:latin typeface="Consolas"/>
-              </a:rPr>
-              <a:t>(</a:t>
-            </a:r>
-            <a:r>
-              <a:rPr lang="ru-RU" dirty="0">
-                <a:solidFill>
-                  <a:srgbClr val="FF0000"/>
-                </a:solidFill>
-                <a:latin typeface="Consolas"/>
-              </a:rPr>
-              <a:t>'Европа'</a:t>
-            </a:r>
-            <a:r>
-              <a:rPr lang="ru-RU" dirty="0">
-                <a:solidFill>
-                  <a:srgbClr val="808080"/>
-                </a:solidFill>
-                <a:latin typeface="Consolas"/>
-              </a:rPr>
-              <a:t>,</a:t>
-            </a:r>
-            <a:r>
-              <a:rPr lang="ru-RU" dirty="0">
-                <a:solidFill>
-                  <a:prstClr val="black"/>
-                </a:solidFill>
-                <a:latin typeface="Consolas"/>
-              </a:rPr>
-              <a:t> </a:t>
-            </a:r>
-            <a:r>
-              <a:rPr lang="ru-RU" dirty="0">
-                <a:solidFill>
-                  <a:srgbClr val="FF0000"/>
-                </a:solidFill>
-                <a:latin typeface="Consolas"/>
-              </a:rPr>
-              <a:t>'Белоруссия'</a:t>
-            </a:r>
-            <a:r>
-              <a:rPr lang="ru-RU" dirty="0">
-                <a:solidFill>
-                  <a:srgbClr val="808080"/>
-                </a:solidFill>
-                <a:latin typeface="Consolas"/>
-              </a:rPr>
-              <a:t>,</a:t>
-            </a:r>
-            <a:r>
-              <a:rPr lang="ru-RU" dirty="0">
-                <a:solidFill>
-                  <a:prstClr val="black"/>
-                </a:solidFill>
-                <a:latin typeface="Consolas"/>
-              </a:rPr>
-              <a:t> </a:t>
-            </a:r>
-            <a:r>
-              <a:rPr lang="ru-RU" dirty="0">
-                <a:solidFill>
-                  <a:srgbClr val="FF0000"/>
-                </a:solidFill>
-                <a:latin typeface="Consolas"/>
-              </a:rPr>
-              <a:t>'Минск'</a:t>
-            </a:r>
-            <a:r>
-              <a:rPr lang="ru-RU" dirty="0">
-                <a:solidFill>
-                  <a:srgbClr val="808080"/>
-                </a:solidFill>
-                <a:latin typeface="Consolas"/>
-              </a:rPr>
-              <a:t>)</a:t>
-            </a:r>
-            <a:endParaRPr lang="ru-RU" dirty="0">
-              <a:solidFill>
-                <a:prstClr val="black"/>
-              </a:solidFill>
-              <a:latin typeface="Consolas"/>
-            </a:endParaRPr>
-          </a:p>
-          <a:p>
-            <a:r>
-              <a:rPr lang="ru-RU" dirty="0">
-                <a:solidFill>
-                  <a:prstClr val="black"/>
-                </a:solidFill>
-                <a:latin typeface="Consolas"/>
-              </a:rPr>
-              <a:t>         </a:t>
-            </a:r>
-            <a:r>
-              <a:rPr lang="ru-RU" dirty="0">
-                <a:solidFill>
-                  <a:srgbClr val="808080"/>
-                </a:solidFill>
-                <a:latin typeface="Consolas"/>
-              </a:rPr>
-              <a:t>,</a:t>
-            </a:r>
-            <a:r>
-              <a:rPr lang="ru-RU" dirty="0">
-                <a:solidFill>
-                  <a:srgbClr val="0000FF"/>
-                </a:solidFill>
-                <a:latin typeface="Consolas"/>
-              </a:rPr>
-              <a:t> </a:t>
-            </a:r>
-            <a:r>
-              <a:rPr lang="ru-RU" dirty="0">
-                <a:solidFill>
-                  <a:srgbClr val="808080"/>
-                </a:solidFill>
-                <a:latin typeface="Consolas"/>
-              </a:rPr>
-              <a:t>(</a:t>
-            </a:r>
-            <a:r>
-              <a:rPr lang="ru-RU" dirty="0">
-                <a:solidFill>
-                  <a:srgbClr val="FF0000"/>
-                </a:solidFill>
-                <a:latin typeface="Consolas"/>
-              </a:rPr>
-              <a:t>'Европа'</a:t>
-            </a:r>
-            <a:r>
-              <a:rPr lang="ru-RU" dirty="0">
-                <a:solidFill>
-                  <a:srgbClr val="808080"/>
-                </a:solidFill>
-                <a:latin typeface="Consolas"/>
-              </a:rPr>
-              <a:t>,</a:t>
-            </a:r>
-            <a:r>
-              <a:rPr lang="ru-RU" dirty="0">
-                <a:solidFill>
-                  <a:prstClr val="black"/>
-                </a:solidFill>
-                <a:latin typeface="Consolas"/>
-              </a:rPr>
-              <a:t> </a:t>
-            </a:r>
-            <a:r>
-              <a:rPr lang="ru-RU" dirty="0">
-                <a:solidFill>
-                  <a:srgbClr val="FF0000"/>
-                </a:solidFill>
-                <a:latin typeface="Consolas"/>
-              </a:rPr>
-              <a:t>'Бельгия'</a:t>
-            </a:r>
-            <a:r>
-              <a:rPr lang="ru-RU" dirty="0">
-                <a:solidFill>
-                  <a:srgbClr val="808080"/>
-                </a:solidFill>
-                <a:latin typeface="Consolas"/>
-              </a:rPr>
-              <a:t>,</a:t>
-            </a:r>
-            <a:r>
-              <a:rPr lang="ru-RU" dirty="0">
-                <a:solidFill>
-                  <a:prstClr val="black"/>
-                </a:solidFill>
-                <a:latin typeface="Consolas"/>
-              </a:rPr>
-              <a:t> </a:t>
-            </a:r>
-            <a:r>
-              <a:rPr lang="ru-RU" dirty="0">
-                <a:solidFill>
-                  <a:srgbClr val="FF0000"/>
-                </a:solidFill>
-                <a:latin typeface="Consolas"/>
-              </a:rPr>
-              <a:t>'Брюссель'</a:t>
-            </a:r>
-            <a:r>
-              <a:rPr lang="ru-RU" dirty="0">
-                <a:solidFill>
-                  <a:srgbClr val="808080"/>
-                </a:solidFill>
-                <a:latin typeface="Consolas"/>
-              </a:rPr>
-              <a:t>)</a:t>
-            </a:r>
-            <a:endParaRPr lang="ru-RU" dirty="0">
-              <a:solidFill>
-                <a:prstClr val="black"/>
-              </a:solidFill>
-              <a:latin typeface="Consolas"/>
-            </a:endParaRPr>
-          </a:p>
-          <a:p>
-            <a:endParaRPr lang="ru-RU" dirty="0">
-              <a:solidFill>
-                <a:prstClr val="black"/>
-              </a:solidFill>
-              <a:latin typeface="Consolas"/>
-            </a:endParaRPr>
-          </a:p>
-        </p:txBody>
-      </p:sp>
-    </p:spTree>
-    <p:extLst>
-      <p:ext uri="{BB962C8B-B14F-4D97-AF65-F5344CB8AC3E}">
-        <p14:creationId xmlns:p14="http://schemas.microsoft.com/office/powerpoint/2010/main" val="1003551259"/>
       </p:ext>
     </p:extLst>
   </p:cSld>
@@ -9473,18 +9750,32 @@
         </p:nvSpPr>
         <p:spPr/>
         <p:txBody>
-          <a:bodyPr/>
+          <a:bodyPr>
+            <a:noAutofit/>
+          </a:bodyPr>
           <a:lstStyle/>
           <a:p>
             <a:r>
-              <a:rPr lang="en-US" dirty="0" smtClean="0"/>
-              <a:t>T-SQL: </a:t>
-            </a:r>
-            <a:r>
-              <a:rPr lang="ru-RU" dirty="0" smtClean="0"/>
-              <a:t>Комментарии</a:t>
-            </a:r>
-            <a:endParaRPr lang="en-US" dirty="0"/>
+              <a:rPr lang="ru-RU" sz="3600" dirty="0" smtClean="0"/>
+              <a:t>«Сокращенный» </a:t>
+            </a:r>
+            <a:r>
+              <a:rPr lang="en-US" sz="3600" dirty="0" smtClean="0"/>
+              <a:t>INSERT</a:t>
+            </a:r>
+            <a:r>
+              <a:rPr lang="ru-RU" sz="3600" dirty="0" smtClean="0"/>
+              <a:t>в </a:t>
+            </a:r>
+            <a:r>
+              <a:rPr lang="en-US" sz="3600" dirty="0" smtClean="0"/>
+              <a:t>MS SQL 2008 </a:t>
+            </a:r>
+            <a:r>
+              <a:rPr lang="ru-RU" sz="3600" dirty="0" smtClean="0"/>
+              <a:t>и выше</a:t>
+            </a:r>
+            <a:endParaRPr lang="en-US" sz="3600" dirty="0"/>
           </a:p>
         </p:txBody>
       </p:sp>
@@ -9500,8 +9791,8 @@
         </p:nvSpPr>
         <p:spPr>
           <a:xfrm>
-            <a:off x="457200" y="1600201"/>
-            <a:ext cx="8147248" cy="1180728"/>
+            <a:off x="457200" y="1600200"/>
+            <a:ext cx="8147248" cy="2332855"/>
           </a:xfrm>
         </p:spPr>
         <p:txBody>
@@ -9514,26 +9805,37 @@
               <a:buNone/>
             </a:pPr>
             <a:r>
+              <a:rPr lang="ru-RU" dirty="0" smtClean="0"/>
+              <a:t>В </a:t>
+            </a:r>
+            <a:r>
               <a:rPr lang="en-US" dirty="0" smtClean="0"/>
-              <a:t>SQL </a:t>
+              <a:t>SQL Server 2008 </a:t>
+            </a:r>
+            <a:r>
+              <a:rPr lang="ru-RU" dirty="0"/>
+              <a:t>и выше </a:t>
             </a:r>
             <a:r>
               <a:rPr lang="ru-RU" dirty="0" smtClean="0"/>
-              <a:t>поддерживает однострочные (--) и многострочные комментарии (</a:t>
+              <a:t>команда </a:t>
             </a:r>
             <a:r>
               <a:rPr lang="en-US" dirty="0" smtClean="0"/>
-              <a:t>/* ... */</a:t>
+              <a:t>INSERT </a:t>
             </a:r>
             <a:r>
               <a:rPr lang="ru-RU" dirty="0" smtClean="0"/>
-              <a:t>:</a:t>
-            </a:r>
-          </a:p>
-          <a:p>
-            <a:pPr marL="0" indent="0">
-              <a:buNone/>
-            </a:pPr>
+              <a:t>дает возможность вставить несколько строк за один вызов</a:t>
+            </a:r>
+            <a:r>
+              <a:rPr lang="en-US" dirty="0" smtClean="0"/>
+              <a:t>. </a:t>
+            </a:r>
+            <a:r>
+              <a:rPr lang="ru-RU" dirty="0" smtClean="0"/>
+              <a:t>Добавление производится в рамках общей транзакции.</a:t>
+            </a:r>
             <a:endParaRPr lang="en-US" dirty="0"/>
           </a:p>
         </p:txBody>
@@ -9546,8 +9848,8 @@
         </p:nvSpPr>
         <p:spPr>
           <a:xfrm>
-            <a:off x="457200" y="2837835"/>
-            <a:ext cx="8147248" cy="1477328"/>
+            <a:off x="457200" y="3989963"/>
+            <a:ext cx="8147248" cy="2031325"/>
           </a:xfrm>
           <a:prstGeom prst="rect">
             <a:avLst/>
@@ -9563,13 +9865,246 @@
           <a:lstStyle/>
           <a:p>
             <a:r>
+              <a:rPr lang="en-US" dirty="0">
+                <a:solidFill>
+                  <a:srgbClr val="0000FF"/>
+                </a:solidFill>
+                <a:latin typeface="Consolas"/>
+              </a:rPr>
+              <a:t>INSERT</a:t>
+            </a:r>
+            <a:r>
+              <a:rPr lang="en-US" dirty="0">
+                <a:solidFill>
+                  <a:prstClr val="black"/>
+                </a:solidFill>
+                <a:latin typeface="Consolas"/>
+              </a:rPr>
+              <a:t> </a:t>
+            </a:r>
+            <a:r>
+              <a:rPr lang="en-US" dirty="0">
+                <a:solidFill>
+                  <a:srgbClr val="0000FF"/>
+                </a:solidFill>
+                <a:latin typeface="Consolas"/>
+              </a:rPr>
+              <a:t>INTO</a:t>
+            </a:r>
+            <a:r>
+              <a:rPr lang="en-US" dirty="0">
+                <a:solidFill>
+                  <a:prstClr val="black"/>
+                </a:solidFill>
+                <a:latin typeface="Consolas"/>
+              </a:rPr>
+              <a:t> </a:t>
+            </a:r>
+            <a:r>
+              <a:rPr lang="en-US" dirty="0" err="1">
+                <a:solidFill>
+                  <a:prstClr val="black"/>
+                </a:solidFill>
+                <a:latin typeface="Consolas"/>
+              </a:rPr>
+              <a:t>CountryCapital</a:t>
+            </a:r>
+            <a:r>
+              <a:rPr lang="en-US" dirty="0">
+                <a:solidFill>
+                  <a:srgbClr val="0000FF"/>
+                </a:solidFill>
+                <a:latin typeface="Consolas"/>
+              </a:rPr>
+              <a:t> </a:t>
+            </a:r>
+            <a:r>
+              <a:rPr lang="en-US" dirty="0">
+                <a:solidFill>
+                  <a:srgbClr val="808080"/>
+                </a:solidFill>
+                <a:latin typeface="Consolas"/>
+              </a:rPr>
+              <a:t>(</a:t>
+            </a:r>
+            <a:r>
+              <a:rPr lang="en-US" dirty="0" err="1">
+                <a:solidFill>
+                  <a:prstClr val="black"/>
+                </a:solidFill>
+                <a:latin typeface="Consolas"/>
+              </a:rPr>
+              <a:t>PartOfWorld</a:t>
+            </a:r>
+            <a:r>
+              <a:rPr lang="en-US" dirty="0">
+                <a:solidFill>
+                  <a:srgbClr val="808080"/>
+                </a:solidFill>
+                <a:latin typeface="Consolas"/>
+              </a:rPr>
+              <a:t>,</a:t>
+            </a:r>
+            <a:r>
+              <a:rPr lang="en-US" dirty="0">
+                <a:solidFill>
+                  <a:prstClr val="black"/>
+                </a:solidFill>
+                <a:latin typeface="Consolas"/>
+              </a:rPr>
+              <a:t> Country</a:t>
+            </a:r>
+            <a:r>
+              <a:rPr lang="en-US" dirty="0">
+                <a:solidFill>
+                  <a:srgbClr val="808080"/>
+                </a:solidFill>
+                <a:latin typeface="Consolas"/>
+              </a:rPr>
+              <a:t>,</a:t>
+            </a:r>
+            <a:r>
+              <a:rPr lang="en-US" dirty="0">
+                <a:solidFill>
+                  <a:prstClr val="black"/>
+                </a:solidFill>
+                <a:latin typeface="Consolas"/>
+              </a:rPr>
+              <a:t> </a:t>
+            </a:r>
+            <a:r>
+              <a:rPr lang="en-US" dirty="0" err="1">
+                <a:solidFill>
+                  <a:prstClr val="black"/>
+                </a:solidFill>
+                <a:latin typeface="Consolas"/>
+              </a:rPr>
+              <a:t>CapitalCity</a:t>
+            </a:r>
+            <a:r>
+              <a:rPr lang="en-US" dirty="0">
+                <a:solidFill>
+                  <a:srgbClr val="808080"/>
+                </a:solidFill>
+                <a:latin typeface="Consolas"/>
+              </a:rPr>
+              <a:t>)</a:t>
+            </a:r>
+            <a:endParaRPr lang="en-US" dirty="0">
+              <a:solidFill>
+                <a:prstClr val="black"/>
+              </a:solidFill>
+              <a:latin typeface="Consolas"/>
+            </a:endParaRPr>
+          </a:p>
+          <a:p>
+            <a:r>
+              <a:rPr lang="en-US" dirty="0">
+                <a:solidFill>
+                  <a:prstClr val="black"/>
+                </a:solidFill>
+                <a:latin typeface="Consolas"/>
+              </a:rPr>
+              <a:t>    </a:t>
+            </a:r>
+            <a:r>
+              <a:rPr lang="en-US" dirty="0">
+                <a:solidFill>
+                  <a:srgbClr val="0000FF"/>
+                </a:solidFill>
+                <a:latin typeface="Consolas"/>
+              </a:rPr>
+              <a:t>VALUES </a:t>
+            </a:r>
+            <a:r>
+              <a:rPr lang="en-US" dirty="0">
+                <a:solidFill>
+                  <a:srgbClr val="808080"/>
+                </a:solidFill>
+                <a:latin typeface="Consolas"/>
+              </a:rPr>
+              <a:t>(</a:t>
+            </a:r>
+            <a:r>
+              <a:rPr lang="en-US" dirty="0">
+                <a:solidFill>
+                  <a:srgbClr val="FF0000"/>
+                </a:solidFill>
+                <a:latin typeface="Consolas"/>
+              </a:rPr>
+              <a:t>'</a:t>
+            </a:r>
+            <a:r>
               <a:rPr lang="ru-RU" dirty="0">
                 <a:solidFill>
-                  <a:srgbClr val="008000"/>
+                  <a:srgbClr val="FF0000"/>
                 </a:solidFill>
                 <a:latin typeface="Consolas"/>
               </a:rPr>
-              <a:t>/*</a:t>
+              <a:t>Европа'</a:t>
+            </a:r>
+            <a:r>
+              <a:rPr lang="ru-RU" dirty="0">
+                <a:solidFill>
+                  <a:srgbClr val="808080"/>
+                </a:solidFill>
+                <a:latin typeface="Consolas"/>
+              </a:rPr>
+              <a:t>,</a:t>
+            </a:r>
+            <a:r>
+              <a:rPr lang="ru-RU" dirty="0">
+                <a:solidFill>
+                  <a:prstClr val="black"/>
+                </a:solidFill>
+                <a:latin typeface="Consolas"/>
+              </a:rPr>
+              <a:t> </a:t>
+            </a:r>
+            <a:r>
+              <a:rPr lang="ru-RU" dirty="0">
+                <a:solidFill>
+                  <a:srgbClr val="FF0000"/>
+                </a:solidFill>
+                <a:latin typeface="Consolas"/>
+              </a:rPr>
+              <a:t>'Австрия'</a:t>
+            </a:r>
+            <a:r>
+              <a:rPr lang="ru-RU" dirty="0">
+                <a:solidFill>
+                  <a:srgbClr val="808080"/>
+                </a:solidFill>
+                <a:latin typeface="Consolas"/>
+              </a:rPr>
+              <a:t>,</a:t>
+            </a:r>
+            <a:r>
+              <a:rPr lang="ru-RU" dirty="0">
+                <a:solidFill>
+                  <a:prstClr val="black"/>
+                </a:solidFill>
+                <a:latin typeface="Consolas"/>
+              </a:rPr>
+              <a:t> </a:t>
+            </a:r>
+            <a:r>
+              <a:rPr lang="ru-RU" dirty="0">
+                <a:solidFill>
+                  <a:srgbClr val="FF0000"/>
+                </a:solidFill>
+                <a:latin typeface="Consolas"/>
+              </a:rPr>
+              <a:t>'Вена'</a:t>
+            </a:r>
+            <a:r>
+              <a:rPr lang="ru-RU" dirty="0">
+                <a:solidFill>
+                  <a:srgbClr val="808080"/>
+                </a:solidFill>
+                <a:latin typeface="Consolas"/>
+              </a:rPr>
+              <a:t>)</a:t>
             </a:r>
             <a:endParaRPr lang="ru-RU" dirty="0">
               <a:solidFill>
@@ -9582,29 +10117,110 @@
             <a:r>
               <a:rPr lang="ru-RU" dirty="0">
                 <a:solidFill>
-                  <a:srgbClr val="008000"/>
+                  <a:prstClr val="black"/>
                 </a:solidFill>
                 <a:latin typeface="Consolas"/>
               </a:rPr>
-              <a:t>    Пример простого </a:t>
-            </a:r>
-            <a:r>
-              <a:rPr lang="en-US" dirty="0">
-                <a:solidFill>
-                  <a:srgbClr val="008000"/>
+              <a:t>         </a:t>
+            </a:r>
+            <a:r>
+              <a:rPr lang="ru-RU" dirty="0">
+                <a:solidFill>
+                  <a:srgbClr val="808080"/>
                 </a:solidFill>
                 <a:latin typeface="Consolas"/>
               </a:rPr>
-              <a:t>T-SQL </a:t>
+              <a:t>,</a:t>
             </a:r>
             <a:r>
               <a:rPr lang="ru-RU" dirty="0">
                 <a:solidFill>
-                  <a:srgbClr val="008000"/>
+                  <a:srgbClr val="0000FF"/>
                 </a:solidFill>
                 <a:latin typeface="Consolas"/>
               </a:rPr>
-              <a:t>скрипта</a:t>
+              <a:t> </a:t>
+            </a:r>
+            <a:r>
+              <a:rPr lang="ru-RU" dirty="0">
+                <a:solidFill>
+                  <a:srgbClr val="808080"/>
+                </a:solidFill>
+                <a:latin typeface="Consolas"/>
+              </a:rPr>
+              <a:t>(</a:t>
+            </a:r>
+            <a:r>
+              <a:rPr lang="ru-RU" dirty="0">
+                <a:solidFill>
+                  <a:srgbClr val="FF0000"/>
+                </a:solidFill>
+                <a:latin typeface="Consolas"/>
+              </a:rPr>
+              <a:t>'Европа'</a:t>
+            </a:r>
+            <a:r>
+              <a:rPr lang="ru-RU" dirty="0">
+                <a:solidFill>
+                  <a:srgbClr val="808080"/>
+                </a:solidFill>
+                <a:latin typeface="Consolas"/>
+              </a:rPr>
+              <a:t>,</a:t>
+            </a:r>
+            <a:r>
+              <a:rPr lang="ru-RU" dirty="0">
+                <a:solidFill>
+                  <a:prstClr val="black"/>
+                </a:solidFill>
+                <a:latin typeface="Consolas"/>
+              </a:rPr>
+              <a:t> </a:t>
+            </a:r>
+            <a:r>
+              <a:rPr lang="ru-RU" dirty="0">
+                <a:solidFill>
+                  <a:srgbClr val="FF0000"/>
+                </a:solidFill>
+                <a:latin typeface="Consolas"/>
+              </a:rPr>
+              <a:t>'Албания'</a:t>
+            </a:r>
+            <a:r>
+              <a:rPr lang="ru-RU" dirty="0">
+                <a:solidFill>
+                  <a:srgbClr val="808080"/>
+                </a:solidFill>
+                <a:latin typeface="Consolas"/>
+              </a:rPr>
+              <a:t>,</a:t>
+            </a:r>
+            <a:r>
+              <a:rPr lang="ru-RU" dirty="0">
+                <a:solidFill>
+                  <a:prstClr val="black"/>
+                </a:solidFill>
+                <a:latin typeface="Consolas"/>
+              </a:rPr>
+              <a:t> </a:t>
+            </a:r>
+            <a:r>
+              <a:rPr lang="ru-RU" dirty="0">
+                <a:solidFill>
+                  <a:srgbClr val="FF0000"/>
+                </a:solidFill>
+                <a:latin typeface="Consolas"/>
+              </a:rPr>
+              <a:t>'Тирана'</a:t>
+            </a:r>
+            <a:r>
+              <a:rPr lang="ru-RU" dirty="0">
+                <a:solidFill>
+                  <a:srgbClr val="808080"/>
+                </a:solidFill>
+                <a:latin typeface="Consolas"/>
+              </a:rPr>
+              <a:t>)</a:t>
             </a:r>
             <a:endParaRPr lang="ru-RU" dirty="0">
               <a:solidFill>
@@ -9617,11 +10233,110 @@
             <a:r>
               <a:rPr lang="ru-RU" dirty="0">
                 <a:solidFill>
-                  <a:srgbClr val="008000"/>
+                  <a:prstClr val="black"/>
                 </a:solidFill>
                 <a:latin typeface="Consolas"/>
               </a:rPr>
-              <a:t>*/</a:t>
+              <a:t>         </a:t>
+            </a:r>
+            <a:r>
+              <a:rPr lang="ru-RU" dirty="0">
+                <a:solidFill>
+                  <a:srgbClr val="808080"/>
+                </a:solidFill>
+                <a:latin typeface="Consolas"/>
+              </a:rPr>
+              <a:t>,</a:t>
+            </a:r>
+            <a:r>
+              <a:rPr lang="ru-RU" dirty="0">
+                <a:solidFill>
+                  <a:srgbClr val="0000FF"/>
+                </a:solidFill>
+                <a:latin typeface="Consolas"/>
+              </a:rPr>
+              <a:t> </a:t>
+            </a:r>
+            <a:r>
+              <a:rPr lang="ru-RU" dirty="0">
+                <a:solidFill>
+                  <a:srgbClr val="808080"/>
+                </a:solidFill>
+                <a:latin typeface="Consolas"/>
+              </a:rPr>
+              <a:t>(</a:t>
+            </a:r>
+            <a:r>
+              <a:rPr lang="ru-RU" dirty="0">
+                <a:solidFill>
+                  <a:srgbClr val="FF0000"/>
+                </a:solidFill>
+                <a:latin typeface="Consolas"/>
+              </a:rPr>
+              <a:t>'Европа'</a:t>
+            </a:r>
+            <a:r>
+              <a:rPr lang="ru-RU" dirty="0">
+                <a:solidFill>
+                  <a:srgbClr val="808080"/>
+                </a:solidFill>
+                <a:latin typeface="Consolas"/>
+              </a:rPr>
+              <a:t>,</a:t>
+            </a:r>
+            <a:r>
+              <a:rPr lang="ru-RU" dirty="0">
+                <a:solidFill>
+                  <a:prstClr val="black"/>
+                </a:solidFill>
+                <a:latin typeface="Consolas"/>
+              </a:rPr>
+              <a:t> </a:t>
+            </a:r>
+            <a:r>
+              <a:rPr lang="ru-RU" dirty="0">
+                <a:solidFill>
+                  <a:srgbClr val="FF0000"/>
+                </a:solidFill>
+                <a:latin typeface="Consolas"/>
+              </a:rPr>
+              <a:t>'Андорра'</a:t>
+            </a:r>
+            <a:r>
+              <a:rPr lang="ru-RU" dirty="0">
+                <a:solidFill>
+                  <a:srgbClr val="808080"/>
+                </a:solidFill>
+                <a:latin typeface="Consolas"/>
+              </a:rPr>
+              <a:t>,</a:t>
+            </a:r>
+            <a:r>
+              <a:rPr lang="ru-RU" dirty="0">
+                <a:solidFill>
+                  <a:prstClr val="black"/>
+                </a:solidFill>
+                <a:latin typeface="Consolas"/>
+              </a:rPr>
+              <a:t> </a:t>
+            </a:r>
+            <a:r>
+              <a:rPr lang="ru-RU" dirty="0">
+                <a:solidFill>
+                  <a:srgbClr val="FF0000"/>
+                </a:solidFill>
+                <a:latin typeface="Consolas"/>
+              </a:rPr>
+              <a:t>'Андорра-ла-Велья'</a:t>
+            </a:r>
+            <a:r>
+              <a:rPr lang="ru-RU" dirty="0">
+                <a:solidFill>
+                  <a:srgbClr val="808080"/>
+                </a:solidFill>
+                <a:latin typeface="Consolas"/>
+              </a:rPr>
+              <a:t>)</a:t>
             </a:r>
             <a:endParaRPr lang="ru-RU" dirty="0">
               <a:solidFill>
@@ -9634,15 +10349,60 @@
             <a:r>
               <a:rPr lang="ru-RU" dirty="0">
                 <a:solidFill>
+                  <a:prstClr val="black"/>
+                </a:solidFill>
+                <a:latin typeface="Consolas"/>
+              </a:rPr>
+              <a:t>         </a:t>
+            </a:r>
+            <a:r>
+              <a:rPr lang="ru-RU" dirty="0">
+                <a:solidFill>
+                  <a:srgbClr val="808080"/>
+                </a:solidFill>
+                <a:latin typeface="Consolas"/>
+              </a:rPr>
+              <a:t>,</a:t>
+            </a:r>
+            <a:r>
+              <a:rPr lang="ru-RU" dirty="0">
+                <a:solidFill>
                   <a:srgbClr val="0000FF"/>
                 </a:solidFill>
                 <a:latin typeface="Consolas"/>
               </a:rPr>
-              <a:t>EXEC</a:t>
+              <a:t> </a:t>
             </a:r>
             <a:r>
               <a:rPr lang="ru-RU" dirty="0">
                 <a:solidFill>
+                  <a:srgbClr val="808080"/>
+                </a:solidFill>
+                <a:latin typeface="Consolas"/>
+              </a:rPr>
+              <a:t>(</a:t>
+            </a:r>
+            <a:r>
+              <a:rPr lang="ru-RU" dirty="0">
+                <a:solidFill>
+                  <a:srgbClr val="FF0000"/>
+                </a:solidFill>
+                <a:latin typeface="Consolas"/>
+              </a:rPr>
+              <a:t>'Европа'</a:t>
+            </a:r>
+            <a:r>
+              <a:rPr lang="ru-RU" dirty="0">
+                <a:solidFill>
+                  <a:srgbClr val="808080"/>
+                </a:solidFill>
+                <a:latin typeface="Consolas"/>
+              </a:rPr>
+              <a:t>,</a:t>
+            </a:r>
+            <a:r>
+              <a:rPr lang="ru-RU" dirty="0">
+                <a:solidFill>
                   <a:prstClr val="black"/>
                 </a:solidFill>
                 <a:latin typeface="Consolas"/>
@@ -9652,29 +10412,47 @@
             <a:r>
               <a:rPr lang="ru-RU" dirty="0">
                 <a:solidFill>
-                  <a:srgbClr val="800000"/>
+                  <a:srgbClr val="FF0000"/>
                 </a:solidFill>
                 <a:latin typeface="Consolas"/>
               </a:rPr>
-              <a:t>sp_help</a:t>
+              <a:t>'Белоруссия'</a:t>
             </a:r>
             <a:r>
               <a:rPr lang="ru-RU" dirty="0">
                 <a:solidFill>
-                  <a:srgbClr val="0000FF"/>
+                  <a:srgbClr val="808080"/>
                 </a:solidFill>
                 <a:latin typeface="Consolas"/>
               </a:rPr>
+              <a:t>,</a:t>
+            </a:r>
+            <a:r>
+              <a:rPr lang="ru-RU" dirty="0">
+                <a:solidFill>
+                  <a:prstClr val="black"/>
+                </a:solidFill>
+                <a:latin typeface="Consolas"/>
+              </a:rPr>
               <a:t> </a:t>
             </a:r>
             <a:r>
               <a:rPr lang="ru-RU" dirty="0">
                 <a:solidFill>
-                  <a:srgbClr val="008000"/>
+                  <a:srgbClr val="FF0000"/>
                 </a:solidFill>
                 <a:latin typeface="Consolas"/>
               </a:rPr>
-              <a:t>-- Выполняем системную хранимую процедуру sp_help</a:t>
+              <a:t>'Минск'</a:t>
+            </a:r>
+            <a:r>
+              <a:rPr lang="ru-RU" dirty="0">
+                <a:solidFill>
+                  <a:srgbClr val="808080"/>
+                </a:solidFill>
+                <a:latin typeface="Consolas"/>
+              </a:rPr>
+              <a:t>)</a:t>
             </a:r>
             <a:endParaRPr lang="ru-RU" dirty="0">
               <a:solidFill>
@@ -9684,6 +10462,114 @@
             </a:endParaRPr>
           </a:p>
           <a:p>
+            <a:r>
+              <a:rPr lang="ru-RU" dirty="0">
+                <a:solidFill>
+                  <a:prstClr val="black"/>
+                </a:solidFill>
+                <a:latin typeface="Consolas"/>
+              </a:rPr>
+              <a:t>         </a:t>
+            </a:r>
+            <a:r>
+              <a:rPr lang="ru-RU" dirty="0">
+                <a:solidFill>
+                  <a:srgbClr val="808080"/>
+                </a:solidFill>
+                <a:latin typeface="Consolas"/>
+              </a:rPr>
+              <a:t>,</a:t>
+            </a:r>
+            <a:r>
+              <a:rPr lang="ru-RU" dirty="0">
+                <a:solidFill>
+                  <a:srgbClr val="0000FF"/>
+                </a:solidFill>
+                <a:latin typeface="Consolas"/>
+              </a:rPr>
+              <a:t> </a:t>
+            </a:r>
+            <a:r>
+              <a:rPr lang="ru-RU" dirty="0">
+                <a:solidFill>
+                  <a:srgbClr val="808080"/>
+                </a:solidFill>
+                <a:latin typeface="Consolas"/>
+              </a:rPr>
+              <a:t>(</a:t>
+            </a:r>
+            <a:r>
+              <a:rPr lang="ru-RU" dirty="0">
+                <a:solidFill>
+                  <a:srgbClr val="FF0000"/>
+                </a:solidFill>
+                <a:latin typeface="Consolas"/>
+              </a:rPr>
+              <a:t>'Европа'</a:t>
+            </a:r>
+            <a:r>
+              <a:rPr lang="ru-RU" dirty="0">
+                <a:solidFill>
+                  <a:srgbClr val="808080"/>
+                </a:solidFill>
+                <a:latin typeface="Consolas"/>
+              </a:rPr>
+              <a:t>,</a:t>
+            </a:r>
+            <a:r>
+              <a:rPr lang="ru-RU" dirty="0">
+                <a:solidFill>
+                  <a:prstClr val="black"/>
+                </a:solidFill>
+                <a:latin typeface="Consolas"/>
+              </a:rPr>
+              <a:t> </a:t>
+            </a:r>
+            <a:r>
+              <a:rPr lang="ru-RU" dirty="0">
+                <a:solidFill>
+                  <a:srgbClr val="FF0000"/>
+                </a:solidFill>
+                <a:latin typeface="Consolas"/>
+              </a:rPr>
+              <a:t>'Бельгия'</a:t>
+            </a:r>
+            <a:r>
+              <a:rPr lang="ru-RU" dirty="0">
+                <a:solidFill>
+                  <a:srgbClr val="808080"/>
+                </a:solidFill>
+                <a:latin typeface="Consolas"/>
+              </a:rPr>
+              <a:t>,</a:t>
+            </a:r>
+            <a:r>
+              <a:rPr lang="ru-RU" dirty="0">
+                <a:solidFill>
+                  <a:prstClr val="black"/>
+                </a:solidFill>
+                <a:latin typeface="Consolas"/>
+              </a:rPr>
+              <a:t> </a:t>
+            </a:r>
+            <a:r>
+              <a:rPr lang="ru-RU" dirty="0">
+                <a:solidFill>
+                  <a:srgbClr val="FF0000"/>
+                </a:solidFill>
+                <a:latin typeface="Consolas"/>
+              </a:rPr>
+              <a:t>'Брюссель'</a:t>
+            </a:r>
+            <a:r>
+              <a:rPr lang="ru-RU" dirty="0">
+                <a:solidFill>
+                  <a:srgbClr val="808080"/>
+                </a:solidFill>
+                <a:latin typeface="Consolas"/>
+              </a:rPr>
+              <a:t>)</a:t>
+            </a:r>
             <a:endParaRPr lang="ru-RU" dirty="0">
               <a:solidFill>
                 <a:prstClr val="black"/>
@@ -9691,12 +10577,20 @@
               <a:latin typeface="Consolas"/>
             </a:endParaRPr>
           </a:p>
+          <a:p>
+            <a:endParaRPr lang="ru-RU" dirty="0">
+              <a:solidFill>
+                <a:prstClr val="black"/>
+              </a:solidFill>
+              <a:latin typeface="Consolas"/>
+            </a:endParaRPr>
+          </a:p>
         </p:txBody>
       </p:sp>
     </p:spTree>
     <p:extLst>
       <p:ext uri="{BB962C8B-B14F-4D97-AF65-F5344CB8AC3E}">
-        <p14:creationId xmlns:p14="http://schemas.microsoft.com/office/powerpoint/2010/main" val="2524908556"/>
+        <p14:creationId xmlns:p14="http://schemas.microsoft.com/office/powerpoint/2010/main" val="1003551259"/>
       </p:ext>
     </p:extLst>
   </p:cSld>
@@ -9746,12 +10640,12 @@
           <a:lstStyle/>
           <a:p>
             <a:r>
+              <a:rPr lang="en-US" dirty="0" smtClean="0"/>
+              <a:t>T-SQL: </a:t>
+            </a:r>
+            <a:r>
               <a:rPr lang="ru-RU" dirty="0" smtClean="0"/>
-              <a:t>Ограничения </a:t>
-            </a:r>
-            <a:r>
-              <a:rPr lang="en-US" dirty="0" smtClean="0"/>
-              <a:t>(constraints)</a:t>
+              <a:t>Комментарии</a:t>
             </a:r>
             <a:endParaRPr lang="en-US" dirty="0"/>
           </a:p>
@@ -9767,50 +10661,205 @@
             <p:ph idx="1"/>
           </p:nvPr>
         </p:nvSpPr>
-        <p:spPr/>
+        <p:spPr>
+          <a:xfrm>
+            <a:off x="457200" y="1600201"/>
+            <a:ext cx="8147248" cy="1180728"/>
+          </a:xfrm>
+        </p:spPr>
         <p:txBody>
-          <a:bodyPr/>
+          <a:bodyPr>
+            <a:normAutofit/>
+          </a:bodyPr>
           <a:lstStyle/>
           <a:p>
+            <a:pPr marL="0" indent="0">
+              <a:buNone/>
+            </a:pPr>
             <a:r>
               <a:rPr lang="en-US" dirty="0" smtClean="0"/>
-              <a:t>NOT NULL</a:t>
-            </a:r>
-          </a:p>
-          <a:p>
+              <a:t>SQL </a:t>
+            </a:r>
+            <a:r>
+              <a:rPr lang="ru-RU" dirty="0" smtClean="0"/>
+              <a:t>поддерживает однострочные (--) и многострочные комментарии (</a:t>
+            </a:r>
             <a:r>
               <a:rPr lang="en-US" dirty="0" smtClean="0"/>
-              <a:t>CHECK</a:t>
-            </a:r>
-          </a:p>
-          <a:p>
-            <a:r>
-              <a:rPr lang="en-US" dirty="0" smtClean="0"/>
-              <a:t>UNIQUE</a:t>
-            </a:r>
-          </a:p>
-          <a:p>
-            <a:r>
-              <a:rPr lang="en-US" dirty="0" smtClean="0"/>
-              <a:t>PRIMARY KEY</a:t>
-            </a:r>
-          </a:p>
-          <a:p>
-            <a:r>
-              <a:rPr lang="en-US" dirty="0" smtClean="0"/>
-              <a:t> FOREIGN </a:t>
-            </a:r>
-            <a:r>
-              <a:rPr lang="en-US" dirty="0"/>
-              <a:t>KEY</a:t>
-            </a:r>
+              <a:t>/* ... */</a:t>
+            </a:r>
+            <a:r>
+              <a:rPr lang="ru-RU" dirty="0" smtClean="0"/>
+              <a:t>:</a:t>
+            </a:r>
+          </a:p>
+          <a:p>
+            <a:pPr marL="0" indent="0">
+              <a:buNone/>
+            </a:pPr>
+            <a:endParaRPr lang="en-US" dirty="0"/>
+          </a:p>
+        </p:txBody>
+      </p:sp>
+      <p:sp>
+        <p:nvSpPr>
+          <p:cNvPr id="5" name="Rectangle 4"/>
+          <p:cNvSpPr/>
+          <p:nvPr/>
+        </p:nvSpPr>
+        <p:spPr>
+          <a:xfrm>
+            <a:off x="457200" y="2837835"/>
+            <a:ext cx="8147248" cy="1477328"/>
+          </a:xfrm>
+          <a:prstGeom prst="rect">
+            <a:avLst/>
+          </a:prstGeom>
+          <a:solidFill>
+            <a:schemeClr val="bg1"/>
+          </a:solidFill>
+        </p:spPr>
+        <p:txBody>
+          <a:bodyPr wrap="square">
+            <a:spAutoFit/>
+          </a:bodyPr>
+          <a:lstStyle/>
+          <a:p>
+            <a:r>
+              <a:rPr lang="ru-RU" dirty="0">
+                <a:solidFill>
+                  <a:srgbClr val="008000"/>
+                </a:solidFill>
+                <a:latin typeface="Consolas"/>
+              </a:rPr>
+              <a:t>/*</a:t>
+            </a:r>
+            <a:endParaRPr lang="ru-RU" dirty="0">
+              <a:solidFill>
+                <a:prstClr val="black"/>
+              </a:solidFill>
+              <a:latin typeface="Consolas"/>
+            </a:endParaRPr>
+          </a:p>
+          <a:p>
+            <a:r>
+              <a:rPr lang="ru-RU" dirty="0">
+                <a:solidFill>
+                  <a:srgbClr val="008000"/>
+                </a:solidFill>
+                <a:latin typeface="Consolas"/>
+              </a:rPr>
+              <a:t>    Пример простого </a:t>
+            </a:r>
+            <a:r>
+              <a:rPr lang="en-US" dirty="0">
+                <a:solidFill>
+                  <a:srgbClr val="008000"/>
+                </a:solidFill>
+                <a:latin typeface="Consolas"/>
+              </a:rPr>
+              <a:t>T-SQL </a:t>
+            </a:r>
+            <a:r>
+              <a:rPr lang="ru-RU" dirty="0">
+                <a:solidFill>
+                  <a:srgbClr val="008000"/>
+                </a:solidFill>
+                <a:latin typeface="Consolas"/>
+              </a:rPr>
+              <a:t>скрипта</a:t>
+            </a:r>
+            <a:endParaRPr lang="ru-RU" dirty="0">
+              <a:solidFill>
+                <a:prstClr val="black"/>
+              </a:solidFill>
+              <a:latin typeface="Consolas"/>
+            </a:endParaRPr>
+          </a:p>
+          <a:p>
+            <a:r>
+              <a:rPr lang="ru-RU" dirty="0">
+                <a:solidFill>
+                  <a:srgbClr val="008000"/>
+                </a:solidFill>
+                <a:latin typeface="Consolas"/>
+              </a:rPr>
+              <a:t>*/</a:t>
+            </a:r>
+            <a:endParaRPr lang="ru-RU" dirty="0">
+              <a:solidFill>
+                <a:prstClr val="black"/>
+              </a:solidFill>
+              <a:latin typeface="Consolas"/>
+            </a:endParaRPr>
+          </a:p>
+          <a:p>
+            <a:r>
+              <a:rPr lang="ru-RU" dirty="0">
+                <a:solidFill>
+                  <a:srgbClr val="0000FF"/>
+                </a:solidFill>
+                <a:latin typeface="Consolas"/>
+              </a:rPr>
+              <a:t>EXEC</a:t>
+            </a:r>
+            <a:r>
+              <a:rPr lang="ru-RU" dirty="0">
+                <a:solidFill>
+                  <a:prstClr val="black"/>
+                </a:solidFill>
+                <a:latin typeface="Consolas"/>
+              </a:rPr>
+              <a:t> </a:t>
+            </a:r>
+            <a:r>
+              <a:rPr lang="ru-RU" dirty="0">
+                <a:solidFill>
+                  <a:srgbClr val="800000"/>
+                </a:solidFill>
+                <a:latin typeface="Consolas"/>
+              </a:rPr>
+              <a:t>sp_help</a:t>
+            </a:r>
+            <a:r>
+              <a:rPr lang="ru-RU" dirty="0">
+                <a:solidFill>
+                  <a:srgbClr val="0000FF"/>
+                </a:solidFill>
+                <a:latin typeface="Consolas"/>
+              </a:rPr>
+              <a:t> </a:t>
+            </a:r>
+            <a:r>
+              <a:rPr lang="ru-RU" dirty="0">
+                <a:solidFill>
+                  <a:srgbClr val="008000"/>
+                </a:solidFill>
+                <a:latin typeface="Consolas"/>
+              </a:rPr>
+              <a:t>-- Выполняем системную хранимую процедуру sp_help</a:t>
+            </a:r>
+            <a:endParaRPr lang="ru-RU" dirty="0">
+              <a:solidFill>
+                <a:prstClr val="black"/>
+              </a:solidFill>
+              <a:latin typeface="Consolas"/>
+            </a:endParaRPr>
+          </a:p>
+          <a:p>
+            <a:endParaRPr lang="ru-RU" dirty="0">
+              <a:solidFill>
+                <a:prstClr val="black"/>
+              </a:solidFill>
+              <a:latin typeface="Consolas"/>
+            </a:endParaRPr>
           </a:p>
         </p:txBody>
       </p:sp>
     </p:spTree>
     <p:extLst>
       <p:ext uri="{BB962C8B-B14F-4D97-AF65-F5344CB8AC3E}">
-        <p14:creationId xmlns:p14="http://schemas.microsoft.com/office/powerpoint/2010/main" val="3114920222"/>
+        <p14:creationId xmlns:p14="http://schemas.microsoft.com/office/powerpoint/2010/main" val="2524908556"/>
       </p:ext>
     </p:extLst>
   </p:cSld>
@@ -9861,7 +10910,11 @@
           <a:p>
             <a:r>
               <a:rPr lang="ru-RU" dirty="0" smtClean="0"/>
-              <a:t>Хранимые процедуры</a:t>
+              <a:t>Ограничения </a:t>
+            </a:r>
+            <a:r>
+              <a:rPr lang="en-US" dirty="0" smtClean="0"/>
+              <a:t>(constraints)</a:t>
             </a:r>
             <a:endParaRPr lang="en-US" dirty="0"/>
           </a:p>
@@ -9877,63 +10930,50 @@
             <p:ph idx="1"/>
           </p:nvPr>
         </p:nvSpPr>
-        <p:spPr>
-          <a:xfrm>
-            <a:off x="457200" y="1600200"/>
-            <a:ext cx="8229600" cy="3773015"/>
-          </a:xfrm>
-        </p:spPr>
+        <p:spPr/>
         <p:txBody>
           <a:bodyPr/>
           <a:lstStyle/>
           <a:p>
-            <a:pPr marL="0" indent="0">
-              <a:buNone/>
-            </a:pPr>
-            <a:r>
-              <a:rPr lang="ru-RU" dirty="0" smtClean="0"/>
-              <a:t>Хранимая процедура это функция на языке </a:t>
-            </a:r>
             <a:r>
               <a:rPr lang="en-US" dirty="0" smtClean="0"/>
-              <a:t>SQL. </a:t>
-            </a:r>
-            <a:r>
-              <a:rPr lang="ru-RU" dirty="0" smtClean="0"/>
-              <a:t>У процедуры могут быть параметры. Для создания процедуры используется команда </a:t>
-            </a:r>
+              <a:t>NOT NULL</a:t>
+            </a:r>
+          </a:p>
+          <a:p>
             <a:r>
               <a:rPr lang="en-US" dirty="0" smtClean="0"/>
-              <a:t>CREATE PROC, </a:t>
-            </a:r>
-            <a:r>
-              <a:rPr lang="ru-RU" dirty="0" smtClean="0"/>
-              <a:t>для изменения </a:t>
-            </a:r>
+              <a:t>CHECK</a:t>
+            </a:r>
+          </a:p>
+          <a:p>
             <a:r>
               <a:rPr lang="en-US" dirty="0" smtClean="0"/>
-              <a:t>ALTER PROC </a:t>
-            </a:r>
-            <a:r>
-              <a:rPr lang="ru-RU" dirty="0" smtClean="0"/>
-              <a:t>и </a:t>
-            </a:r>
+              <a:t>UNIQUE</a:t>
+            </a:r>
+          </a:p>
+          <a:p>
             <a:r>
               <a:rPr lang="en-US" dirty="0" smtClean="0"/>
-              <a:t>DROP PROC </a:t>
-            </a:r>
-            <a:r>
-              <a:rPr lang="ru-RU" dirty="0" smtClean="0"/>
-              <a:t>для удаления.</a:t>
-            </a:r>
-            <a:endParaRPr lang="en-US" dirty="0" smtClean="0"/>
+              <a:t>PRIMARY KEY</a:t>
+            </a:r>
+          </a:p>
+          <a:p>
+            <a:r>
+              <a:rPr lang="en-US" dirty="0" smtClean="0"/>
+              <a:t> FOREIGN </a:t>
+            </a:r>
+            <a:r>
+              <a:rPr lang="en-US" dirty="0"/>
+              <a:t>KEY</a:t>
+            </a:r>
           </a:p>
         </p:txBody>
       </p:sp>
     </p:spTree>
     <p:extLst>
       <p:ext uri="{BB962C8B-B14F-4D97-AF65-F5344CB8AC3E}">
-        <p14:creationId xmlns:p14="http://schemas.microsoft.com/office/powerpoint/2010/main" val="2533733971"/>
+        <p14:creationId xmlns:p14="http://schemas.microsoft.com/office/powerpoint/2010/main" val="3114920222"/>
       </p:ext>
     </p:extLst>
   </p:cSld>
@@ -10145,11 +11185,11 @@
   <p:clrMapOvr>
     <a:masterClrMapping/>
   </p:clrMapOvr>
-  <mc:AlternateContent xmlns:mc="http://schemas.openxmlformats.org/markup-compatibility/2006" xmlns:p14="http://schemas.microsoft.com/office/powerpoint/2010/main">
-    <mc:Choice Requires="p14">
+  <mc:AlternateContent xmlns:mc="http://schemas.openxmlformats.org/markup-compatibility/2006">
+    <mc:Choice xmlns:p14="http://schemas.microsoft.com/office/powerpoint/2010/main" Requires="p14">
       <p:transition spd="slow" p14:dur="2000"/>
     </mc:Choice>
-    <mc:Fallback xmlns="">
+    <mc:Fallback>
       <p:transition spd="slow"/>
     </mc:Fallback>
   </mc:AlternateContent>
@@ -10197,6 +11237,129 @@
           <a:p>
             <a:r>
               <a:rPr lang="ru-RU" dirty="0" smtClean="0"/>
+              <a:t>Хранимые процедуры</a:t>
+            </a:r>
+            <a:endParaRPr lang="en-US" dirty="0"/>
+          </a:p>
+        </p:txBody>
+      </p:sp>
+      <p:sp>
+        <p:nvSpPr>
+          <p:cNvPr id="3" name="Content Placeholder 2"/>
+          <p:cNvSpPr>
+            <a:spLocks noGrp="1"/>
+          </p:cNvSpPr>
+          <p:nvPr>
+            <p:ph idx="1"/>
+          </p:nvPr>
+        </p:nvSpPr>
+        <p:spPr>
+          <a:xfrm>
+            <a:off x="457200" y="1600200"/>
+            <a:ext cx="8229600" cy="3773015"/>
+          </a:xfrm>
+        </p:spPr>
+        <p:txBody>
+          <a:bodyPr/>
+          <a:lstStyle/>
+          <a:p>
+            <a:pPr marL="0" indent="0">
+              <a:buNone/>
+            </a:pPr>
+            <a:r>
+              <a:rPr lang="ru-RU" dirty="0" smtClean="0"/>
+              <a:t>Хранимая процедура это функция на языке </a:t>
+            </a:r>
+            <a:r>
+              <a:rPr lang="en-US" dirty="0" smtClean="0"/>
+              <a:t>SQL. </a:t>
+            </a:r>
+            <a:r>
+              <a:rPr lang="ru-RU" dirty="0" smtClean="0"/>
+              <a:t>У процедуры могут быть параметры. Для создания процедуры используется команда </a:t>
+            </a:r>
+            <a:r>
+              <a:rPr lang="en-US" dirty="0" smtClean="0"/>
+              <a:t>CREATE PROC, </a:t>
+            </a:r>
+            <a:r>
+              <a:rPr lang="ru-RU" dirty="0" smtClean="0"/>
+              <a:t>для изменения </a:t>
+            </a:r>
+            <a:r>
+              <a:rPr lang="en-US" dirty="0" smtClean="0"/>
+              <a:t>ALTER PROC </a:t>
+            </a:r>
+            <a:r>
+              <a:rPr lang="ru-RU" dirty="0" smtClean="0"/>
+              <a:t>и </a:t>
+            </a:r>
+            <a:r>
+              <a:rPr lang="en-US" dirty="0" smtClean="0"/>
+              <a:t>DROP PROC </a:t>
+            </a:r>
+            <a:r>
+              <a:rPr lang="ru-RU" dirty="0" smtClean="0"/>
+              <a:t>для удаления.</a:t>
+            </a:r>
+            <a:endParaRPr lang="en-US" dirty="0" smtClean="0"/>
+          </a:p>
+        </p:txBody>
+      </p:sp>
+    </p:spTree>
+    <p:extLst>
+      <p:ext uri="{BB962C8B-B14F-4D97-AF65-F5344CB8AC3E}">
+        <p14:creationId xmlns:p14="http://schemas.microsoft.com/office/powerpoint/2010/main" val="2533733971"/>
+      </p:ext>
+    </p:extLst>
+  </p:cSld>
+  <p:clrMapOvr>
+    <a:masterClrMapping/>
+  </p:clrMapOvr>
+  <p:timing>
+    <p:tnLst>
+      <p:par>
+        <p:cTn id="1" dur="indefinite" restart="never" nodeType="tmRoot"/>
+      </p:par>
+    </p:tnLst>
+  </p:timing>
+</p:sld>
+</file>
+
+<file path=ppt/slides/slide31.xml><?xml version="1.0" encoding="utf-8"?>
+<p:sld xmlns:a="http://schemas.openxmlformats.org/drawingml/2006/main" xmlns:r="http://schemas.openxmlformats.org/officeDocument/2006/relationships" xmlns:p="http://schemas.openxmlformats.org/presentationml/2006/main">
+  <p:cSld>
+    <p:spTree>
+      <p:nvGrpSpPr>
+        <p:cNvPr id="1" name=""/>
+        <p:cNvGrpSpPr/>
+        <p:nvPr/>
+      </p:nvGrpSpPr>
+      <p:grpSpPr>
+        <a:xfrm>
+          <a:off x="0" y="0"/>
+          <a:ext cx="0" cy="0"/>
+          <a:chOff x="0" y="0"/>
+          <a:chExt cx="0" cy="0"/>
+        </a:xfrm>
+      </p:grpSpPr>
+      <p:sp>
+        <p:nvSpPr>
+          <p:cNvPr id="2" name="Title 1"/>
+          <p:cNvSpPr>
+            <a:spLocks noGrp="1"/>
+          </p:cNvSpPr>
+          <p:nvPr>
+            <p:ph type="title"/>
+          </p:nvPr>
+        </p:nvSpPr>
+        <p:spPr/>
+        <p:txBody>
+          <a:bodyPr/>
+          <a:lstStyle/>
+          <a:p>
+            <a:r>
+              <a:rPr lang="ru-RU" dirty="0" smtClean="0"/>
               <a:t>Триггеры</a:t>
             </a:r>
             <a:endParaRPr lang="en-US" dirty="0"/>
@@ -10377,7 +11540,7 @@
 </p:sld>
 </file>
 
-<file path=ppt/slides/slide31.xml><?xml version="1.0" encoding="utf-8"?>
+<file path=ppt/slides/slide32.xml><?xml version="1.0" encoding="utf-8"?>
 <p:sld xmlns:a="http://schemas.openxmlformats.org/drawingml/2006/main" xmlns:r="http://schemas.openxmlformats.org/officeDocument/2006/relationships" xmlns:p="http://schemas.openxmlformats.org/presentationml/2006/main">
   <p:cSld>
     <p:spTree>
@@ -10900,11 +12063,13 @@
         </p:nvSpPr>
         <p:spPr/>
         <p:txBody>
-          <a:bodyPr/>
+          <a:bodyPr>
+            <a:normAutofit fontScale="70000" lnSpcReduction="20000"/>
+          </a:bodyPr>
           <a:lstStyle/>
           <a:p>
             <a:r>
-              <a:rPr lang="ru-RU" dirty="0" smtClean="0">
+              <a:rPr lang="ru-RU" sz="4600" dirty="0" smtClean="0">
                 <a:solidFill>
                   <a:srgbClr val="FFFF00"/>
                 </a:solidFill>
@@ -10912,16 +12077,59 @@
               <a:t>Реляционные </a:t>
             </a:r>
             <a:r>
+              <a:rPr lang="en-US" sz="4600" dirty="0" smtClean="0">
+                <a:solidFill>
+                  <a:srgbClr val="FFFF00"/>
+                </a:solidFill>
+              </a:rPr>
+              <a:t>(relational</a:t>
+            </a:r>
+            <a:r>
+              <a:rPr lang="en-US" sz="4600" dirty="0" smtClean="0">
+                <a:solidFill>
+                  <a:srgbClr val="FFFF00"/>
+                </a:solidFill>
+              </a:rPr>
+              <a:t>)</a:t>
+            </a:r>
+          </a:p>
+          <a:p>
+            <a:pPr lvl="1"/>
+            <a:r>
+              <a:rPr lang="en-US" dirty="0">
+                <a:solidFill>
+                  <a:schemeClr val="bg1"/>
+                </a:solidFill>
+              </a:rPr>
+              <a:t>MS </a:t>
+            </a:r>
+            <a:r>
               <a:rPr lang="en-US" dirty="0" smtClean="0">
                 <a:solidFill>
+                  <a:schemeClr val="bg1"/>
+                </a:solidFill>
+              </a:rPr>
+              <a:t>Access, </a:t>
+            </a:r>
+            <a:r>
+              <a:rPr lang="en-US" dirty="0">
+                <a:solidFill>
                   <a:srgbClr val="FFFF00"/>
                 </a:solidFill>
               </a:rPr>
-              <a:t>(relational)</a:t>
+              <a:t>MS SQL Server</a:t>
+            </a:r>
+            <a:r>
+              <a:rPr lang="en-US" dirty="0" smtClean="0">
+                <a:solidFill>
+                  <a:schemeClr val="bg1"/>
+                </a:solidFill>
+              </a:rPr>
+              <a:t>, Oracle, MySQL, PostgreSQL, SQLite, ...</a:t>
             </a:r>
             <a:endParaRPr lang="ru-RU" dirty="0" smtClean="0">
               <a:solidFill>
-                <a:srgbClr val="FFFF00"/>
+                <a:schemeClr val="bg1"/>
               </a:solidFill>
             </a:endParaRPr>
           </a:p>
@@ -10932,8 +12140,48 @@
             </a:r>
             <a:r>
               <a:rPr lang="en-US" dirty="0" smtClean="0"/>
-              <a:t> (document-driven)</a:t>
-            </a:r>
+              <a:t> (document-driven</a:t>
+            </a:r>
+            <a:r>
+              <a:rPr lang="en-US" dirty="0" smtClean="0"/>
+              <a:t>)</a:t>
+            </a:r>
+          </a:p>
+          <a:p>
+            <a:pPr lvl="1"/>
+            <a:r>
+              <a:rPr lang="en-US" dirty="0" err="1"/>
+              <a:t>CouchDB</a:t>
+            </a:r>
+            <a:r>
+              <a:rPr lang="en-US" dirty="0"/>
+              <a:t>, MongoDB, </a:t>
+            </a:r>
+            <a:r>
+              <a:rPr lang="en-US" dirty="0" err="1"/>
+              <a:t>RavenDB</a:t>
+            </a:r>
+            <a:r>
+              <a:rPr lang="en-US" dirty="0"/>
+              <a:t>, </a:t>
+            </a:r>
+            <a:r>
+              <a:rPr lang="en-US" dirty="0" err="1"/>
+              <a:t>Redis</a:t>
+            </a:r>
+            <a:r>
+              <a:rPr lang="en-US" dirty="0"/>
+              <a:t>, Amazon </a:t>
+            </a:r>
+            <a:r>
+              <a:rPr lang="en-US" dirty="0" err="1" smtClean="0"/>
+              <a:t>SimpleDB</a:t>
+            </a:r>
+            <a:r>
+              <a:rPr lang="en-US" dirty="0" smtClean="0"/>
+              <a:t>, ...</a:t>
+            </a:r>
+            <a:endParaRPr lang="en-US" dirty="0" smtClean="0"/>
           </a:p>
           <a:p>
             <a:r>
@@ -10942,13 +12190,76 @@
             </a:r>
             <a:r>
               <a:rPr lang="en-US" dirty="0" smtClean="0"/>
-              <a:t>(graph)</a:t>
-            </a:r>
+              <a:t>(graph</a:t>
+            </a:r>
+            <a:r>
+              <a:rPr lang="en-US" dirty="0" smtClean="0"/>
+              <a:t>)</a:t>
+            </a:r>
+          </a:p>
+          <a:p>
+            <a:pPr lvl="1"/>
+            <a:r>
+              <a:rPr lang="en-US" dirty="0" smtClean="0"/>
+              <a:t>Neo4j, </a:t>
+            </a:r>
+            <a:r>
+              <a:rPr lang="en-US" dirty="0" err="1" smtClean="0"/>
+              <a:t>MapGraph</a:t>
+            </a:r>
+            <a:r>
+              <a:rPr lang="en-US" dirty="0"/>
+              <a:t>, </a:t>
+            </a:r>
+            <a:r>
+              <a:rPr lang="en-US" dirty="0" err="1" smtClean="0"/>
+              <a:t>OrientDB</a:t>
+            </a:r>
+            <a:r>
+              <a:rPr lang="en-US" dirty="0" smtClean="0"/>
+              <a:t>, ...</a:t>
+            </a:r>
+            <a:endParaRPr lang="en-US" dirty="0" smtClean="0"/>
           </a:p>
           <a:p>
             <a:r>
               <a:rPr lang="ru-RU" dirty="0" smtClean="0"/>
-              <a:t>и другие </a:t>
+              <a:t>Объектно-ориентированные</a:t>
+            </a:r>
+            <a:endParaRPr lang="en-US" dirty="0" smtClean="0"/>
+          </a:p>
+          <a:p>
+            <a:pPr lvl="1"/>
+            <a:r>
+              <a:rPr lang="en-US" dirty="0" err="1"/>
+              <a:t>Caché</a:t>
+            </a:r>
+            <a:r>
+              <a:rPr lang="en-US" dirty="0"/>
+              <a:t>, </a:t>
+            </a:r>
+            <a:r>
+              <a:rPr lang="en-US" dirty="0" err="1"/>
+              <a:t>VelocityDB</a:t>
+            </a:r>
+            <a:r>
+              <a:rPr lang="en-US" dirty="0"/>
+              <a:t>, </a:t>
+            </a:r>
+            <a:r>
+              <a:rPr lang="en-US" dirty="0" smtClean="0"/>
+              <a:t>Db4o, ...</a:t>
+            </a:r>
+            <a:endParaRPr lang="en-US" dirty="0"/>
+          </a:p>
+          <a:p>
+            <a:r>
+              <a:rPr lang="ru-RU" dirty="0" smtClean="0"/>
+              <a:t>И </a:t>
+            </a:r>
+            <a:r>
+              <a:rPr lang="ru-RU" dirty="0" smtClean="0"/>
+              <a:t>другие </a:t>
             </a:r>
             <a:r>
               <a:rPr lang="en-US" dirty="0" smtClean="0"/>
@@ -10960,6 +12271,9 @@
             <a:endParaRPr lang="ru-RU" dirty="0"/>
           </a:p>
           <a:p>
+            <a:pPr marL="0" indent="0">
+              <a:buNone/>
+            </a:pPr>
             <a:r>
               <a:rPr lang="ru-RU" dirty="0" smtClean="0"/>
               <a:t>СУБД – Система Управления Базами Данных </a:t>

</xml_diff>

<commit_message>
SqlDataReader methods mapping to T-SQL data types
</commit_message>
<xml_diff>
--- a/Presentation/lesson-09-sql.pptx
+++ b/Presentation/lesson-09-sql.pptx
@@ -232,7 +232,7 @@
           <a:p>
             <a:fld id="{B24A7054-7FFB-49F4-A126-5DF6E687FF53}" type="datetimeFigureOut">
               <a:rPr lang="ru-RU" smtClean="0"/>
-              <a:t>10.10.2015</a:t>
+              <a:t>02.11.2015</a:t>
             </a:fld>
             <a:endParaRPr lang="ru-RU"/>
           </a:p>
@@ -1514,7 +1514,7 @@
           <a:p>
             <a:fld id="{8E6E6A2A-E9D3-4A0D-B04A-ABDD367A1E08}" type="datetimeFigureOut">
               <a:rPr lang="ru-RU" smtClean="0"/>
-              <a:t>10.10.2015</a:t>
+              <a:t>02.11.2015</a:t>
             </a:fld>
             <a:endParaRPr lang="ru-RU"/>
           </a:p>
@@ -2959,7 +2959,7 @@
           <a:p>
             <a:fld id="{AC3D3127-B7C4-45E3-9797-C527EC9FDD78}" type="datetimeFigureOut">
               <a:rPr lang="ru-RU" smtClean="0"/>
-              <a:t>10.10.2015</a:t>
+              <a:t>02.11.2015</a:t>
             </a:fld>
             <a:endParaRPr lang="ru-RU"/>
           </a:p>
@@ -4695,7 +4695,7 @@
         <p:spPr/>
         <p:txBody>
           <a:bodyPr>
-            <a:normAutofit fontScale="85000" lnSpcReduction="10000"/>
+            <a:normAutofit fontScale="85000" lnSpcReduction="20000"/>
           </a:bodyPr>
           <a:lstStyle/>
           <a:p>
@@ -4705,19 +4705,92 @@
             </a:r>
             <a:r>
               <a:rPr lang="en-US" dirty="0" smtClean="0"/>
-              <a:t>: char, </a:t>
+              <a:t>: </a:t>
+            </a:r>
+            <a:r>
+              <a:rPr lang="en-US" dirty="0" smtClean="0"/>
+              <a:t>char(N), </a:t>
             </a:r>
             <a:r>
               <a:rPr lang="en-US" dirty="0" err="1" smtClean="0"/>
               <a:t>nchar</a:t>
             </a:r>
             <a:r>
+              <a:rPr lang="en-US" dirty="0"/>
+              <a:t>(</a:t>
+            </a:r>
+            <a:r>
+              <a:rPr lang="en-US" dirty="0" smtClean="0"/>
+              <a:t>N), varchar(N), </a:t>
+            </a:r>
+            <a:r>
+              <a:rPr lang="en-US" dirty="0" err="1" smtClean="0"/>
+              <a:t>nvarchar</a:t>
+            </a:r>
+            <a:r>
+              <a:rPr lang="en-US" dirty="0"/>
+              <a:t>(</a:t>
+            </a:r>
+            <a:r>
+              <a:rPr lang="en-US" dirty="0" smtClean="0"/>
+              <a:t>N), </a:t>
+            </a:r>
+            <a:r>
+              <a:rPr lang="en-US" dirty="0" smtClean="0"/>
+              <a:t>text, </a:t>
+            </a:r>
+            <a:r>
+              <a:rPr lang="en-US" dirty="0" err="1" smtClean="0"/>
+              <a:t>ntext</a:t>
+            </a:r>
+            <a:endParaRPr lang="en-US" dirty="0" smtClean="0"/>
+          </a:p>
+          <a:p>
+            <a:r>
+              <a:rPr lang="ru-RU" dirty="0" smtClean="0"/>
+              <a:t>Дата/время: </a:t>
+            </a:r>
+            <a:r>
+              <a:rPr lang="en-US" dirty="0" smtClean="0"/>
+              <a:t> </a:t>
+            </a:r>
+            <a:r>
+              <a:rPr lang="en-US" dirty="0" err="1" smtClean="0"/>
+              <a:t>datetime</a:t>
+            </a:r>
+            <a:r>
               <a:rPr lang="en-US" dirty="0" smtClean="0"/>
               <a:t>, </a:t>
             </a:r>
             <a:r>
               <a:rPr lang="en-US" dirty="0" err="1" smtClean="0"/>
-              <a:t>varchar</a:t>
+              <a:t>smalldatetime</a:t>
+            </a:r>
+            <a:r>
+              <a:rPr lang="en-US" dirty="0" smtClean="0"/>
+              <a:t>, date, time, </a:t>
+            </a:r>
+            <a:r>
+              <a:rPr lang="en-US" dirty="0" err="1" smtClean="0"/>
+              <a:t>datetimeoffset</a:t>
+            </a:r>
+            <a:r>
+              <a:rPr lang="en-US" dirty="0" smtClean="0"/>
+              <a:t>, datetime2</a:t>
+            </a:r>
+          </a:p>
+          <a:p>
+            <a:r>
+              <a:rPr lang="ru-RU" dirty="0" smtClean="0"/>
+              <a:t>Численные: </a:t>
+            </a:r>
+            <a:r>
+              <a:rPr lang="en-US" dirty="0" smtClean="0"/>
+              <a:t>decimal, numeric, float, real, </a:t>
+            </a:r>
+            <a:r>
+              <a:rPr lang="en-US" dirty="0" err="1" smtClean="0"/>
+              <a:t>bigint</a:t>
             </a:r>
             <a:r>
               <a:rPr lang="en-US" dirty="0" smtClean="0"/>
@@ -4725,30 +4798,7 @@
             </a:r>
             <a:r>
               <a:rPr lang="en-US" dirty="0" err="1" smtClean="0"/>
-              <a:t>nvarchar</a:t>
-            </a:r>
-            <a:r>
-              <a:rPr lang="en-US" dirty="0" smtClean="0"/>
-              <a:t>, text, </a:t>
-            </a:r>
-            <a:r>
-              <a:rPr lang="en-US" dirty="0" err="1" smtClean="0"/>
-              <a:t>ntext</a:t>
-            </a:r>
-            <a:endParaRPr lang="en-US" dirty="0" smtClean="0"/>
-          </a:p>
-          <a:p>
-            <a:r>
-              <a:rPr lang="ru-RU" dirty="0" smtClean="0"/>
-              <a:t>Дата/время: </a:t>
-            </a:r>
-            <a:r>
-              <a:rPr lang="en-US" dirty="0" smtClean="0"/>
-              <a:t> </a:t>
-            </a:r>
-            <a:r>
-              <a:rPr lang="en-US" dirty="0" err="1" smtClean="0"/>
-              <a:t>datetime</a:t>
+              <a:t>int</a:t>
             </a:r>
             <a:r>
               <a:rPr lang="en-US" dirty="0" smtClean="0"/>
@@ -4756,48 +4806,6 @@
             </a:r>
             <a:r>
               <a:rPr lang="en-US" dirty="0" err="1" smtClean="0"/>
-              <a:t>smalldatetime</a:t>
-            </a:r>
-            <a:r>
-              <a:rPr lang="en-US" dirty="0" smtClean="0"/>
-              <a:t>, date, time, </a:t>
-            </a:r>
-            <a:r>
-              <a:rPr lang="en-US" dirty="0" err="1" smtClean="0"/>
-              <a:t>datetimeoffset</a:t>
-            </a:r>
-            <a:r>
-              <a:rPr lang="en-US" dirty="0" smtClean="0"/>
-              <a:t>, datetime2</a:t>
-            </a:r>
-          </a:p>
-          <a:p>
-            <a:r>
-              <a:rPr lang="ru-RU" dirty="0" smtClean="0"/>
-              <a:t>Численные: </a:t>
-            </a:r>
-            <a:r>
-              <a:rPr lang="en-US" dirty="0" smtClean="0"/>
-              <a:t>decimal, numeric, float, real, </a:t>
-            </a:r>
-            <a:r>
-              <a:rPr lang="en-US" dirty="0" err="1" smtClean="0"/>
-              <a:t>bigint</a:t>
-            </a:r>
-            <a:r>
-              <a:rPr lang="en-US" dirty="0" smtClean="0"/>
-              <a:t>, </a:t>
-            </a:r>
-            <a:r>
-              <a:rPr lang="en-US" dirty="0" err="1" smtClean="0"/>
-              <a:t>int</a:t>
-            </a:r>
-            <a:r>
-              <a:rPr lang="en-US" dirty="0" smtClean="0"/>
-              <a:t>, </a:t>
-            </a:r>
-            <a:r>
-              <a:rPr lang="en-US" dirty="0" err="1" smtClean="0"/>
               <a:t>smallint</a:t>
             </a:r>
             <a:r>
@@ -4817,7 +4825,7 @@
             </a:r>
             <a:r>
               <a:rPr lang="en-US" dirty="0" smtClean="0"/>
-              <a:t>binary, </a:t>
+              <a:t>binary(N), </a:t>
             </a:r>
             <a:r>
               <a:rPr lang="en-US" dirty="0" err="1" smtClean="0"/>
@@ -4825,7 +4833,11 @@
             </a:r>
             <a:r>
               <a:rPr lang="en-US" dirty="0" smtClean="0"/>
-              <a:t>, image</a:t>
+              <a:t>(N), </a:t>
+            </a:r>
+            <a:r>
+              <a:rPr lang="en-US" dirty="0" smtClean="0"/>
+              <a:t>image</a:t>
             </a:r>
           </a:p>
           <a:p>
@@ -7941,11 +7953,11 @@
   <p:clrMapOvr>
     <a:masterClrMapping/>
   </p:clrMapOvr>
-  <mc:AlternateContent xmlns:mc="http://schemas.openxmlformats.org/markup-compatibility/2006">
-    <mc:Choice xmlns:p14="http://schemas.microsoft.com/office/powerpoint/2010/main" Requires="p14">
+  <mc:AlternateContent xmlns:mc="http://schemas.openxmlformats.org/markup-compatibility/2006" xmlns:p14="http://schemas.microsoft.com/office/powerpoint/2010/main">
+    <mc:Choice Requires="p14">
       <p:transition spd="slow" p14:dur="2000"/>
     </mc:Choice>
-    <mc:Fallback>
+    <mc:Fallback xmlns="">
       <p:transition spd="slow"/>
     </mc:Fallback>
   </mc:AlternateContent>
@@ -8229,11 +8241,11 @@
   <p:clrMapOvr>
     <a:masterClrMapping/>
   </p:clrMapOvr>
-  <mc:AlternateContent xmlns:mc="http://schemas.openxmlformats.org/markup-compatibility/2006">
-    <mc:Choice xmlns:p14="http://schemas.microsoft.com/office/powerpoint/2010/main" Requires="p14">
+  <mc:AlternateContent xmlns:mc="http://schemas.openxmlformats.org/markup-compatibility/2006" xmlns:p14="http://schemas.microsoft.com/office/powerpoint/2010/main">
+    <mc:Choice Requires="p14">
       <p:transition spd="slow" p14:dur="2000"/>
     </mc:Choice>
-    <mc:Fallback>
+    <mc:Fallback xmlns="">
       <p:transition spd="slow"/>
     </mc:Fallback>
   </mc:AlternateContent>

</xml_diff>